<commit_message>
modify the opening report
</commit_message>
<xml_diff>
--- a/record/开题报告——李龙昊.pptx
+++ b/record/开题报告——李龙昊.pptx
@@ -5,18 +5,20 @@
     <p:sldMasterId id="2147483648" r:id="rId1"/>
   </p:sldMasterIdLst>
   <p:notesMasterIdLst>
-    <p:notesMasterId r:id="rId12"/>
+    <p:notesMasterId r:id="rId13"/>
   </p:notesMasterIdLst>
   <p:sldIdLst>
-    <p:sldId id="270" r:id="rId3"/>
-    <p:sldId id="277" r:id="rId4"/>
-    <p:sldId id="271" r:id="rId5"/>
-    <p:sldId id="272" r:id="rId6"/>
-    <p:sldId id="286" r:id="rId7"/>
+    <p:sldId id="270" r:id="rId2"/>
+    <p:sldId id="277" r:id="rId3"/>
+    <p:sldId id="271" r:id="rId4"/>
+    <p:sldId id="272" r:id="rId5"/>
+    <p:sldId id="286" r:id="rId6"/>
+    <p:sldId id="292" r:id="rId7"/>
     <p:sldId id="291" r:id="rId8"/>
-    <p:sldId id="276" r:id="rId9"/>
-    <p:sldId id="282" r:id="rId10"/>
-    <p:sldId id="292" r:id="rId11"/>
+    <p:sldId id="293" r:id="rId9"/>
+    <p:sldId id="294" r:id="rId10"/>
+    <p:sldId id="276" r:id="rId11"/>
+    <p:sldId id="282" r:id="rId12"/>
   </p:sldIdLst>
   <p:sldSz cx="12192000" cy="6858000"/>
   <p:notesSz cx="6858000" cy="9144000"/>
@@ -115,6 +117,11 @@
       </a:defRPr>
     </a:lvl9pPr>
   </p:defaultTextStyle>
+  <p:extLst>
+    <p:ext uri="{EFAFB233-063F-42B5-8137-9DF3F51BA10A}">
+      <p15:sldGuideLst xmlns:p15="http://schemas.microsoft.com/office/powerpoint/2012/main"/>
+    </p:ext>
+  </p:extLst>
 </p:presentation>
 </file>
 
@@ -200,6 +207,7 @@
           <a:p>
             <a:fld id="{BDA51940-DB52-3B48-AABB-9C7938529E4E}" type="datetimeFigureOut">
               <a:rPr kumimoji="1" lang="zh-CN" altLang="en-US" smtClean="0"/>
+              <a:t>2022/12/31</a:t>
             </a:fld>
             <a:endParaRPr kumimoji="1" lang="zh-CN" altLang="en-US"/>
           </a:p>
@@ -266,7 +274,6 @@
               <a:rPr kumimoji="1" lang="zh-CN" altLang="en-US"/>
               <a:t>单击此处编辑母版文本样式</a:t>
             </a:r>
-            <a:endParaRPr kumimoji="1" lang="zh-CN" altLang="en-US"/>
           </a:p>
           <a:p>
             <a:pPr lvl="1"/>
@@ -274,7 +281,6 @@
               <a:rPr kumimoji="1" lang="zh-CN" altLang="en-US"/>
               <a:t>二级</a:t>
             </a:r>
-            <a:endParaRPr kumimoji="1" lang="zh-CN" altLang="en-US"/>
           </a:p>
           <a:p>
             <a:pPr lvl="2"/>
@@ -282,7 +288,6 @@
               <a:rPr kumimoji="1" lang="zh-CN" altLang="en-US"/>
               <a:t>三级</a:t>
             </a:r>
-            <a:endParaRPr kumimoji="1" lang="zh-CN" altLang="en-US"/>
           </a:p>
           <a:p>
             <a:pPr lvl="3"/>
@@ -290,7 +295,6 @@
               <a:rPr kumimoji="1" lang="zh-CN" altLang="en-US"/>
               <a:t>四级</a:t>
             </a:r>
-            <a:endParaRPr kumimoji="1" lang="zh-CN" altLang="en-US"/>
           </a:p>
           <a:p>
             <a:pPr lvl="4"/>
@@ -298,7 +302,6 @@
               <a:rPr kumimoji="1" lang="zh-CN" altLang="en-US"/>
               <a:t>五级</a:t>
             </a:r>
-            <a:endParaRPr kumimoji="1" lang="zh-CN" altLang="en-US"/>
           </a:p>
         </p:txBody>
       </p:sp>
@@ -362,6 +365,7 @@
           <a:p>
             <a:fld id="{6D18717E-F74C-4246-A795-6577BEDC8382}" type="slidenum">
               <a:rPr kumimoji="1" lang="zh-CN" altLang="en-US" smtClean="0"/>
+              <a:t>‹#›</a:t>
             </a:fld>
             <a:endParaRPr kumimoji="1" lang="zh-CN" altLang="en-US"/>
           </a:p>
@@ -466,7 +470,7 @@
 </file>
 
 <file path=ppt/slideLayouts/slideLayout1.xml><?xml version="1.0" encoding="utf-8"?>
-<p:sldLayout xmlns:a="http://schemas.openxmlformats.org/drawingml/2006/main" xmlns:r="http://schemas.openxmlformats.org/officeDocument/2006/relationships" xmlns:p="http://schemas.openxmlformats.org/presentationml/2006/main" preserve="1" showMasterSp="0" userDrawn="1">
+<p:sldLayout xmlns:a="http://schemas.openxmlformats.org/drawingml/2006/main" xmlns:r="http://schemas.openxmlformats.org/officeDocument/2006/relationships" xmlns:p="http://schemas.openxmlformats.org/presentationml/2006/main" showMasterSp="0" preserve="1" userDrawn="1">
   <p:cSld name="标题幻灯片">
     <p:spTree>
       <p:nvGrpSpPr>
@@ -859,6 +863,7 @@
           <a:p>
             <a:fld id="{E4551058-E5DB-324A-A8E9-6D3BEF243C3B}" type="datetimeFigureOut">
               <a:rPr kumimoji="1" lang="zh-CN" altLang="en-US" smtClean="0"/>
+              <a:t>2022/12/31</a:t>
             </a:fld>
             <a:endParaRPr kumimoji="1" lang="zh-CN" altLang="en-US"/>
           </a:p>
@@ -900,6 +905,7 @@
           <a:p>
             <a:fld id="{977BA8E6-E826-B147-AA17-E3D76A29629C}" type="slidenum">
               <a:rPr kumimoji="1" lang="zh-CN" altLang="en-US" smtClean="0"/>
+              <a:t>‹#›</a:t>
             </a:fld>
             <a:endParaRPr kumimoji="1" lang="zh-CN" altLang="en-US"/>
           </a:p>
@@ -914,7 +920,7 @@
 </file>
 
 <file path=ppt/slideLayouts/slideLayout10.xml><?xml version="1.0" encoding="utf-8"?>
-<p:sldLayout xmlns:a="http://schemas.openxmlformats.org/drawingml/2006/main" xmlns:r="http://schemas.openxmlformats.org/officeDocument/2006/relationships" xmlns:p="http://schemas.openxmlformats.org/presentationml/2006/main" type="picTx" preserve="1" showMasterSp="0">
+<p:sldLayout xmlns:a="http://schemas.openxmlformats.org/drawingml/2006/main" xmlns:r="http://schemas.openxmlformats.org/officeDocument/2006/relationships" xmlns:p="http://schemas.openxmlformats.org/presentationml/2006/main" showMasterSp="0" type="picTx" preserve="1">
   <p:cSld name="图片与标题">
     <p:spTree>
       <p:nvGrpSpPr>
@@ -1102,7 +1108,6 @@
               <a:rPr lang="zh-CN" altLang="en-US" dirty="0"/>
               <a:t>单击此处编辑母版文本样式</a:t>
             </a:r>
-            <a:endParaRPr lang="zh-CN" altLang="en-US" dirty="0"/>
           </a:p>
         </p:txBody>
       </p:sp>
@@ -1123,6 +1128,7 @@
           <a:p>
             <a:fld id="{E4551058-E5DB-324A-A8E9-6D3BEF243C3B}" type="datetimeFigureOut">
               <a:rPr kumimoji="1" lang="zh-CN" altLang="en-US" smtClean="0"/>
+              <a:t>2022/12/31</a:t>
             </a:fld>
             <a:endParaRPr kumimoji="1" lang="zh-CN" altLang="en-US"/>
           </a:p>
@@ -1164,6 +1170,7 @@
           <a:p>
             <a:fld id="{977BA8E6-E826-B147-AA17-E3D76A29629C}" type="slidenum">
               <a:rPr kumimoji="1" lang="zh-CN" altLang="en-US" smtClean="0"/>
+              <a:t>‹#›</a:t>
             </a:fld>
             <a:endParaRPr kumimoji="1" lang="zh-CN" altLang="en-US"/>
           </a:p>
@@ -1285,7 +1292,6 @@
               <a:rPr lang="zh-CN" altLang="en-US"/>
               <a:t>单击此处编辑母版文本样式</a:t>
             </a:r>
-            <a:endParaRPr lang="zh-CN" altLang="en-US"/>
           </a:p>
           <a:p>
             <a:pPr lvl="1"/>
@@ -1293,7 +1299,6 @@
               <a:rPr lang="zh-CN" altLang="en-US"/>
               <a:t>二级</a:t>
             </a:r>
-            <a:endParaRPr lang="zh-CN" altLang="en-US"/>
           </a:p>
           <a:p>
             <a:pPr lvl="2"/>
@@ -1301,7 +1306,6 @@
               <a:rPr lang="zh-CN" altLang="en-US"/>
               <a:t>三级</a:t>
             </a:r>
-            <a:endParaRPr lang="zh-CN" altLang="en-US"/>
           </a:p>
           <a:p>
             <a:pPr lvl="3"/>
@@ -1309,7 +1313,6 @@
               <a:rPr lang="zh-CN" altLang="en-US"/>
               <a:t>四级</a:t>
             </a:r>
-            <a:endParaRPr lang="zh-CN" altLang="en-US"/>
           </a:p>
           <a:p>
             <a:pPr lvl="4"/>
@@ -1338,6 +1341,7 @@
           <a:p>
             <a:fld id="{E4551058-E5DB-324A-A8E9-6D3BEF243C3B}" type="datetimeFigureOut">
               <a:rPr kumimoji="1" lang="zh-CN" altLang="en-US" smtClean="0"/>
+              <a:t>2022/12/31</a:t>
             </a:fld>
             <a:endParaRPr kumimoji="1" lang="zh-CN" altLang="en-US"/>
           </a:p>
@@ -1379,6 +1383,7 @@
           <a:p>
             <a:fld id="{977BA8E6-E826-B147-AA17-E3D76A29629C}" type="slidenum">
               <a:rPr kumimoji="1" lang="zh-CN" altLang="en-US" smtClean="0"/>
+              <a:t>‹#›</a:t>
             </a:fld>
             <a:endParaRPr kumimoji="1" lang="zh-CN" altLang="en-US"/>
           </a:p>
@@ -1403,7 +1408,6 @@
               <a:rPr kumimoji="1" lang="zh-CN" altLang="en-US"/>
               <a:t>单击此处编辑母版标题样式</a:t>
             </a:r>
-            <a:endParaRPr kumimoji="1" lang="zh-CN" altLang="en-US"/>
           </a:p>
         </p:txBody>
       </p:sp>
@@ -1416,7 +1420,7 @@
 </file>
 
 <file path=ppt/slideLayouts/slideLayout12.xml><?xml version="1.0" encoding="utf-8"?>
-<p:sldLayout xmlns:a="http://schemas.openxmlformats.org/drawingml/2006/main" xmlns:r="http://schemas.openxmlformats.org/officeDocument/2006/relationships" xmlns:p="http://schemas.openxmlformats.org/presentationml/2006/main" preserve="1" showMasterSp="0" userDrawn="1">
+<p:sldLayout xmlns:a="http://schemas.openxmlformats.org/drawingml/2006/main" xmlns:r="http://schemas.openxmlformats.org/officeDocument/2006/relationships" xmlns:p="http://schemas.openxmlformats.org/presentationml/2006/main" showMasterSp="0" preserve="1" userDrawn="1">
   <p:cSld name="竖排标题与文本">
     <p:spTree>
       <p:nvGrpSpPr>
@@ -1527,7 +1531,6 @@
               <a:rPr lang="zh-CN" altLang="en-US"/>
               <a:t>单击此处编辑母版文本样式</a:t>
             </a:r>
-            <a:endParaRPr lang="zh-CN" altLang="en-US"/>
           </a:p>
           <a:p>
             <a:pPr lvl="1"/>
@@ -1535,7 +1538,6 @@
               <a:rPr lang="zh-CN" altLang="en-US"/>
               <a:t>二级</a:t>
             </a:r>
-            <a:endParaRPr lang="zh-CN" altLang="en-US"/>
           </a:p>
           <a:p>
             <a:pPr lvl="2"/>
@@ -1543,7 +1545,6 @@
               <a:rPr lang="zh-CN" altLang="en-US"/>
               <a:t>三级</a:t>
             </a:r>
-            <a:endParaRPr lang="zh-CN" altLang="en-US"/>
           </a:p>
           <a:p>
             <a:pPr lvl="3"/>
@@ -1551,7 +1552,6 @@
               <a:rPr lang="zh-CN" altLang="en-US"/>
               <a:t>四级</a:t>
             </a:r>
-            <a:endParaRPr lang="zh-CN" altLang="en-US"/>
           </a:p>
           <a:p>
             <a:pPr lvl="4"/>
@@ -1580,6 +1580,7 @@
           <a:p>
             <a:fld id="{E4551058-E5DB-324A-A8E9-6D3BEF243C3B}" type="datetimeFigureOut">
               <a:rPr kumimoji="1" lang="zh-CN" altLang="en-US" smtClean="0"/>
+              <a:t>2022/12/31</a:t>
             </a:fld>
             <a:endParaRPr kumimoji="1" lang="zh-CN" altLang="en-US"/>
           </a:p>
@@ -1621,6 +1622,7 @@
           <a:p>
             <a:fld id="{977BA8E6-E826-B147-AA17-E3D76A29629C}" type="slidenum">
               <a:rPr kumimoji="1" lang="zh-CN" altLang="en-US" smtClean="0"/>
+              <a:t>‹#›</a:t>
             </a:fld>
             <a:endParaRPr kumimoji="1" lang="zh-CN" altLang="en-US"/>
           </a:p>
@@ -1731,7 +1733,6 @@
               <a:rPr lang="zh-CN" altLang="en-US"/>
               <a:t>单击此处编辑母版文本样式</a:t>
             </a:r>
-            <a:endParaRPr lang="zh-CN" altLang="en-US"/>
           </a:p>
           <a:p>
             <a:pPr lvl="1"/>
@@ -1739,7 +1740,6 @@
               <a:rPr lang="zh-CN" altLang="en-US"/>
               <a:t>二级</a:t>
             </a:r>
-            <a:endParaRPr lang="zh-CN" altLang="en-US"/>
           </a:p>
           <a:p>
             <a:pPr lvl="2"/>
@@ -1747,7 +1747,6 @@
               <a:rPr lang="zh-CN" altLang="en-US"/>
               <a:t>三级</a:t>
             </a:r>
-            <a:endParaRPr lang="zh-CN" altLang="en-US"/>
           </a:p>
           <a:p>
             <a:pPr lvl="3"/>
@@ -1755,7 +1754,6 @@
               <a:rPr lang="zh-CN" altLang="en-US"/>
               <a:t>四级</a:t>
             </a:r>
-            <a:endParaRPr lang="zh-CN" altLang="en-US"/>
           </a:p>
           <a:p>
             <a:pPr lvl="4"/>
@@ -1786,7 +1784,6 @@
               <a:rPr kumimoji="1" lang="zh-CN" altLang="en-US"/>
               <a:t>单击此处编辑母版标题样式</a:t>
             </a:r>
-            <a:endParaRPr kumimoji="1" lang="zh-CN" altLang="en-US"/>
           </a:p>
         </p:txBody>
       </p:sp>
@@ -1807,6 +1804,7 @@
           <a:p>
             <a:fld id="{E4551058-E5DB-324A-A8E9-6D3BEF243C3B}" type="datetimeFigureOut">
               <a:rPr kumimoji="1" lang="zh-CN" altLang="en-US" smtClean="0"/>
+              <a:t>2022/12/31</a:t>
             </a:fld>
             <a:endParaRPr kumimoji="1" lang="zh-CN" altLang="en-US"/>
           </a:p>
@@ -1848,6 +1846,7 @@
           <a:p>
             <a:fld id="{977BA8E6-E826-B147-AA17-E3D76A29629C}" type="slidenum">
               <a:rPr kumimoji="1" lang="zh-CN" altLang="en-US" smtClean="0"/>
+              <a:t>‹#›</a:t>
             </a:fld>
             <a:endParaRPr kumimoji="1" lang="zh-CN" altLang="en-US"/>
           </a:p>
@@ -1862,7 +1861,7 @@
 </file>
 
 <file path=ppt/slideLayouts/slideLayout3.xml><?xml version="1.0" encoding="utf-8"?>
-<p:sldLayout xmlns:a="http://schemas.openxmlformats.org/drawingml/2006/main" xmlns:r="http://schemas.openxmlformats.org/officeDocument/2006/relationships" xmlns:p="http://schemas.openxmlformats.org/presentationml/2006/main" preserve="1" showMasterSp="0" userDrawn="1">
+<p:sldLayout xmlns:a="http://schemas.openxmlformats.org/drawingml/2006/main" xmlns:r="http://schemas.openxmlformats.org/officeDocument/2006/relationships" xmlns:p="http://schemas.openxmlformats.org/presentationml/2006/main" showMasterSp="0" preserve="1" userDrawn="1">
   <p:cSld name="目录">
     <p:spTree>
       <p:nvGrpSpPr>
@@ -1921,7 +1920,6 @@
               <a:rPr lang="zh-CN" altLang="en-US" dirty="0"/>
               <a:t>单击此处编辑母版文本样式</a:t>
             </a:r>
-            <a:endParaRPr lang="zh-CN" altLang="en-US" dirty="0"/>
           </a:p>
           <a:p>
             <a:pPr lvl="1"/>
@@ -1929,7 +1927,6 @@
               <a:rPr lang="zh-CN" altLang="en-US" dirty="0"/>
               <a:t>二级</a:t>
             </a:r>
-            <a:endParaRPr lang="zh-CN" altLang="en-US" dirty="0"/>
           </a:p>
           <a:p>
             <a:pPr lvl="2"/>
@@ -1937,7 +1934,6 @@
               <a:rPr lang="zh-CN" altLang="en-US" dirty="0"/>
               <a:t>三级</a:t>
             </a:r>
-            <a:endParaRPr lang="zh-CN" altLang="en-US" dirty="0"/>
           </a:p>
           <a:p>
             <a:pPr lvl="3"/>
@@ -1945,7 +1941,6 @@
               <a:rPr lang="zh-CN" altLang="en-US" dirty="0"/>
               <a:t>四级</a:t>
             </a:r>
-            <a:endParaRPr lang="zh-CN" altLang="en-US" dirty="0"/>
           </a:p>
           <a:p>
             <a:pPr lvl="4"/>
@@ -1979,6 +1974,7 @@
           <a:p>
             <a:fld id="{E4551058-E5DB-324A-A8E9-6D3BEF243C3B}" type="datetimeFigureOut">
               <a:rPr kumimoji="1" lang="zh-CN" altLang="en-US" smtClean="0"/>
+              <a:t>2022/12/31</a:t>
             </a:fld>
             <a:endParaRPr kumimoji="1" lang="zh-CN" altLang="en-US"/>
           </a:p>
@@ -2030,6 +2026,7 @@
           <a:p>
             <a:fld id="{977BA8E6-E826-B147-AA17-E3D76A29629C}" type="slidenum">
               <a:rPr kumimoji="1" lang="zh-CN" altLang="en-US" smtClean="0"/>
+              <a:t>‹#›</a:t>
             </a:fld>
             <a:endParaRPr kumimoji="1" lang="zh-CN" altLang="en-US"/>
           </a:p>
@@ -2173,7 +2170,7 @@
 </file>
 
 <file path=ppt/slideLayouts/slideLayout4.xml><?xml version="1.0" encoding="utf-8"?>
-<p:sldLayout xmlns:a="http://schemas.openxmlformats.org/drawingml/2006/main" xmlns:r="http://schemas.openxmlformats.org/officeDocument/2006/relationships" xmlns:p="http://schemas.openxmlformats.org/presentationml/2006/main" preserve="1" showMasterSp="0" userDrawn="1">
+<p:sldLayout xmlns:a="http://schemas.openxmlformats.org/drawingml/2006/main" xmlns:r="http://schemas.openxmlformats.org/officeDocument/2006/relationships" xmlns:p="http://schemas.openxmlformats.org/presentationml/2006/main" showMasterSp="0" preserve="1" userDrawn="1">
   <p:cSld name="节标题">
     <p:spTree>
       <p:nvGrpSpPr>
@@ -2481,6 +2478,7 @@
           <a:p>
             <a:fld id="{E4551058-E5DB-324A-A8E9-6D3BEF243C3B}" type="datetimeFigureOut">
               <a:rPr kumimoji="1" lang="zh-CN" altLang="en-US" smtClean="0"/>
+              <a:t>2022/12/31</a:t>
             </a:fld>
             <a:endParaRPr kumimoji="1" lang="zh-CN" altLang="en-US"/>
           </a:p>
@@ -2532,6 +2530,7 @@
           <a:p>
             <a:fld id="{977BA8E6-E826-B147-AA17-E3D76A29629C}" type="slidenum">
               <a:rPr kumimoji="1" lang="zh-CN" altLang="en-US" smtClean="0"/>
+              <a:t>‹#›</a:t>
             </a:fld>
             <a:endParaRPr kumimoji="1" lang="zh-CN" altLang="en-US"/>
           </a:p>
@@ -2644,7 +2643,6 @@
               <a:rPr lang="zh-CN" altLang="en-US"/>
               <a:t>单击此处编辑母版文本样式</a:t>
             </a:r>
-            <a:endParaRPr lang="zh-CN" altLang="en-US"/>
           </a:p>
           <a:p>
             <a:pPr lvl="1"/>
@@ -2652,7 +2650,6 @@
               <a:rPr lang="zh-CN" altLang="en-US"/>
               <a:t>二级</a:t>
             </a:r>
-            <a:endParaRPr lang="zh-CN" altLang="en-US"/>
           </a:p>
           <a:p>
             <a:pPr lvl="2"/>
@@ -2660,7 +2657,6 @@
               <a:rPr lang="zh-CN" altLang="en-US"/>
               <a:t>三级</a:t>
             </a:r>
-            <a:endParaRPr lang="zh-CN" altLang="en-US"/>
           </a:p>
           <a:p>
             <a:pPr lvl="3"/>
@@ -2668,7 +2664,6 @@
               <a:rPr lang="zh-CN" altLang="en-US"/>
               <a:t>四级</a:t>
             </a:r>
-            <a:endParaRPr lang="zh-CN" altLang="en-US"/>
           </a:p>
           <a:p>
             <a:pPr lvl="4"/>
@@ -2707,7 +2702,6 @@
               <a:rPr lang="zh-CN" altLang="en-US"/>
               <a:t>单击此处编辑母版文本样式</a:t>
             </a:r>
-            <a:endParaRPr lang="zh-CN" altLang="en-US"/>
           </a:p>
           <a:p>
             <a:pPr lvl="1"/>
@@ -2715,7 +2709,6 @@
               <a:rPr lang="zh-CN" altLang="en-US"/>
               <a:t>二级</a:t>
             </a:r>
-            <a:endParaRPr lang="zh-CN" altLang="en-US"/>
           </a:p>
           <a:p>
             <a:pPr lvl="2"/>
@@ -2723,7 +2716,6 @@
               <a:rPr lang="zh-CN" altLang="en-US"/>
               <a:t>三级</a:t>
             </a:r>
-            <a:endParaRPr lang="zh-CN" altLang="en-US"/>
           </a:p>
           <a:p>
             <a:pPr lvl="3"/>
@@ -2731,7 +2723,6 @@
               <a:rPr lang="zh-CN" altLang="en-US"/>
               <a:t>四级</a:t>
             </a:r>
-            <a:endParaRPr lang="zh-CN" altLang="en-US"/>
           </a:p>
           <a:p>
             <a:pPr lvl="4"/>
@@ -2760,6 +2751,7 @@
           <a:p>
             <a:fld id="{E4551058-E5DB-324A-A8E9-6D3BEF243C3B}" type="datetimeFigureOut">
               <a:rPr kumimoji="1" lang="zh-CN" altLang="en-US" smtClean="0"/>
+              <a:t>2022/12/31</a:t>
             </a:fld>
             <a:endParaRPr kumimoji="1" lang="zh-CN" altLang="en-US"/>
           </a:p>
@@ -2801,6 +2793,7 @@
           <a:p>
             <a:fld id="{977BA8E6-E826-B147-AA17-E3D76A29629C}" type="slidenum">
               <a:rPr kumimoji="1" lang="zh-CN" altLang="en-US" smtClean="0"/>
+              <a:t>‹#›</a:t>
             </a:fld>
             <a:endParaRPr kumimoji="1" lang="zh-CN" altLang="en-US"/>
           </a:p>
@@ -2825,7 +2818,6 @@
               <a:rPr kumimoji="1" lang="zh-CN" altLang="en-US"/>
               <a:t>单击此处编辑母版标题样式</a:t>
             </a:r>
-            <a:endParaRPr kumimoji="1" lang="zh-CN" altLang="en-US"/>
           </a:p>
         </p:txBody>
       </p:sp>
@@ -2922,7 +2914,6 @@
               <a:rPr lang="zh-CN" altLang="en-US"/>
               <a:t>单击此处编辑母版文本样式</a:t>
             </a:r>
-            <a:endParaRPr lang="zh-CN" altLang="en-US"/>
           </a:p>
         </p:txBody>
       </p:sp>
@@ -2953,7 +2944,6 @@
               <a:rPr lang="zh-CN" altLang="en-US"/>
               <a:t>单击此处编辑母版文本样式</a:t>
             </a:r>
-            <a:endParaRPr lang="zh-CN" altLang="en-US"/>
           </a:p>
           <a:p>
             <a:pPr lvl="1"/>
@@ -2961,7 +2951,6 @@
               <a:rPr lang="zh-CN" altLang="en-US"/>
               <a:t>二级</a:t>
             </a:r>
-            <a:endParaRPr lang="zh-CN" altLang="en-US"/>
           </a:p>
           <a:p>
             <a:pPr lvl="2"/>
@@ -2969,7 +2958,6 @@
               <a:rPr lang="zh-CN" altLang="en-US"/>
               <a:t>三级</a:t>
             </a:r>
-            <a:endParaRPr lang="zh-CN" altLang="en-US"/>
           </a:p>
           <a:p>
             <a:pPr lvl="3"/>
@@ -2977,7 +2965,6 @@
               <a:rPr lang="zh-CN" altLang="en-US"/>
               <a:t>四级</a:t>
             </a:r>
-            <a:endParaRPr lang="zh-CN" altLang="en-US"/>
           </a:p>
           <a:p>
             <a:pPr lvl="4"/>
@@ -3057,7 +3044,6 @@
               <a:rPr lang="zh-CN" altLang="en-US"/>
               <a:t>单击此处编辑母版文本样式</a:t>
             </a:r>
-            <a:endParaRPr lang="zh-CN" altLang="en-US"/>
           </a:p>
         </p:txBody>
       </p:sp>
@@ -3088,7 +3074,6 @@
               <a:rPr lang="zh-CN" altLang="en-US"/>
               <a:t>单击此处编辑母版文本样式</a:t>
             </a:r>
-            <a:endParaRPr lang="zh-CN" altLang="en-US"/>
           </a:p>
           <a:p>
             <a:pPr lvl="1"/>
@@ -3096,7 +3081,6 @@
               <a:rPr lang="zh-CN" altLang="en-US"/>
               <a:t>二级</a:t>
             </a:r>
-            <a:endParaRPr lang="zh-CN" altLang="en-US"/>
           </a:p>
           <a:p>
             <a:pPr lvl="2"/>
@@ -3104,7 +3088,6 @@
               <a:rPr lang="zh-CN" altLang="en-US"/>
               <a:t>三级</a:t>
             </a:r>
-            <a:endParaRPr lang="zh-CN" altLang="en-US"/>
           </a:p>
           <a:p>
             <a:pPr lvl="3"/>
@@ -3112,7 +3095,6 @@
               <a:rPr lang="zh-CN" altLang="en-US"/>
               <a:t>四级</a:t>
             </a:r>
-            <a:endParaRPr lang="zh-CN" altLang="en-US"/>
           </a:p>
           <a:p>
             <a:pPr lvl="4"/>
@@ -3141,6 +3123,7 @@
           <a:p>
             <a:fld id="{E4551058-E5DB-324A-A8E9-6D3BEF243C3B}" type="datetimeFigureOut">
               <a:rPr kumimoji="1" lang="zh-CN" altLang="en-US" smtClean="0"/>
+              <a:t>2022/12/31</a:t>
             </a:fld>
             <a:endParaRPr kumimoji="1" lang="zh-CN" altLang="en-US"/>
           </a:p>
@@ -3182,6 +3165,7 @@
           <a:p>
             <a:fld id="{977BA8E6-E826-B147-AA17-E3D76A29629C}" type="slidenum">
               <a:rPr kumimoji="1" lang="zh-CN" altLang="en-US" smtClean="0"/>
+              <a:t>‹#›</a:t>
             </a:fld>
             <a:endParaRPr kumimoji="1" lang="zh-CN" altLang="en-US"/>
           </a:p>
@@ -3206,7 +3190,6 @@
               <a:rPr kumimoji="1" lang="zh-CN" altLang="en-US"/>
               <a:t>单击此处编辑母版标题样式</a:t>
             </a:r>
-            <a:endParaRPr kumimoji="1" lang="zh-CN" altLang="en-US"/>
           </a:p>
         </p:txBody>
       </p:sp>
@@ -3252,6 +3235,7 @@
           <a:p>
             <a:fld id="{E4551058-E5DB-324A-A8E9-6D3BEF243C3B}" type="datetimeFigureOut">
               <a:rPr kumimoji="1" lang="zh-CN" altLang="en-US" smtClean="0"/>
+              <a:t>2022/12/31</a:t>
             </a:fld>
             <a:endParaRPr kumimoji="1" lang="zh-CN" altLang="en-US"/>
           </a:p>
@@ -3293,6 +3277,7 @@
           <a:p>
             <a:fld id="{977BA8E6-E826-B147-AA17-E3D76A29629C}" type="slidenum">
               <a:rPr kumimoji="1" lang="zh-CN" altLang="en-US" smtClean="0"/>
+              <a:t>‹#›</a:t>
             </a:fld>
             <a:endParaRPr kumimoji="1" lang="zh-CN" altLang="en-US"/>
           </a:p>
@@ -3317,7 +3302,6 @@
               <a:rPr kumimoji="1" lang="zh-CN" altLang="en-US"/>
               <a:t>单击此处编辑母版标题样式</a:t>
             </a:r>
-            <a:endParaRPr kumimoji="1" lang="zh-CN" altLang="en-US"/>
           </a:p>
         </p:txBody>
       </p:sp>
@@ -3330,7 +3314,7 @@
 </file>
 
 <file path=ppt/slideLayouts/slideLayout8.xml><?xml version="1.0" encoding="utf-8"?>
-<p:sldLayout xmlns:a="http://schemas.openxmlformats.org/drawingml/2006/main" xmlns:r="http://schemas.openxmlformats.org/officeDocument/2006/relationships" xmlns:p="http://schemas.openxmlformats.org/presentationml/2006/main" type="blank" preserve="1" showMasterSp="0">
+<p:sldLayout xmlns:a="http://schemas.openxmlformats.org/drawingml/2006/main" xmlns:r="http://schemas.openxmlformats.org/officeDocument/2006/relationships" xmlns:p="http://schemas.openxmlformats.org/presentationml/2006/main" showMasterSp="0" type="blank" preserve="1">
   <p:cSld name="空白">
     <p:spTree>
       <p:nvGrpSpPr>
@@ -3363,6 +3347,7 @@
           <a:p>
             <a:fld id="{E4551058-E5DB-324A-A8E9-6D3BEF243C3B}" type="datetimeFigureOut">
               <a:rPr kumimoji="1" lang="zh-CN" altLang="en-US" smtClean="0"/>
+              <a:t>2022/12/31</a:t>
             </a:fld>
             <a:endParaRPr kumimoji="1" lang="zh-CN" altLang="en-US"/>
           </a:p>
@@ -3404,6 +3389,7 @@
           <a:p>
             <a:fld id="{977BA8E6-E826-B147-AA17-E3D76A29629C}" type="slidenum">
               <a:rPr kumimoji="1" lang="zh-CN" altLang="en-US" smtClean="0"/>
+              <a:t>‹#›</a:t>
             </a:fld>
             <a:endParaRPr kumimoji="1" lang="zh-CN" altLang="en-US"/>
           </a:p>
@@ -3473,7 +3459,7 @@
 </file>
 
 <file path=ppt/slideLayouts/slideLayout9.xml><?xml version="1.0" encoding="utf-8"?>
-<p:sldLayout xmlns:a="http://schemas.openxmlformats.org/drawingml/2006/main" xmlns:r="http://schemas.openxmlformats.org/officeDocument/2006/relationships" xmlns:p="http://schemas.openxmlformats.org/presentationml/2006/main" type="objTx" preserve="1" showMasterSp="0">
+<p:sldLayout xmlns:a="http://schemas.openxmlformats.org/drawingml/2006/main" xmlns:r="http://schemas.openxmlformats.org/officeDocument/2006/relationships" xmlns:p="http://schemas.openxmlformats.org/presentationml/2006/main" showMasterSp="0" type="objTx" preserve="1">
   <p:cSld name="内容与标题">
     <p:spTree>
       <p:nvGrpSpPr>
@@ -3660,7 +3646,6 @@
               <a:rPr lang="zh-CN" altLang="en-US"/>
               <a:t>单击此处编辑母版文本样式</a:t>
             </a:r>
-            <a:endParaRPr lang="zh-CN" altLang="en-US"/>
           </a:p>
           <a:p>
             <a:pPr lvl="1"/>
@@ -3668,7 +3653,6 @@
               <a:rPr lang="zh-CN" altLang="en-US"/>
               <a:t>二级</a:t>
             </a:r>
-            <a:endParaRPr lang="zh-CN" altLang="en-US"/>
           </a:p>
           <a:p>
             <a:pPr lvl="2"/>
@@ -3676,7 +3660,6 @@
               <a:rPr lang="zh-CN" altLang="en-US"/>
               <a:t>三级</a:t>
             </a:r>
-            <a:endParaRPr lang="zh-CN" altLang="en-US"/>
           </a:p>
           <a:p>
             <a:pPr lvl="3"/>
@@ -3684,7 +3667,6 @@
               <a:rPr lang="zh-CN" altLang="en-US"/>
               <a:t>四级</a:t>
             </a:r>
-            <a:endParaRPr lang="zh-CN" altLang="en-US"/>
           </a:p>
           <a:p>
             <a:pPr lvl="4"/>
@@ -3764,7 +3746,6 @@
               <a:rPr lang="zh-CN" altLang="en-US" dirty="0"/>
               <a:t>单击此处编辑母版文本样式</a:t>
             </a:r>
-            <a:endParaRPr lang="zh-CN" altLang="en-US" dirty="0"/>
           </a:p>
         </p:txBody>
       </p:sp>
@@ -3801,6 +3782,7 @@
           <a:p>
             <a:fld id="{E4551058-E5DB-324A-A8E9-6D3BEF243C3B}" type="datetimeFigureOut">
               <a:rPr kumimoji="1" lang="zh-CN" altLang="en-US" smtClean="0"/>
+              <a:t>2022/12/31</a:t>
             </a:fld>
             <a:endParaRPr kumimoji="1" lang="zh-CN" altLang="en-US"/>
           </a:p>
@@ -3874,6 +3856,7 @@
           <a:p>
             <a:fld id="{977BA8E6-E826-B147-AA17-E3D76A29629C}" type="slidenum">
               <a:rPr kumimoji="1" lang="zh-CN" altLang="en-US" smtClean="0"/>
+              <a:t>‹#›</a:t>
             </a:fld>
             <a:endParaRPr kumimoji="1" lang="zh-CN" altLang="en-US"/>
           </a:p>
@@ -3993,7 +3976,6 @@
               <a:rPr kumimoji="1" lang="zh-CN" altLang="en-US" dirty="0"/>
               <a:t>单击此处编辑母版标题样式</a:t>
             </a:r>
-            <a:endParaRPr kumimoji="1" lang="zh-CN" altLang="en-US" dirty="0"/>
           </a:p>
         </p:txBody>
       </p:sp>
@@ -4027,7 +4009,6 @@
               <a:rPr lang="zh-CN" altLang="en-US" dirty="0"/>
               <a:t>单击此处编辑母版文本样式</a:t>
             </a:r>
-            <a:endParaRPr lang="zh-CN" altLang="en-US" dirty="0"/>
           </a:p>
           <a:p>
             <a:pPr lvl="1"/>
@@ -4035,7 +4016,6 @@
               <a:rPr lang="zh-CN" altLang="en-US" dirty="0"/>
               <a:t>二级</a:t>
             </a:r>
-            <a:endParaRPr lang="zh-CN" altLang="en-US" dirty="0"/>
           </a:p>
           <a:p>
             <a:pPr lvl="2"/>
@@ -4043,7 +4023,6 @@
               <a:rPr lang="zh-CN" altLang="en-US" dirty="0"/>
               <a:t>三级</a:t>
             </a:r>
-            <a:endParaRPr lang="zh-CN" altLang="en-US" dirty="0"/>
           </a:p>
           <a:p>
             <a:pPr lvl="3"/>
@@ -4051,7 +4030,6 @@
               <a:rPr lang="zh-CN" altLang="en-US" dirty="0"/>
               <a:t>四级</a:t>
             </a:r>
-            <a:endParaRPr lang="zh-CN" altLang="en-US" dirty="0"/>
           </a:p>
           <a:p>
             <a:pPr lvl="4"/>
@@ -4096,6 +4074,7 @@
           <a:p>
             <a:fld id="{E4551058-E5DB-324A-A8E9-6D3BEF243C3B}" type="datetimeFigureOut">
               <a:rPr kumimoji="1" lang="zh-CN" altLang="en-US" smtClean="0"/>
+              <a:t>2022/12/31</a:t>
             </a:fld>
             <a:endParaRPr kumimoji="1" lang="zh-CN" altLang="en-US"/>
           </a:p>
@@ -4169,6 +4148,7 @@
           <a:p>
             <a:fld id="{977BA8E6-E826-B147-AA17-E3D76A29629C}" type="slidenum">
               <a:rPr kumimoji="1" lang="zh-CN" altLang="en-US" smtClean="0"/>
+              <a:t>‹#›</a:t>
             </a:fld>
             <a:endParaRPr kumimoji="1" lang="zh-CN" altLang="en-US"/>
           </a:p>
@@ -4181,7 +4161,7 @@
           <p:nvPr userDrawn="1"/>
         </p:nvPicPr>
         <p:blipFill rotWithShape="1">
-          <a:blip r:embed="rId13" cstate="print">
+          <a:blip r:embed="rId14" cstate="print">
             <a:clrChange>
               <a:clrFrom>
                 <a:srgbClr val="FEFEFE"/>
@@ -4202,7 +4182,7 @@
             <a:extLst>
               <a:ext uri="{BEBA8EAE-BF5A-486C-A8C5-ECC9F3942E4B}">
                 <a14:imgProps xmlns:a14="http://schemas.microsoft.com/office/drawing/2010/main">
-                  <a14:imgLayer r:embed="rId14">
+                  <a14:imgLayer r:embed="rId15">
                     <a14:imgEffect>
                       <a14:saturation sat="400000"/>
                     </a14:imgEffect>
@@ -4703,37 +4683,40 @@
           <a:p>
             <a:pPr algn="ctr"/>
             <a:r>
-              <a:rPr kumimoji="1" lang="en-US" altLang="zh-CN" dirty="0" smtClean="0"/>
+              <a:rPr kumimoji="1" lang="zh-CN" dirty="0"/>
+              <a:t>用</a:t>
+            </a:r>
+            <a:r>
+              <a:rPr kumimoji="1" altLang="zh-CN" dirty="0"/>
+              <a:t>rust</a:t>
+            </a:r>
+            <a:r>
+              <a:rPr kumimoji="1" lang="zh-CN" altLang="en-US" dirty="0"/>
+              <a:t>语言</a:t>
+            </a:r>
+            <a:r>
+              <a:rPr kumimoji="1" lang="zh-CN" dirty="0"/>
+              <a:t>实现</a:t>
+            </a:r>
+            <a:r>
+              <a:rPr kumimoji="1" altLang="zh-CN" dirty="0"/>
               <a:t>sel4</a:t>
             </a:r>
-            <a:r>
-              <a:rPr kumimoji="1" lang="zh-CN" altLang="zh-CN" dirty="0" smtClean="0"/>
-              <a:t>的</a:t>
-            </a:r>
-            <a:r>
-              <a:rPr kumimoji="1" altLang="zh-CN" dirty="0" smtClean="0"/>
-              <a:t>rust</a:t>
-            </a:r>
-            <a:r>
-              <a:rPr kumimoji="1" lang="zh-CN" dirty="0" smtClean="0"/>
-              <a:t>化</a:t>
-            </a:r>
             <a:br>
-              <a:rPr kumimoji="1" lang="en-US" altLang="zh-CN" dirty="0" smtClean="0"/>
+              <a:rPr kumimoji="1" lang="en-US" altLang="zh-CN" dirty="0"/>
             </a:br>
             <a:r>
-              <a:rPr kumimoji="1" lang="en-US" altLang="zh-CN" dirty="0" smtClean="0"/>
+              <a:rPr kumimoji="1" lang="en-US" altLang="zh-CN" dirty="0"/>
               <a:t>      </a:t>
             </a:r>
             <a:r>
-              <a:rPr kumimoji="1" altLang="zh-CN" sz="2400" dirty="0" smtClean="0"/>
+              <a:rPr kumimoji="1" altLang="zh-CN" sz="2400" dirty="0"/>
               <a:t>——</a:t>
             </a:r>
             <a:r>
-              <a:rPr kumimoji="1" lang="zh-CN" altLang="en-US" sz="2400" dirty="0" smtClean="0"/>
+              <a:rPr kumimoji="1" lang="zh-CN" altLang="en-US" sz="2400" dirty="0"/>
               <a:t>毕业设计开题报告</a:t>
             </a:r>
-            <a:endParaRPr kumimoji="1" lang="zh-CN" altLang="en-US" sz="2400" dirty="0"/>
           </a:p>
         </p:txBody>
       </p:sp>
@@ -4755,52 +4738,43 @@
           <a:lstStyle/>
           <a:p>
             <a:r>
-              <a:rPr kumimoji="1" lang="zh-CN" altLang="en-US" dirty="0" smtClean="0"/>
+              <a:rPr kumimoji="1" lang="zh-CN" altLang="en-US" dirty="0"/>
               <a:t>清华大学计算机系 李龙昊</a:t>
             </a:r>
             <a:endParaRPr kumimoji="1" lang="en-US" altLang="zh-CN" dirty="0"/>
           </a:p>
           <a:p>
             <a:r>
-              <a:rPr kumimoji="1" lang="en-US" altLang="zh-CN" dirty="0" smtClean="0"/>
+              <a:rPr kumimoji="1" lang="en-US" altLang="zh-CN" dirty="0"/>
               <a:t>2022</a:t>
             </a:r>
             <a:r>
-              <a:rPr kumimoji="1" lang="zh-CN" altLang="en-US" dirty="0" smtClean="0"/>
+              <a:rPr kumimoji="1" lang="zh-CN" altLang="en-US" dirty="0"/>
               <a:t>年</a:t>
             </a:r>
             <a:r>
-              <a:rPr kumimoji="1" lang="en-US" altLang="zh-CN" dirty="0" smtClean="0"/>
+              <a:rPr kumimoji="1" lang="en-US" altLang="zh-CN" dirty="0"/>
               <a:t>12</a:t>
             </a:r>
             <a:r>
-              <a:rPr kumimoji="1" lang="zh-CN" altLang="en-US" dirty="0" smtClean="0"/>
+              <a:rPr kumimoji="1" lang="zh-CN" altLang="en-US" dirty="0"/>
               <a:t>月</a:t>
             </a:r>
             <a:r>
-              <a:rPr kumimoji="1" lang="en-US" altLang="zh-CN" dirty="0" smtClean="0"/>
-              <a:t>8</a:t>
-            </a:r>
-            <a:r>
-              <a:rPr kumimoji="1" lang="zh-CN" altLang="en-US" dirty="0" smtClean="0"/>
+              <a:rPr kumimoji="1" lang="en-US" altLang="zh-CN" dirty="0"/>
+              <a:t>31</a:t>
+            </a:r>
+            <a:r>
+              <a:rPr kumimoji="1" lang="zh-CN" altLang="en-US" dirty="0"/>
               <a:t>日</a:t>
             </a:r>
-            <a:endParaRPr kumimoji="1" lang="en-US" altLang="zh-CN" dirty="0" smtClean="0"/>
+            <a:endParaRPr kumimoji="1" lang="en-US" altLang="zh-CN" dirty="0"/>
           </a:p>
           <a:p>
             <a:r>
               <a:rPr kumimoji="1" lang="zh-CN" altLang="en-US" dirty="0"/>
-              <a:t>指导</a:t>
-            </a:r>
-            <a:r>
-              <a:rPr kumimoji="1" lang="zh-CN" altLang="en-US" dirty="0" smtClean="0"/>
-              <a:t>教师：</a:t>
-            </a:r>
-            <a:r>
-              <a:rPr kumimoji="1" lang="zh-CN" altLang="en-US" dirty="0" smtClean="0"/>
-              <a:t>王生原</a:t>
-            </a:r>
-            <a:endParaRPr kumimoji="1" lang="zh-CN" altLang="en-US" dirty="0" smtClean="0"/>
+              <a:t>指导教师：王生原、张福新</a:t>
+            </a:r>
           </a:p>
         </p:txBody>
       </p:sp>
@@ -4809,13 +4783,327 @@
   <p:clrMapOvr>
     <a:masterClrMapping/>
   </p:clrMapOvr>
-  <p:timing>
-    <p:tnLst>
-      <p:par>
-        <p:cTn id="1" dur="indefinite" restart="never" nodeType="tmRoot"/>
-      </p:par>
-    </p:tnLst>
-  </p:timing>
+</p:sld>
+</file>
+
+<file path=ppt/slides/slide10.xml><?xml version="1.0" encoding="utf-8"?>
+<p:sld xmlns:a="http://schemas.openxmlformats.org/drawingml/2006/main" xmlns:r="http://schemas.openxmlformats.org/officeDocument/2006/relationships" xmlns:p="http://schemas.openxmlformats.org/presentationml/2006/main">
+  <p:cSld>
+    <p:spTree>
+      <p:nvGrpSpPr>
+        <p:cNvPr id="1" name=""/>
+        <p:cNvGrpSpPr/>
+        <p:nvPr/>
+      </p:nvGrpSpPr>
+      <p:grpSpPr>
+        <a:xfrm>
+          <a:off x="0" y="0"/>
+          <a:ext cx="0" cy="0"/>
+          <a:chOff x="0" y="0"/>
+          <a:chExt cx="0" cy="0"/>
+        </a:xfrm>
+      </p:grpSpPr>
+      <p:sp>
+        <p:nvSpPr>
+          <p:cNvPr id="2" name="内容占位符 1"/>
+          <p:cNvSpPr>
+            <a:spLocks noGrp="1"/>
+          </p:cNvSpPr>
+          <p:nvPr>
+            <p:ph idx="1"/>
+          </p:nvPr>
+        </p:nvSpPr>
+        <p:spPr>
+          <a:xfrm>
+            <a:off x="835307" y="2048614"/>
+            <a:ext cx="10521387" cy="4448778"/>
+          </a:xfrm>
+        </p:spPr>
+        <p:txBody>
+          <a:bodyPr>
+            <a:normAutofit/>
+          </a:bodyPr>
+          <a:lstStyle/>
+          <a:p>
+            <a:r>
+              <a:rPr kumimoji="1" lang="zh-CN" altLang="en-US" dirty="0"/>
+              <a:t>开题</a:t>
+            </a:r>
+            <a:r>
+              <a:rPr kumimoji="1" lang="en-US" altLang="zh-CN" dirty="0"/>
+              <a:t>——</a:t>
+            </a:r>
+            <a:r>
+              <a:rPr kumimoji="1" lang="zh-CN" altLang="en-US" dirty="0"/>
+              <a:t>开题两周后</a:t>
+            </a:r>
+            <a:endParaRPr kumimoji="1" lang="en-US" altLang="zh-CN" dirty="0"/>
+          </a:p>
+          <a:p>
+            <a:pPr lvl="1"/>
+            <a:r>
+              <a:rPr kumimoji="1" lang="zh-CN" altLang="en-US" dirty="0"/>
+              <a:t>完成</a:t>
+            </a:r>
+            <a:r>
+              <a:rPr kumimoji="1" lang="en-US" altLang="zh-CN" dirty="0" err="1"/>
+              <a:t>elfloader</a:t>
+            </a:r>
+            <a:r>
+              <a:rPr kumimoji="1" lang="zh-CN" altLang="en-US" dirty="0"/>
+              <a:t>部分的迁移</a:t>
+            </a:r>
+            <a:endParaRPr kumimoji="1" lang="en-US" altLang="zh-CN" dirty="0"/>
+          </a:p>
+          <a:p>
+            <a:r>
+              <a:rPr kumimoji="1" lang="zh-CN" altLang="en-US" dirty="0"/>
+              <a:t>开题两周后</a:t>
+            </a:r>
+            <a:r>
+              <a:rPr kumimoji="1" lang="en-US" altLang="zh-CN" dirty="0"/>
+              <a:t>——</a:t>
+            </a:r>
+            <a:r>
+              <a:rPr kumimoji="1" lang="zh-CN" altLang="en-US" dirty="0"/>
+              <a:t>开学前后</a:t>
+            </a:r>
+            <a:endParaRPr kumimoji="1" lang="en-US" altLang="zh-CN" dirty="0"/>
+          </a:p>
+          <a:p>
+            <a:pPr lvl="1"/>
+            <a:r>
+              <a:rPr kumimoji="1" lang="zh-CN" altLang="en-US" dirty="0"/>
+              <a:t>完成</a:t>
+            </a:r>
+            <a:r>
+              <a:rPr kumimoji="1" lang="en-US" altLang="zh-CN" dirty="0"/>
+              <a:t>sel4</a:t>
+            </a:r>
+            <a:r>
+              <a:rPr kumimoji="1" lang="zh-CN" altLang="en-US" dirty="0"/>
+              <a:t>内核对象的</a:t>
+            </a:r>
+            <a:r>
+              <a:rPr kumimoji="1" lang="en-US" altLang="zh-CN" dirty="0"/>
+              <a:t>rust</a:t>
+            </a:r>
+            <a:r>
+              <a:rPr kumimoji="1" lang="zh-CN" altLang="en-US" dirty="0"/>
+              <a:t>实现</a:t>
+            </a:r>
+            <a:endParaRPr kumimoji="1" lang="en-US" altLang="zh-CN" dirty="0"/>
+          </a:p>
+          <a:p>
+            <a:r>
+              <a:rPr kumimoji="1" lang="zh-CN" altLang="en-US" dirty="0"/>
+              <a:t>开学前后</a:t>
+            </a:r>
+            <a:r>
+              <a:rPr kumimoji="1" lang="en-US" altLang="zh-CN" dirty="0"/>
+              <a:t>——</a:t>
+            </a:r>
+            <a:r>
+              <a:rPr kumimoji="1" lang="zh-CN" altLang="en-US" dirty="0"/>
+              <a:t>中期前后</a:t>
+            </a:r>
+            <a:endParaRPr kumimoji="1" lang="en-US" altLang="zh-CN" dirty="0"/>
+          </a:p>
+          <a:p>
+            <a:pPr lvl="1"/>
+            <a:r>
+              <a:rPr kumimoji="1" lang="zh-CN" altLang="en-US" dirty="0"/>
+              <a:t>完成</a:t>
+            </a:r>
+            <a:r>
+              <a:rPr kumimoji="1" lang="en-US" altLang="zh-CN" dirty="0"/>
+              <a:t>sel4</a:t>
+            </a:r>
+            <a:r>
+              <a:rPr kumimoji="1" lang="zh-CN" altLang="en-US" dirty="0"/>
+              <a:t>内核服务的</a:t>
+            </a:r>
+            <a:r>
+              <a:rPr kumimoji="1" lang="en-US" altLang="zh-CN" dirty="0"/>
+              <a:t>rust</a:t>
+            </a:r>
+            <a:r>
+              <a:rPr kumimoji="1" lang="zh-CN" altLang="en-US" dirty="0"/>
+              <a:t>实现</a:t>
+            </a:r>
+            <a:endParaRPr kumimoji="1" lang="en-US" altLang="zh-CN" dirty="0"/>
+          </a:p>
+          <a:p>
+            <a:r>
+              <a:rPr kumimoji="1" lang="zh-CN" altLang="en-US" dirty="0"/>
+              <a:t>中期</a:t>
+            </a:r>
+            <a:r>
+              <a:rPr kumimoji="1" lang="en-US" altLang="zh-CN" dirty="0"/>
+              <a:t>——</a:t>
+            </a:r>
+            <a:r>
+              <a:rPr kumimoji="1" lang="zh-CN" altLang="en-US" dirty="0"/>
+              <a:t>中期两周后</a:t>
+            </a:r>
+            <a:endParaRPr kumimoji="1" lang="en-US" altLang="zh-CN" dirty="0"/>
+          </a:p>
+          <a:p>
+            <a:pPr lvl="1"/>
+            <a:r>
+              <a:rPr kumimoji="1" lang="zh-CN" altLang="en-US" dirty="0"/>
+              <a:t>编写</a:t>
+            </a:r>
+            <a:r>
+              <a:rPr kumimoji="1" lang="en-US" altLang="zh-CN" dirty="0"/>
+              <a:t>sel4test </a:t>
+            </a:r>
+            <a:r>
+              <a:rPr kumimoji="1" lang="zh-CN" altLang="en-US" dirty="0"/>
+              <a:t>所需的</a:t>
+            </a:r>
+            <a:r>
+              <a:rPr kumimoji="1" lang="en-US" altLang="zh-CN" dirty="0" err="1"/>
+              <a:t>api</a:t>
+            </a:r>
+            <a:r>
+              <a:rPr kumimoji="1" lang="zh-CN" altLang="en-US" dirty="0"/>
+              <a:t>接口</a:t>
+            </a:r>
+            <a:endParaRPr kumimoji="1" lang="en-US" altLang="zh-CN" dirty="0"/>
+          </a:p>
+          <a:p>
+            <a:r>
+              <a:rPr kumimoji="1" lang="zh-CN" altLang="en-US" dirty="0"/>
+              <a:t>中期</a:t>
+            </a:r>
+            <a:r>
+              <a:rPr kumimoji="1" lang="en-US" altLang="zh-CN" dirty="0"/>
+              <a:t>——</a:t>
+            </a:r>
+            <a:r>
+              <a:rPr kumimoji="1" lang="zh-CN" altLang="en-US" dirty="0"/>
+              <a:t>最后</a:t>
+            </a:r>
+            <a:endParaRPr kumimoji="1" lang="en-US" altLang="zh-CN" dirty="0"/>
+          </a:p>
+          <a:p>
+            <a:pPr lvl="1"/>
+            <a:r>
+              <a:rPr kumimoji="1" lang="zh-CN" altLang="en-US" dirty="0"/>
+              <a:t>寻找可能的</a:t>
+            </a:r>
+            <a:r>
+              <a:rPr kumimoji="1" lang="en-US" altLang="zh-CN" dirty="0"/>
+              <a:t>bug</a:t>
+            </a:r>
+            <a:r>
+              <a:rPr kumimoji="1" lang="zh-CN" altLang="en-US" dirty="0"/>
+              <a:t>，撰写论文</a:t>
+            </a:r>
+            <a:endParaRPr kumimoji="1" lang="en-US" altLang="zh-CN" dirty="0"/>
+          </a:p>
+          <a:p>
+            <a:endParaRPr kumimoji="1" lang="en-US" altLang="zh-CN" dirty="0"/>
+          </a:p>
+        </p:txBody>
+      </p:sp>
+      <p:sp>
+        <p:nvSpPr>
+          <p:cNvPr id="3" name="标题 2"/>
+          <p:cNvSpPr>
+            <a:spLocks noGrp="1"/>
+          </p:cNvSpPr>
+          <p:nvPr>
+            <p:ph type="title"/>
+          </p:nvPr>
+        </p:nvSpPr>
+        <p:spPr/>
+        <p:txBody>
+          <a:bodyPr/>
+          <a:lstStyle/>
+          <a:p>
+            <a:r>
+              <a:rPr kumimoji="1" lang="zh-CN" altLang="en-US" dirty="0"/>
+              <a:t>设计规划</a:t>
+            </a:r>
+          </a:p>
+        </p:txBody>
+      </p:sp>
+    </p:spTree>
+  </p:cSld>
+  <p:clrMapOvr>
+    <a:masterClrMapping/>
+  </p:clrMapOvr>
+</p:sld>
+</file>
+
+<file path=ppt/slides/slide11.xml><?xml version="1.0" encoding="utf-8"?>
+<p:sld xmlns:a="http://schemas.openxmlformats.org/drawingml/2006/main" xmlns:r="http://schemas.openxmlformats.org/officeDocument/2006/relationships" xmlns:p="http://schemas.openxmlformats.org/presentationml/2006/main">
+  <p:cSld>
+    <p:spTree>
+      <p:nvGrpSpPr>
+        <p:cNvPr id="1" name=""/>
+        <p:cNvGrpSpPr/>
+        <p:nvPr/>
+      </p:nvGrpSpPr>
+      <p:grpSpPr>
+        <a:xfrm>
+          <a:off x="0" y="0"/>
+          <a:ext cx="0" cy="0"/>
+          <a:chOff x="0" y="0"/>
+          <a:chExt cx="0" cy="0"/>
+        </a:xfrm>
+      </p:grpSpPr>
+      <p:sp>
+        <p:nvSpPr>
+          <p:cNvPr id="4" name="标题 3"/>
+          <p:cNvSpPr>
+            <a:spLocks noGrp="1"/>
+          </p:cNvSpPr>
+          <p:nvPr>
+            <p:ph type="ctrTitle"/>
+          </p:nvPr>
+        </p:nvSpPr>
+        <p:spPr/>
+        <p:txBody>
+          <a:bodyPr/>
+          <a:lstStyle/>
+          <a:p>
+            <a:pPr algn="ctr"/>
+            <a:r>
+              <a:rPr kumimoji="1" lang="zh-CN" altLang="en-US" dirty="0"/>
+              <a:t>谢谢！</a:t>
+            </a:r>
+          </a:p>
+        </p:txBody>
+      </p:sp>
+      <p:sp>
+        <p:nvSpPr>
+          <p:cNvPr id="5" name="副标题 4"/>
+          <p:cNvSpPr>
+            <a:spLocks noGrp="1"/>
+          </p:cNvSpPr>
+          <p:nvPr>
+            <p:ph type="subTitle" idx="1"/>
+          </p:nvPr>
+        </p:nvSpPr>
+        <p:spPr/>
+        <p:txBody>
+          <a:bodyPr>
+            <a:normAutofit/>
+          </a:bodyPr>
+          <a:lstStyle/>
+          <a:p>
+            <a:endParaRPr kumimoji="1" lang="zh-CN" altLang="en-US" dirty="0"/>
+          </a:p>
+        </p:txBody>
+      </p:sp>
+    </p:spTree>
+  </p:cSld>
+  <p:clrMapOvr>
+    <a:masterClrMapping/>
+  </p:clrMapOvr>
 </p:sld>
 </file>
 
@@ -4855,21 +5143,18 @@
               <a:rPr kumimoji="1" lang="zh-CN" altLang="en-US" dirty="0"/>
               <a:t>高安全性 、高性能的操作系统微内核</a:t>
             </a:r>
-            <a:endParaRPr kumimoji="1" lang="zh-CN" altLang="en-US" dirty="0"/>
           </a:p>
           <a:p>
             <a:r>
               <a:rPr kumimoji="1" lang="zh-CN" altLang="en-US" dirty="0"/>
               <a:t>数据完整性、数据保密性</a:t>
             </a:r>
-            <a:endParaRPr kumimoji="1" lang="zh-CN" altLang="en-US" dirty="0"/>
           </a:p>
           <a:p>
             <a:r>
               <a:rPr kumimoji="1" lang="zh-CN" altLang="en-US" dirty="0"/>
               <a:t>混合临界系统：即在同时运行可靠和不可靠代码的情况下，可以保证关键可靠代码的硬实时性，可信代码实时性不会被非可信代码的异常行为破坏</a:t>
             </a:r>
-            <a:endParaRPr kumimoji="1" lang="zh-CN" altLang="en-US" dirty="0"/>
           </a:p>
           <a:p>
             <a:r>
@@ -4886,13 +5171,8 @@
             </a:r>
             <a:r>
               <a:rPr kumimoji="1" lang="zh-CN" altLang="en-US" dirty="0"/>
-              <a:t>行</a:t>
-            </a:r>
-            <a:r>
-              <a:rPr kumimoji="1" lang="zh-CN" altLang="en-US" dirty="0"/>
-              <a:t>左右</a:t>
-            </a:r>
-            <a:endParaRPr kumimoji="1" lang="zh-CN" altLang="en-US" dirty="0"/>
+              <a:t>行左右</a:t>
+            </a:r>
           </a:p>
         </p:txBody>
       </p:sp>
@@ -4912,14 +5192,13 @@
           <a:lstStyle/>
           <a:p>
             <a:r>
-              <a:rPr kumimoji="1" lang="zh-CN" altLang="en-US" dirty="0" smtClean="0"/>
+              <a:rPr kumimoji="1" lang="zh-CN" altLang="en-US" dirty="0"/>
               <a:t>设计背景：</a:t>
             </a:r>
             <a:r>
-              <a:rPr kumimoji="1" lang="en-US" altLang="zh-CN" dirty="0" smtClean="0"/>
+              <a:rPr kumimoji="1" lang="en-US" altLang="zh-CN" dirty="0"/>
               <a:t>sEL4</a:t>
             </a:r>
-            <a:endParaRPr kumimoji="1" lang="en-US" altLang="zh-CN" dirty="0" smtClean="0"/>
           </a:p>
         </p:txBody>
       </p:sp>
@@ -4932,7 +5211,7 @@
           <p:nvPr/>
         </p:nvPicPr>
         <p:blipFill>
-          <a:blip r:embed="rId1"/>
+          <a:blip r:embed="rId2"/>
           <a:stretch>
             <a:fillRect/>
           </a:stretch>
@@ -4956,7 +5235,7 @@
           <p:nvPr/>
         </p:nvPicPr>
         <p:blipFill>
-          <a:blip r:embed="rId2"/>
+          <a:blip r:embed="rId3"/>
           <a:stretch>
             <a:fillRect/>
           </a:stretch>
@@ -4976,13 +5255,6 @@
   <p:clrMapOvr>
     <a:masterClrMapping/>
   </p:clrMapOvr>
-  <p:timing>
-    <p:tnLst>
-      <p:par>
-        <p:cTn id="1" dur="indefinite" restart="never" nodeType="tmRoot"/>
-      </p:par>
-    </p:tnLst>
-  </p:timing>
 </p:sld>
 </file>
 
@@ -5025,73 +5297,51 @@
           </a:bodyPr>
           <a:lstStyle/>
           <a:p>
-            <a:endParaRPr kumimoji="1" lang="en-US" altLang="zh-CN" dirty="0" smtClean="0"/>
+            <a:endParaRPr kumimoji="1" lang="en-US" altLang="zh-CN" dirty="0"/>
           </a:p>
           <a:p>
             <a:r>
               <a:rPr kumimoji="1" lang="zh-CN" altLang="en-US" dirty="0"/>
-              <a:t>内核对象、</a:t>
-            </a:r>
+              <a:t>内核对象、服务</a:t>
+            </a:r>
+          </a:p>
+          <a:p>
             <a:r>
               <a:rPr kumimoji="1" lang="zh-CN" altLang="en-US" dirty="0"/>
-              <a:t>服务</a:t>
-            </a:r>
-            <a:endParaRPr kumimoji="1" lang="zh-CN" altLang="en-US" dirty="0"/>
-          </a:p>
-          <a:p>
+              <a:t>能力空间（</a:t>
+            </a:r>
+            <a:r>
+              <a:rPr kumimoji="1" lang="en-US" altLang="zh-CN" dirty="0" err="1"/>
+              <a:t>CSpace</a:t>
+            </a:r>
             <a:r>
               <a:rPr kumimoji="1" lang="zh-CN" altLang="en-US" dirty="0"/>
-              <a:t>能力</a:t>
-            </a:r>
+              <a:t>）</a:t>
+            </a:r>
+          </a:p>
+          <a:p>
             <a:r>
               <a:rPr kumimoji="1" lang="zh-CN" altLang="en-US" dirty="0"/>
-              <a:t>空间</a:t>
-            </a:r>
-            <a:endParaRPr kumimoji="1" lang="zh-CN" altLang="en-US" dirty="0"/>
+              <a:t>进程间通信：端点（同步）、通知（异步）</a:t>
+            </a:r>
           </a:p>
           <a:p>
             <a:r>
               <a:rPr kumimoji="1" lang="zh-CN" altLang="en-US" dirty="0"/>
-              <a:t>进程间通信：端点（同步）、通知（</a:t>
-            </a:r>
+              <a:t>线程块：线程、进度上下文</a:t>
+            </a:r>
+          </a:p>
+          <a:p>
             <a:r>
               <a:rPr kumimoji="1" lang="zh-CN" altLang="en-US" dirty="0"/>
-              <a:t>异步）</a:t>
-            </a:r>
-            <a:endParaRPr kumimoji="1" lang="zh-CN" altLang="en-US" dirty="0"/>
+              <a:t>虚拟、物理地址空间</a:t>
+            </a:r>
           </a:p>
           <a:p>
             <a:r>
               <a:rPr kumimoji="1" lang="zh-CN" altLang="en-US" dirty="0"/>
-              <a:t>线程块：线程、进度上下文、调度</a:t>
-            </a:r>
-            <a:r>
-              <a:rPr kumimoji="1" lang="zh-CN" altLang="en-US" dirty="0"/>
-              <a:t>算法</a:t>
-            </a:r>
-            <a:endParaRPr kumimoji="1" lang="zh-CN" altLang="en-US" dirty="0"/>
-          </a:p>
-          <a:p>
-            <a:r>
-              <a:rPr kumimoji="1" lang="zh-CN" altLang="en-US" dirty="0"/>
-              <a:t>虚拟、物理地址</a:t>
-            </a:r>
-            <a:r>
-              <a:rPr kumimoji="1" lang="zh-CN" altLang="en-US" dirty="0"/>
-              <a:t>空间</a:t>
-            </a:r>
-            <a:endParaRPr kumimoji="1" lang="zh-CN" altLang="en-US" dirty="0"/>
-          </a:p>
-          <a:p>
-            <a:r>
-              <a:rPr kumimoji="1" lang="zh-CN" altLang="en-US" dirty="0"/>
-              <a:t>中断异常</a:t>
-            </a:r>
-            <a:r>
-              <a:rPr kumimoji="1" lang="zh-CN" altLang="en-US" dirty="0"/>
-              <a:t>处理</a:t>
-            </a:r>
-            <a:endParaRPr kumimoji="1" lang="zh-CN" altLang="en-US" dirty="0"/>
+              <a:t>中断异常处理</a:t>
+            </a:r>
           </a:p>
           <a:p>
             <a:endParaRPr kumimoji="1" lang="zh-CN" altLang="en-US" dirty="0"/>
@@ -5114,18 +5364,17 @@
           <a:lstStyle/>
           <a:p>
             <a:r>
-              <a:rPr kumimoji="1" lang="zh-CN" altLang="en-US" dirty="0" smtClean="0"/>
+              <a:rPr kumimoji="1" lang="zh-CN" altLang="en-US" dirty="0"/>
               <a:t>设计背景：</a:t>
             </a:r>
             <a:r>
-              <a:rPr kumimoji="1" lang="en-US" altLang="zh-CN" dirty="0" smtClean="0"/>
+              <a:rPr kumimoji="1" lang="en-US" altLang="zh-CN" dirty="0"/>
               <a:t>sel4</a:t>
             </a:r>
             <a:r>
-              <a:rPr kumimoji="1" lang="zh-CN" altLang="en-US" dirty="0" smtClean="0"/>
+              <a:rPr kumimoji="1" lang="zh-CN" altLang="en-US" dirty="0"/>
               <a:t>模块</a:t>
             </a:r>
-            <a:endParaRPr kumimoji="1" lang="zh-CN" altLang="en-US" dirty="0" smtClean="0"/>
           </a:p>
         </p:txBody>
       </p:sp>
@@ -5142,14 +5391,14 @@
           </p:nvPr>
         </p:nvPicPr>
         <p:blipFill>
-          <a:blip r:embed="rId2"/>
+          <a:blip r:embed="rId3"/>
           <a:stretch>
             <a:fillRect/>
           </a:stretch>
         </p:blipFill>
         <p:spPr>
           <a:xfrm>
-            <a:off x="5732780" y="1555750"/>
+            <a:off x="5732780" y="1548765"/>
             <a:ext cx="6022975" cy="3510280"/>
           </a:xfrm>
           <a:prstGeom prst="rect">
@@ -5162,13 +5411,6 @@
   <p:clrMapOvr>
     <a:masterClrMapping/>
   </p:clrMapOvr>
-  <p:timing>
-    <p:tnLst>
-      <p:par>
-        <p:cTn id="1" dur="indefinite" restart="never" nodeType="tmRoot"/>
-      </p:par>
-    </p:tnLst>
-  </p:timing>
 </p:sld>
 </file>
 
@@ -5212,58 +5454,41 @@
           <a:lstStyle/>
           <a:p>
             <a:r>
-              <a:rPr lang="zh-CN" altLang="en-US" dirty="0" smtClean="0"/>
+              <a:rPr lang="zh-CN" altLang="en-US" dirty="0"/>
               <a:t>安全性</a:t>
             </a:r>
-            <a:endParaRPr lang="zh-CN" altLang="en-US" dirty="0" smtClean="0"/>
           </a:p>
           <a:p>
             <a:pPr lvl="1"/>
             <a:r>
-              <a:rPr lang="zh-CN" altLang="en-US" dirty="0" smtClean="0"/>
-              <a:t>内存安全：所有权机制、借用</a:t>
-            </a:r>
-            <a:r>
-              <a:rPr lang="zh-CN" altLang="en-US" dirty="0" smtClean="0"/>
-              <a:t>规则</a:t>
-            </a:r>
-            <a:endParaRPr lang="zh-CN" altLang="en-US" dirty="0" smtClean="0"/>
+              <a:rPr lang="zh-CN" altLang="en-US" dirty="0"/>
+              <a:t>内存安全：所有权机制、借用规则</a:t>
+            </a:r>
           </a:p>
           <a:p>
             <a:pPr lvl="1"/>
             <a:r>
-              <a:rPr lang="zh-CN" altLang="en-US" dirty="0" smtClean="0"/>
-              <a:t>类型安全：基本不存在隐式的</a:t>
-            </a:r>
-            <a:r>
-              <a:rPr lang="zh-CN" altLang="en-US" dirty="0" smtClean="0"/>
-              <a:t>类型转换</a:t>
-            </a:r>
-            <a:endParaRPr lang="zh-CN" altLang="en-US" dirty="0" smtClean="0"/>
+              <a:rPr lang="zh-CN" altLang="en-US" dirty="0"/>
+              <a:t>类型安全：基本不存在隐式的类型转换</a:t>
+            </a:r>
           </a:p>
           <a:p>
             <a:pPr lvl="1"/>
             <a:r>
-              <a:rPr lang="zh-CN" altLang="en-US" dirty="0" smtClean="0"/>
-              <a:t>并发安全：编译器就可以检测出存在的</a:t>
-            </a:r>
-            <a:r>
-              <a:rPr lang="zh-CN" altLang="en-US" dirty="0" smtClean="0"/>
-              <a:t>数据竞争</a:t>
-            </a:r>
-            <a:endParaRPr lang="zh-CN" altLang="en-US" dirty="0" smtClean="0"/>
+              <a:rPr lang="zh-CN" altLang="en-US" dirty="0"/>
+              <a:t>并发安全：编译器就可以检测出存在的数据竞争</a:t>
+            </a:r>
           </a:p>
           <a:p>
             <a:pPr lvl="1"/>
             <a:r>
-              <a:rPr lang="en-US" altLang="zh-CN" dirty="0" smtClean="0"/>
+              <a:rPr lang="en-US" altLang="zh-CN" dirty="0"/>
               <a:t>unsafe</a:t>
             </a:r>
             <a:r>
-              <a:rPr lang="zh-CN" altLang="en-US" dirty="0" smtClean="0"/>
+              <a:rPr lang="zh-CN" altLang="en-US" dirty="0"/>
               <a:t>块</a:t>
             </a:r>
-            <a:endParaRPr lang="zh-CN" altLang="en-US" dirty="0" smtClean="0"/>
           </a:p>
           <a:p>
             <a:pPr marL="306070" lvl="0" indent="-306070">
@@ -5271,18 +5496,13 @@
               <a:buChar char=""/>
             </a:pPr>
             <a:r>
-              <a:rPr lang="zh-CN" altLang="en-US" dirty="0" smtClean="0">
+              <a:rPr lang="zh-CN" altLang="en-US" dirty="0">
                 <a:solidFill>
                   <a:schemeClr val="tx2"/>
                 </a:solidFill>
               </a:rPr>
               <a:t>高效性</a:t>
             </a:r>
-            <a:endParaRPr lang="zh-CN" altLang="en-US" dirty="0" smtClean="0">
-              <a:solidFill>
-                <a:schemeClr val="tx2"/>
-              </a:solidFill>
-            </a:endParaRPr>
           </a:p>
           <a:p>
             <a:pPr marL="763270" lvl="1" indent="-306070">
@@ -5290,7 +5510,7 @@
               <a:buChar char=""/>
             </a:pPr>
             <a:r>
-              <a:rPr lang="zh-CN" altLang="en-US" dirty="0" smtClean="0">
+              <a:rPr lang="zh-CN" altLang="en-US" dirty="0">
                 <a:solidFill>
                   <a:schemeClr val="tx2"/>
                 </a:solidFill>
@@ -5298,18 +5518,13 @@
               <a:t>没有</a:t>
             </a:r>
             <a:r>
-              <a:rPr lang="en-US" altLang="zh-CN" dirty="0" smtClean="0">
+              <a:rPr lang="en-US" altLang="zh-CN" dirty="0">
                 <a:solidFill>
                   <a:schemeClr val="tx2"/>
                 </a:solidFill>
               </a:rPr>
               <a:t>gc</a:t>
             </a:r>
-            <a:endParaRPr lang="en-US" altLang="zh-CN" dirty="0" smtClean="0">
-              <a:solidFill>
-                <a:schemeClr val="tx2"/>
-              </a:solidFill>
-            </a:endParaRPr>
           </a:p>
           <a:p>
             <a:pPr marL="763270" lvl="1" indent="-306070">
@@ -5317,53 +5532,27 @@
               <a:buChar char=""/>
             </a:pPr>
             <a:r>
-              <a:rPr lang="zh-CN" altLang="en-US" dirty="0" smtClean="0">
+              <a:rPr lang="zh-CN" altLang="en-US" dirty="0">
                 <a:solidFill>
                   <a:schemeClr val="tx2"/>
                 </a:solidFill>
               </a:rPr>
-              <a:t>零成本</a:t>
-            </a:r>
-            <a:r>
-              <a:rPr lang="zh-CN" altLang="en-US" dirty="0" smtClean="0">
+              <a:t>零成本抽象</a:t>
+            </a:r>
+          </a:p>
+          <a:p>
+            <a:pPr marL="306070" lvl="0" indent="-306070">
+              <a:buFont typeface="Wingdings 2" panose="05020102010507070707" charset="0"/>
+              <a:buChar char=""/>
+            </a:pPr>
+            <a:r>
+              <a:rPr lang="zh-CN" altLang="en-US" dirty="0">
                 <a:solidFill>
                   <a:schemeClr val="tx2"/>
                 </a:solidFill>
               </a:rPr>
-              <a:t>抽象</a:t>
-            </a:r>
-            <a:endParaRPr lang="zh-CN" altLang="en-US" dirty="0" smtClean="0">
-              <a:solidFill>
-                <a:schemeClr val="tx2"/>
-              </a:solidFill>
-            </a:endParaRPr>
-          </a:p>
-          <a:p>
-            <a:pPr marL="306070" lvl="0" indent="-306070">
-              <a:buFont typeface="Wingdings 2" panose="05020102010507070707" charset="0"/>
-              <a:buChar char=""/>
-            </a:pPr>
-            <a:r>
-              <a:rPr lang="zh-CN" altLang="en-US" dirty="0" smtClean="0">
-                <a:solidFill>
-                  <a:schemeClr val="tx2"/>
-                </a:solidFill>
-              </a:rPr>
-              <a:t>方便的集成化工具链和包管理</a:t>
-            </a:r>
-            <a:r>
-              <a:rPr lang="zh-CN" altLang="en-US" dirty="0" smtClean="0">
-                <a:solidFill>
-                  <a:schemeClr val="tx2"/>
-                </a:solidFill>
-              </a:rPr>
-              <a:t>工具</a:t>
-            </a:r>
-            <a:endParaRPr lang="zh-CN" altLang="en-US" dirty="0" smtClean="0">
-              <a:solidFill>
-                <a:schemeClr val="tx2"/>
-              </a:solidFill>
-            </a:endParaRPr>
+              <a:t>方便的集成化工具链和包管理工具</a:t>
+            </a:r>
           </a:p>
         </p:txBody>
       </p:sp>
@@ -5383,18 +5572,17 @@
           <a:lstStyle/>
           <a:p>
             <a:r>
-              <a:rPr kumimoji="1" lang="zh-CN" altLang="en-US" dirty="0" smtClean="0"/>
+              <a:rPr kumimoji="1" lang="zh-CN" altLang="en-US" dirty="0"/>
               <a:t>设计背景：</a:t>
             </a:r>
             <a:r>
-              <a:rPr kumimoji="1" lang="en-US" altLang="zh-CN" dirty="0" smtClean="0"/>
+              <a:rPr kumimoji="1" lang="en-US" altLang="zh-CN" dirty="0"/>
               <a:t>why rust</a:t>
             </a:r>
             <a:r>
-              <a:rPr kumimoji="1" lang="zh-CN" altLang="en-US" dirty="0" smtClean="0"/>
+              <a:rPr kumimoji="1" lang="zh-CN" altLang="en-US" dirty="0"/>
               <a:t>？</a:t>
             </a:r>
-            <a:endParaRPr kumimoji="1" lang="zh-CN" altLang="en-US" dirty="0" smtClean="0"/>
           </a:p>
         </p:txBody>
       </p:sp>
@@ -5403,13 +5591,6 @@
   <p:clrMapOvr>
     <a:masterClrMapping/>
   </p:clrMapOvr>
-  <p:timing>
-    <p:tnLst>
-      <p:par>
-        <p:cTn id="1" dur="indefinite" restart="never" nodeType="tmRoot"/>
-      </p:par>
-    </p:tnLst>
-  </p:timing>
 </p:sld>
 </file>
 
@@ -5453,237 +5634,197 @@
           <a:lstStyle/>
           <a:p>
             <a:r>
-              <a:rPr lang="zh-CN" altLang="en-US" dirty="0" smtClean="0"/>
+              <a:rPr lang="zh-CN" altLang="en-US" dirty="0"/>
               <a:t>陈云逸、李东阳、周宜辉：</a:t>
             </a:r>
-            <a:endParaRPr lang="zh-CN" altLang="en-US" dirty="0" smtClean="0"/>
           </a:p>
           <a:p>
             <a:pPr lvl="1"/>
             <a:r>
-              <a:rPr lang="en-US" altLang="zh-CN" dirty="0" smtClean="0"/>
-              <a:t>FreeRTOS:</a:t>
-            </a:r>
-            <a:endParaRPr lang="en-US" altLang="zh-CN" dirty="0" smtClean="0"/>
+              <a:rPr lang="en-US" altLang="zh-CN" dirty="0"/>
+              <a:t>R-</a:t>
+            </a:r>
+            <a:r>
+              <a:rPr lang="en-US" altLang="zh-CN" dirty="0" err="1"/>
+              <a:t>FreeRTOS</a:t>
+            </a:r>
+            <a:r>
+              <a:rPr lang="en-US" altLang="zh-CN" dirty="0"/>
+              <a:t>:</a:t>
+            </a:r>
+            <a:r>
+              <a:rPr lang="zh-CN" altLang="en-US" dirty="0"/>
+              <a:t>用</a:t>
+            </a:r>
+            <a:r>
+              <a:rPr lang="en-US" altLang="zh-CN" dirty="0"/>
+              <a:t>rust</a:t>
+            </a:r>
+            <a:r>
+              <a:rPr lang="zh-CN" altLang="en-US" dirty="0"/>
+              <a:t>语言重新实现了</a:t>
+            </a:r>
+            <a:r>
+              <a:rPr lang="en-US" altLang="zh-CN" dirty="0"/>
+              <a:t>FREERTOS</a:t>
+            </a:r>
+          </a:p>
+          <a:p>
+            <a:pPr lvl="1"/>
+            <a:r>
+              <a:rPr lang="zh-CN" altLang="en-US" dirty="0"/>
+              <a:t>实现效果：实现了</a:t>
+            </a:r>
+            <a:r>
+              <a:rPr lang="en-US" altLang="zh-CN" dirty="0" err="1"/>
+              <a:t>FreeRTOS</a:t>
+            </a:r>
+            <a:r>
+              <a:rPr lang="zh-CN" altLang="en-US" dirty="0"/>
+              <a:t>的基本功能</a:t>
+            </a:r>
+            <a:r>
+              <a:rPr lang="en-US" altLang="zh-CN" dirty="0"/>
+              <a:t>,</a:t>
+            </a:r>
+            <a:r>
+              <a:rPr lang="zh-CN" altLang="en-US" dirty="0"/>
+              <a:t>并通过了</a:t>
+            </a:r>
+            <a:r>
+              <a:rPr lang="en-US" altLang="zh-CN" dirty="0" err="1"/>
+              <a:t>FreeRTOS</a:t>
+            </a:r>
+            <a:r>
+              <a:rPr lang="zh-CN" altLang="en-US" dirty="0"/>
+              <a:t>自带的测试。</a:t>
+            </a:r>
+            <a:endParaRPr lang="en-US" altLang="zh-CN" dirty="0"/>
+          </a:p>
+          <a:p>
+            <a:pPr lvl="1"/>
+            <a:r>
+              <a:rPr lang="zh-CN" altLang="en-US" dirty="0"/>
+              <a:t>代码可分为</a:t>
+            </a:r>
+            <a:r>
+              <a:rPr lang="en-US" altLang="zh-CN" dirty="0"/>
+              <a:t>kernel</a:t>
+            </a:r>
+            <a:r>
+              <a:rPr lang="zh-CN" altLang="en-US" dirty="0"/>
+              <a:t>、</a:t>
+            </a:r>
+            <a:r>
+              <a:rPr lang="en-US" altLang="zh-CN" dirty="0" err="1"/>
+              <a:t>ffi</a:t>
+            </a:r>
+            <a:r>
+              <a:rPr lang="zh-CN" altLang="en-US" dirty="0"/>
+              <a:t>、</a:t>
+            </a:r>
+            <a:r>
+              <a:rPr lang="en-US" altLang="zh-CN" dirty="0"/>
+              <a:t>test</a:t>
+            </a:r>
+            <a:r>
+              <a:rPr lang="zh-CN" altLang="en-US" dirty="0"/>
+              <a:t>、</a:t>
+            </a:r>
+            <a:r>
+              <a:rPr lang="en-US" altLang="zh-CN" dirty="0"/>
+              <a:t>portable</a:t>
+            </a:r>
+            <a:r>
+              <a:rPr lang="zh-CN" altLang="en-US" dirty="0"/>
+              <a:t>四个模块。</a:t>
+            </a:r>
+            <a:endParaRPr lang="en-US" altLang="zh-CN" dirty="0"/>
+          </a:p>
+          <a:p>
+            <a:r>
+              <a:rPr lang="en-US" altLang="zh-CN" dirty="0"/>
+              <a:t>kernel</a:t>
+            </a:r>
+            <a:r>
+              <a:rPr lang="zh-CN" altLang="en-US" dirty="0"/>
+              <a:t>模块：</a:t>
+            </a:r>
+            <a:endParaRPr lang="en-US" altLang="zh-CN" dirty="0"/>
+          </a:p>
+          <a:p>
+            <a:pPr lvl="1"/>
+            <a:r>
+              <a:rPr lang="en-US" altLang="zh-CN" dirty="0"/>
+              <a:t>Kernel</a:t>
+            </a:r>
+            <a:r>
+              <a:rPr lang="zh-CN" altLang="en-US" dirty="0"/>
+              <a:t>模块实现为</a:t>
+            </a:r>
+            <a:r>
+              <a:rPr lang="en-US" altLang="zh-CN" dirty="0" err="1"/>
+              <a:t>FreeRTOS</a:t>
+            </a:r>
+            <a:r>
+              <a:rPr lang="zh-CN" altLang="en-US" dirty="0"/>
+              <a:t>的内核，实现的功能有：</a:t>
+            </a:r>
+            <a:endParaRPr lang="en-US" altLang="zh-CN" dirty="0"/>
           </a:p>
           <a:p>
             <a:pPr lvl="2"/>
             <a:r>
-              <a:rPr lang="zh-CN">
+              <a:rPr lang="zh-CN" altLang="en-US" b="0" i="0" u="none" strike="noStrike" baseline="0" dirty="0">
                 <a:solidFill>
-                  <a:schemeClr val="dk1"/>
+                  <a:srgbClr val="333333"/>
                 </a:solidFill>
-                <a:cs typeface="微软雅黑" panose="020B0503020204020204" charset="-122"/>
-                <a:sym typeface="+mn-ea"/>
+                <a:latin typeface="黑体" panose="02010609060101010101" pitchFamily="49" charset="-122"/>
+                <a:ea typeface="黑体" panose="02010609060101010101" pitchFamily="49" charset="-122"/>
               </a:rPr>
-              <a:t>用Rust重新实现FreeRTOS——安全性</a:t>
-            </a:r>
-            <a:endParaRPr lang="zh-CN">
+              <a:t>任务调度，包括任务创建、删除、延迟、挂起与恢复、调度器挂起与恢复等；</a:t>
+            </a:r>
+            <a:endParaRPr lang="en-US" altLang="zh-CN" b="0" i="0" u="none" strike="noStrike" baseline="0" dirty="0">
               <a:solidFill>
-                <a:schemeClr val="dk1"/>
+                <a:srgbClr val="333333"/>
               </a:solidFill>
-              <a:cs typeface="微软雅黑" panose="020B0503020204020204" charset="-122"/>
-              <a:sym typeface="+mn-ea"/>
+              <a:latin typeface="黑体" panose="02010609060101010101" pitchFamily="49" charset="-122"/>
+              <a:ea typeface="黑体" panose="02010609060101010101" pitchFamily="49" charset="-122"/>
             </a:endParaRPr>
           </a:p>
           <a:p>
             <a:pPr lvl="2"/>
             <a:r>
-              <a:rPr lang="zh-CN">
+              <a:rPr lang="zh-CN" altLang="en-US" b="0" i="0" u="none" strike="noStrike" baseline="0" dirty="0">
                 <a:solidFill>
-                  <a:schemeClr val="dk1"/>
+                  <a:srgbClr val="333333"/>
                 </a:solidFill>
-                <a:cs typeface="微软雅黑" panose="020B0503020204020204" charset="-122"/>
-                <a:sym typeface="+mn-ea"/>
+                <a:latin typeface="黑体" panose="02010609060101010101" pitchFamily="49" charset="-122"/>
+                <a:ea typeface="黑体" panose="02010609060101010101" pitchFamily="49" charset="-122"/>
               </a:rPr>
-              <a:t>实现对上层应用（基本测试用例）的支持——功能性</a:t>
-            </a:r>
-            <a:endParaRPr lang="zh-CN">
+              <a:t>消息队列与信号量，用于不同任务之间的通信。</a:t>
+            </a:r>
+            <a:endParaRPr lang="en-US" altLang="zh-CN" b="0" i="0" u="none" strike="noStrike" baseline="0" dirty="0">
               <a:solidFill>
-                <a:schemeClr val="dk1"/>
+                <a:srgbClr val="333333"/>
               </a:solidFill>
-              <a:cs typeface="微软雅黑" panose="020B0503020204020204" charset="-122"/>
-              <a:sym typeface="+mn-ea"/>
+              <a:latin typeface="黑体" panose="02010609060101010101" pitchFamily="49" charset="-122"/>
+              <a:ea typeface="黑体" panose="02010609060101010101" pitchFamily="49" charset="-122"/>
             </a:endParaRPr>
           </a:p>
           <a:p>
             <a:pPr lvl="2"/>
             <a:r>
-              <a:rPr lang="zh-CN">
+              <a:rPr lang="zh-CN" altLang="en-US" b="0" i="0" u="none" strike="noStrike" baseline="0" dirty="0">
                 <a:solidFill>
-                  <a:schemeClr val="dk1"/>
+                  <a:srgbClr val="333333"/>
                 </a:solidFill>
-                <a:cs typeface="微软雅黑" panose="020B0503020204020204" charset="-122"/>
-                <a:sym typeface="+mn-ea"/>
+                <a:latin typeface="黑体" panose="02010609060101010101" pitchFamily="49" charset="-122"/>
+                <a:ea typeface="黑体" panose="02010609060101010101" pitchFamily="49" charset="-122"/>
               </a:rPr>
-              <a:t>完成到D1-H开发板等平台上的移植——易用性</a:t>
-            </a:r>
-            <a:endParaRPr lang="zh-CN">
-              <a:solidFill>
-                <a:schemeClr val="dk1"/>
-              </a:solidFill>
-              <a:cs typeface="微软雅黑" panose="020B0503020204020204" charset="-122"/>
-              <a:sym typeface="+mn-ea"/>
-            </a:endParaRPr>
-          </a:p>
-          <a:p>
-            <a:pPr marL="306070" lvl="0" indent="-306070">
-              <a:buFont typeface="Wingdings 2" panose="05020102010507070707" charset="0"/>
-              <a:buChar char=""/>
-            </a:pPr>
-            <a:r>
-              <a:rPr lang="zh-CN" altLang="en-US">
-                <a:solidFill>
-                  <a:schemeClr val="dk1"/>
-                </a:solidFill>
-                <a:cs typeface="微软雅黑" panose="020B0503020204020204" charset="-122"/>
-                <a:sym typeface="+mn-ea"/>
-              </a:rPr>
-              <a:t>刘庆涛、雷洋、张洋：</a:t>
-            </a:r>
-            <a:endParaRPr lang="zh-CN" altLang="en-US">
-              <a:solidFill>
-                <a:schemeClr val="dk1"/>
-              </a:solidFill>
-              <a:cs typeface="微软雅黑" panose="020B0503020204020204" charset="-122"/>
-              <a:sym typeface="+mn-ea"/>
-            </a:endParaRPr>
-          </a:p>
-          <a:p>
-            <a:pPr marL="763270" lvl="1" indent="-306070">
-              <a:buFont typeface="Wingdings 2" panose="05020102010507070707" charset="0"/>
-              <a:buChar char=""/>
-            </a:pPr>
-            <a:r>
-              <a:rPr lang="en-US" altLang="zh-CN">
-                <a:solidFill>
-                  <a:schemeClr val="dk1"/>
-                </a:solidFill>
-                <a:cs typeface="微软雅黑" panose="020B0503020204020204" charset="-122"/>
-                <a:sym typeface="+mn-ea"/>
-              </a:rPr>
-              <a:t>la-seL4:</a:t>
-            </a:r>
-            <a:endParaRPr lang="en-US" altLang="zh-CN">
-              <a:solidFill>
-                <a:schemeClr val="dk1"/>
-              </a:solidFill>
-              <a:cs typeface="微软雅黑" panose="020B0503020204020204" charset="-122"/>
-              <a:sym typeface="+mn-ea"/>
-            </a:endParaRPr>
-          </a:p>
-          <a:p>
-            <a:pPr marL="1220470" lvl="2" indent="-306070">
-              <a:buFont typeface="Wingdings 2" panose="05020102010507070707" charset="0"/>
-              <a:buChar char=""/>
-            </a:pPr>
-            <a:r>
-              <a:rPr lang="zh-CN" altLang="en-US" sz="1400">
-                <a:solidFill>
-                  <a:schemeClr val="dk1"/>
-                </a:solidFill>
-                <a:cs typeface="微软雅黑" panose="020B0503020204020204" charset="-122"/>
-                <a:sym typeface="+mn-ea"/>
-              </a:rPr>
-              <a:t>将</a:t>
-            </a:r>
-            <a:r>
-              <a:rPr lang="en-US" altLang="zh-CN" sz="1400">
-                <a:solidFill>
-                  <a:schemeClr val="dk1"/>
-                </a:solidFill>
-                <a:cs typeface="微软雅黑" panose="020B0503020204020204" charset="-122"/>
-                <a:sym typeface="+mn-ea"/>
-              </a:rPr>
-              <a:t>c</a:t>
-            </a:r>
-            <a:r>
-              <a:rPr lang="zh-CN" altLang="en-US" sz="1400">
-                <a:solidFill>
-                  <a:schemeClr val="dk1"/>
-                </a:solidFill>
-                <a:cs typeface="微软雅黑" panose="020B0503020204020204" charset="-122"/>
-                <a:sym typeface="+mn-ea"/>
-              </a:rPr>
-              <a:t>版</a:t>
-            </a:r>
-            <a:r>
-              <a:rPr lang="en-US" altLang="zh-CN" sz="1400">
-                <a:solidFill>
-                  <a:schemeClr val="dk1"/>
-                </a:solidFill>
-                <a:cs typeface="微软雅黑" panose="020B0503020204020204" charset="-122"/>
-                <a:sym typeface="+mn-ea"/>
-              </a:rPr>
-              <a:t>seL4</a:t>
-            </a:r>
-            <a:r>
-              <a:rPr lang="zh-CN" altLang="en-US" sz="1400">
-                <a:solidFill>
-                  <a:schemeClr val="dk1"/>
-                </a:solidFill>
-                <a:cs typeface="微软雅黑" panose="020B0503020204020204" charset="-122"/>
-                <a:sym typeface="+mn-ea"/>
-              </a:rPr>
-              <a:t>及相关程序库移植到了</a:t>
-            </a:r>
-            <a:r>
-              <a:rPr lang="en-US" altLang="zh-CN" sz="1400">
-                <a:solidFill>
-                  <a:schemeClr val="dk1"/>
-                </a:solidFill>
-                <a:cs typeface="微软雅黑" panose="020B0503020204020204" charset="-122"/>
-                <a:sym typeface="+mn-ea"/>
-              </a:rPr>
-              <a:t>loongarch</a:t>
-            </a:r>
-            <a:r>
-              <a:rPr lang="zh-CN" altLang="en-US" sz="1400">
-                <a:solidFill>
-                  <a:schemeClr val="dk1"/>
-                </a:solidFill>
-                <a:cs typeface="微软雅黑" panose="020B0503020204020204" charset="-122"/>
-                <a:sym typeface="+mn-ea"/>
-              </a:rPr>
-              <a:t>上</a:t>
-            </a:r>
-            <a:endParaRPr lang="zh-CN" altLang="en-US" sz="1400">
-              <a:solidFill>
-                <a:schemeClr val="dk1"/>
-              </a:solidFill>
-              <a:cs typeface="微软雅黑" panose="020B0503020204020204" charset="-122"/>
-              <a:sym typeface="+mn-ea"/>
-            </a:endParaRPr>
-          </a:p>
-          <a:p>
-            <a:pPr marL="1220470" lvl="2" indent="-306070">
-              <a:buFont typeface="Wingdings 2" panose="05020102010507070707" charset="0"/>
-              <a:buChar char=""/>
-            </a:pPr>
-            <a:r>
-              <a:rPr lang="zh-CN" altLang="en-US" sz="1400">
-                <a:solidFill>
-                  <a:schemeClr val="dk1"/>
-                </a:solidFill>
-                <a:cs typeface="微软雅黑" panose="020B0503020204020204" charset="-122"/>
-                <a:sym typeface="+mn-ea"/>
-              </a:rPr>
-              <a:t>实现了对上层应用的支持（通过全部基本测例）</a:t>
-            </a:r>
-            <a:endParaRPr lang="zh-CN">
-              <a:solidFill>
-                <a:schemeClr val="dk1"/>
-              </a:solidFill>
-              <a:cs typeface="微软雅黑" panose="020B0503020204020204" charset="-122"/>
-              <a:sym typeface="+mn-ea"/>
-            </a:endParaRPr>
-          </a:p>
-          <a:p>
-            <a:pPr lvl="1"/>
-            <a:endParaRPr lang="en-US" altLang="zh-CN" dirty="0" smtClean="0"/>
-          </a:p>
-          <a:p>
-            <a:endParaRPr lang="en-US" altLang="zh-CN" dirty="0" smtClean="0"/>
+              <a:t>基础事件组操作，不同任务间的同步。</a:t>
+            </a:r>
+            <a:endParaRPr lang="en-US" altLang="zh-CN" dirty="0"/>
           </a:p>
         </p:txBody>
       </p:sp>
@@ -5703,17 +5844,51 @@
           <a:lstStyle/>
           <a:p>
             <a:r>
-              <a:rPr lang="zh-CN" altLang="en-US" dirty="0" smtClean="0"/>
-              <a:t>设计背景：相关</a:t>
-            </a:r>
-            <a:r>
-              <a:rPr lang="zh-CN" altLang="en-US" dirty="0" smtClean="0"/>
-              <a:t>工作</a:t>
-            </a:r>
-            <a:endParaRPr lang="zh-CN" altLang="en-US" dirty="0" smtClean="0"/>
-          </a:p>
-        </p:txBody>
-      </p:sp>
+              <a:rPr lang="zh-CN" altLang="en-US" dirty="0"/>
+              <a:t>设计背景：</a:t>
+            </a:r>
+            <a:r>
+              <a:rPr lang="en-US" altLang="zh-CN" dirty="0"/>
+              <a:t>R-</a:t>
+            </a:r>
+            <a:r>
+              <a:rPr lang="en-US" altLang="zh-CN" dirty="0" err="1"/>
+              <a:t>Freertos</a:t>
+            </a:r>
+            <a:endParaRPr lang="zh-CN" altLang="en-US" dirty="0"/>
+          </a:p>
+        </p:txBody>
+      </p:sp>
+      <p:pic>
+        <p:nvPicPr>
+          <p:cNvPr id="8" name="内容占位符 2">
+            <a:extLst>
+              <a:ext uri="{FF2B5EF4-FFF2-40B4-BE49-F238E27FC236}">
+                <a16:creationId xmlns:a16="http://schemas.microsoft.com/office/drawing/2014/main" id="{F71DE0B0-CDF0-47BB-9C9A-8148DD595D78}"/>
+              </a:ext>
+            </a:extLst>
+          </p:cNvPr>
+          <p:cNvPicPr>
+            <a:picLocks noChangeAspect="1"/>
+          </p:cNvPicPr>
+          <p:nvPr/>
+        </p:nvPicPr>
+        <p:blipFill>
+          <a:blip r:embed="rId2"/>
+          <a:stretch>
+            <a:fillRect/>
+          </a:stretch>
+        </p:blipFill>
+        <p:spPr>
+          <a:xfrm>
+            <a:off x="8297591" y="1782600"/>
+            <a:ext cx="2720285" cy="3292799"/>
+          </a:xfrm>
+          <a:prstGeom prst="rect">
+            <a:avLst/>
+          </a:prstGeom>
+        </p:spPr>
+      </p:pic>
     </p:spTree>
   </p:cSld>
   <p:clrMapOvr>
@@ -5749,121 +5924,228 @@
             <p:ph idx="1"/>
           </p:nvPr>
         </p:nvSpPr>
-        <p:spPr/>
+        <p:spPr>
+          <a:xfrm>
+            <a:off x="833377" y="1638170"/>
+            <a:ext cx="10521387" cy="4569199"/>
+          </a:xfrm>
+        </p:spPr>
         <p:txBody>
           <a:bodyPr>
             <a:normAutofit/>
           </a:bodyPr>
           <a:lstStyle/>
           <a:p>
-            <a:pPr marL="323850" lvl="1" indent="0">
+            <a:pPr algn="l"/>
+            <a:r>
+              <a:rPr lang="en-US" altLang="zh-CN" dirty="0"/>
+              <a:t>Portable</a:t>
+            </a:r>
+            <a:r>
+              <a:rPr lang="zh-CN" altLang="en-US" dirty="0"/>
+              <a:t>模块：用于与硬件的交互，主要设置</a:t>
+            </a:r>
+            <a:r>
+              <a:rPr lang="zh-CN" altLang="en-US" sz="1800" b="0" i="0" u="none" strike="noStrike" baseline="0" dirty="0">
+                <a:solidFill>
+                  <a:srgbClr val="333333"/>
+                </a:solidFill>
+                <a:latin typeface="黑体" panose="02010609060101010101" pitchFamily="49" charset="-122"/>
+                <a:ea typeface="黑体" panose="02010609060101010101" pitchFamily="49" charset="-122"/>
+              </a:rPr>
+              <a:t>时钟中断、调度器启动流程、串口交互等。</a:t>
+            </a:r>
+            <a:endParaRPr lang="en-US" altLang="zh-CN" sz="1800" b="0" i="0" u="none" strike="noStrike" baseline="0" dirty="0">
+              <a:solidFill>
+                <a:srgbClr val="333333"/>
+              </a:solidFill>
+              <a:latin typeface="黑体" panose="02010609060101010101" pitchFamily="49" charset="-122"/>
+              <a:ea typeface="黑体" panose="02010609060101010101" pitchFamily="49" charset="-122"/>
+            </a:endParaRPr>
+          </a:p>
+          <a:p>
+            <a:pPr algn="l"/>
+            <a:r>
+              <a:rPr lang="en-US" altLang="zh-CN" dirty="0" err="1"/>
+              <a:t>Ffi</a:t>
+            </a:r>
+            <a:r>
+              <a:rPr lang="zh-CN" altLang="en-US" dirty="0"/>
+              <a:t>模块：用于与</a:t>
+            </a:r>
+            <a:r>
+              <a:rPr lang="en-US" altLang="zh-CN" dirty="0"/>
+              <a:t>C </a:t>
+            </a:r>
+            <a:r>
+              <a:rPr lang="zh-CN" altLang="en-US" dirty="0"/>
+              <a:t>代码进行交互，提供了</a:t>
+            </a:r>
+            <a:r>
+              <a:rPr lang="en-US" altLang="zh-CN" dirty="0"/>
+              <a:t>C </a:t>
+            </a:r>
+            <a:r>
+              <a:rPr lang="zh-CN" altLang="en-US" dirty="0"/>
+              <a:t>可用的部分接口。</a:t>
+            </a:r>
+            <a:endParaRPr lang="en-US" altLang="zh-CN" dirty="0"/>
+          </a:p>
+          <a:p>
+            <a:pPr algn="l"/>
+            <a:endParaRPr lang="en-US" altLang="zh-CN" dirty="0"/>
+          </a:p>
+          <a:p>
+            <a:pPr algn="l"/>
+            <a:endParaRPr lang="en-US" altLang="zh-CN" dirty="0"/>
+          </a:p>
+          <a:p>
+            <a:pPr algn="l"/>
+            <a:endParaRPr lang="en-US" altLang="zh-CN" dirty="0"/>
+          </a:p>
+          <a:p>
+            <a:pPr algn="l"/>
+            <a:endParaRPr lang="en-US" altLang="zh-CN" dirty="0"/>
+          </a:p>
+          <a:p>
+            <a:pPr algn="l"/>
+            <a:endParaRPr lang="en-US" altLang="zh-CN" dirty="0"/>
+          </a:p>
+          <a:p>
+            <a:pPr algn="l"/>
+            <a:endParaRPr lang="en-US" altLang="zh-CN" dirty="0"/>
+          </a:p>
+          <a:p>
+            <a:pPr algn="l"/>
+            <a:r>
+              <a:rPr lang="en-US" altLang="zh-CN" dirty="0"/>
+              <a:t>Test</a:t>
+            </a:r>
+            <a:r>
+              <a:rPr lang="zh-CN" altLang="en-US" dirty="0"/>
+              <a:t>模块：原版</a:t>
+            </a:r>
+            <a:r>
+              <a:rPr lang="en-US" altLang="zh-CN" dirty="0" err="1"/>
+              <a:t>FreeRTOS</a:t>
+            </a:r>
+            <a:r>
+              <a:rPr lang="zh-CN" altLang="en-US" dirty="0"/>
+              <a:t>提供的</a:t>
+            </a:r>
+            <a:r>
+              <a:rPr lang="en-US" altLang="zh-CN" dirty="0"/>
+              <a:t>c</a:t>
+            </a:r>
+            <a:r>
+              <a:rPr lang="zh-CN" altLang="en-US" dirty="0"/>
+              <a:t>测例，通过</a:t>
+            </a:r>
+            <a:r>
+              <a:rPr lang="en-US" altLang="zh-CN" dirty="0"/>
+              <a:t>rust-cc</a:t>
+            </a:r>
+            <a:r>
+              <a:rPr lang="zh-CN" altLang="en-US" dirty="0"/>
+              <a:t>库可实现</a:t>
+            </a:r>
+            <a:r>
+              <a:rPr lang="en-US" altLang="zh-CN" dirty="0"/>
+              <a:t>c</a:t>
+            </a:r>
+            <a:r>
+              <a:rPr lang="zh-CN" altLang="en-US" dirty="0"/>
+              <a:t>代码与</a:t>
+            </a:r>
+            <a:r>
+              <a:rPr lang="en-US" altLang="zh-CN" dirty="0"/>
+              <a:t>rust</a:t>
+            </a:r>
+            <a:r>
+              <a:rPr lang="zh-CN" altLang="en-US" dirty="0"/>
+              <a:t>代码一起编译，再将测试函数写入一个单独的线程，让</a:t>
+            </a:r>
+            <a:r>
+              <a:rPr lang="en-US" altLang="zh-CN" dirty="0" err="1"/>
+              <a:t>freertos</a:t>
+            </a:r>
+            <a:r>
+              <a:rPr lang="zh-CN" altLang="en-US" dirty="0"/>
+              <a:t>运行即可开始测试。</a:t>
+            </a:r>
+            <a:endParaRPr lang="en-US" altLang="zh-CN" dirty="0"/>
+          </a:p>
+          <a:p>
+            <a:pPr algn="l"/>
+            <a:endParaRPr lang="en-US" altLang="zh-CN" dirty="0"/>
+          </a:p>
+          <a:p>
+            <a:pPr algn="l"/>
+            <a:endParaRPr lang="en-US" altLang="zh-CN" dirty="0"/>
+          </a:p>
+          <a:p>
+            <a:pPr algn="l"/>
+            <a:endParaRPr lang="en-US" altLang="zh-CN" dirty="0"/>
+          </a:p>
+          <a:p>
+            <a:pPr algn="l"/>
+            <a:endParaRPr lang="en-US" altLang="zh-CN" dirty="0"/>
+          </a:p>
+          <a:p>
+            <a:pPr algn="l"/>
+            <a:endParaRPr lang="en-US" altLang="zh-CN" dirty="0"/>
+          </a:p>
+          <a:p>
+            <a:pPr algn="l"/>
+            <a:endParaRPr lang="en-US" altLang="zh-CN" dirty="0"/>
+          </a:p>
+          <a:p>
+            <a:pPr algn="l"/>
+            <a:endParaRPr lang="en-US" altLang="zh-CN" dirty="0"/>
+          </a:p>
+          <a:p>
+            <a:pPr algn="l"/>
+            <a:endParaRPr lang="en-US" altLang="zh-CN" dirty="0"/>
+          </a:p>
+          <a:p>
+            <a:pPr algn="l"/>
+            <a:endParaRPr lang="en-US" altLang="zh-CN" dirty="0"/>
+          </a:p>
+          <a:p>
+            <a:pPr algn="l"/>
+            <a:endParaRPr lang="en-US" altLang="zh-CN" dirty="0"/>
+          </a:p>
+          <a:p>
+            <a:pPr algn="l"/>
+            <a:endParaRPr lang="en-US" altLang="zh-CN" dirty="0"/>
+          </a:p>
+          <a:p>
+            <a:pPr algn="l"/>
+            <a:endParaRPr lang="en-US" altLang="zh-CN" dirty="0"/>
+          </a:p>
+          <a:p>
+            <a:pPr algn="l"/>
+            <a:endParaRPr lang="en-US" altLang="zh-CN" dirty="0"/>
+          </a:p>
+          <a:p>
+            <a:pPr algn="l"/>
+            <a:endParaRPr lang="en-US" altLang="zh-CN" dirty="0"/>
+          </a:p>
+          <a:p>
+            <a:pPr marL="0" indent="0" algn="l">
               <a:buNone/>
             </a:pPr>
-            <a:endParaRPr kumimoji="1" lang="en-US" altLang="zh-CN" dirty="0" smtClean="0"/>
-          </a:p>
-          <a:p>
-            <a:pPr lvl="1"/>
-            <a:r>
-              <a:rPr kumimoji="1" lang="zh-CN" altLang="en-US" dirty="0"/>
-              <a:t>将</a:t>
-            </a:r>
-            <a:r>
-              <a:rPr kumimoji="1" lang="en-US" altLang="zh-CN" dirty="0"/>
-              <a:t>sel4</a:t>
-            </a:r>
-            <a:r>
-              <a:rPr kumimoji="1" lang="zh-CN" altLang="en-US" dirty="0"/>
-              <a:t>用</a:t>
-            </a:r>
-            <a:r>
-              <a:rPr kumimoji="1" lang="en-US" altLang="zh-CN" dirty="0"/>
-              <a:t>rust</a:t>
-            </a:r>
-            <a:r>
-              <a:rPr kumimoji="1" lang="zh-CN" altLang="en-US" dirty="0"/>
-              <a:t>语言重新实现，能够在</a:t>
-            </a:r>
-            <a:r>
-              <a:rPr kumimoji="1" lang="en-US" altLang="zh-CN" dirty="0"/>
-              <a:t>qemu</a:t>
-            </a:r>
-            <a:r>
-              <a:rPr kumimoji="1" lang="zh-CN" altLang="en-US" dirty="0"/>
-              <a:t>模拟的</a:t>
-            </a:r>
-            <a:r>
-              <a:rPr kumimoji="1" lang="en-US" altLang="zh-CN" dirty="0"/>
-              <a:t>riscv</a:t>
-            </a:r>
-            <a:r>
-              <a:rPr kumimoji="1" lang="zh-CN" altLang="en-US" dirty="0"/>
-              <a:t>架构</a:t>
-            </a:r>
-            <a:r>
-              <a:rPr kumimoji="1" lang="en-US" altLang="zh-CN" dirty="0"/>
-              <a:t>cpu</a:t>
-            </a:r>
-            <a:r>
-              <a:rPr kumimoji="1" lang="zh-CN" altLang="en-US" dirty="0"/>
-              <a:t>上成功</a:t>
-            </a:r>
-            <a:r>
-              <a:rPr kumimoji="1" lang="zh-CN" altLang="en-US" dirty="0"/>
-              <a:t>运行</a:t>
-            </a:r>
-            <a:endParaRPr kumimoji="1" lang="zh-CN" altLang="en-US" dirty="0"/>
-          </a:p>
-          <a:p>
-            <a:pPr lvl="1"/>
-            <a:r>
-              <a:rPr kumimoji="1" lang="zh-CN" altLang="en-US" dirty="0"/>
-              <a:t>实现</a:t>
-            </a:r>
-            <a:r>
-              <a:rPr kumimoji="1" lang="en-US" altLang="zh-CN" dirty="0"/>
-              <a:t>sel4</a:t>
-            </a:r>
-            <a:r>
-              <a:rPr kumimoji="1" lang="zh-CN" altLang="en-US" dirty="0"/>
-              <a:t>对上层应用的</a:t>
-            </a:r>
-            <a:r>
-              <a:rPr kumimoji="1" lang="zh-CN" altLang="en-US" dirty="0"/>
-              <a:t>支持</a:t>
-            </a:r>
-            <a:endParaRPr kumimoji="1" lang="zh-CN" altLang="en-US" dirty="0"/>
-          </a:p>
-          <a:p>
-            <a:pPr lvl="1"/>
-            <a:r>
-              <a:rPr kumimoji="1" lang="zh-CN" altLang="en-US" dirty="0"/>
-              <a:t>将</a:t>
-            </a:r>
-            <a:r>
-              <a:rPr kumimoji="1" lang="en-US" altLang="zh-CN" dirty="0"/>
-              <a:t>sel4</a:t>
-            </a:r>
-            <a:r>
-              <a:rPr kumimoji="1" lang="zh-CN" altLang="en-US" dirty="0"/>
-              <a:t>移植到</a:t>
-            </a:r>
-            <a:r>
-              <a:rPr kumimoji="1" lang="en-US" altLang="zh-CN" dirty="0"/>
-              <a:t>loongarch</a:t>
-            </a:r>
-            <a:r>
-              <a:rPr kumimoji="1" lang="zh-CN" altLang="en-US" dirty="0"/>
-              <a:t>上（如果</a:t>
-            </a:r>
-            <a:r>
-              <a:rPr kumimoji="1" lang="zh-CN" altLang="en-US" dirty="0"/>
-              <a:t>有余力）</a:t>
-            </a:r>
-            <a:endParaRPr kumimoji="1" lang="zh-CN" altLang="en-US" dirty="0"/>
-          </a:p>
-          <a:p>
-            <a:pPr lvl="1"/>
-            <a:endParaRPr kumimoji="1" lang="zh-CN" altLang="en-US" dirty="0"/>
+            <a:endParaRPr lang="en-US" altLang="zh-CN" dirty="0"/>
+          </a:p>
+          <a:p>
+            <a:pPr marL="0" indent="0" algn="l">
+              <a:buNone/>
+            </a:pPr>
+            <a:endParaRPr lang="en-US" altLang="zh-CN" dirty="0"/>
+          </a:p>
+          <a:p>
+            <a:pPr algn="l"/>
+            <a:endParaRPr lang="en-US" altLang="zh-CN" dirty="0"/>
           </a:p>
         </p:txBody>
       </p:sp>
@@ -5883,41 +6165,61 @@
           <a:lstStyle/>
           <a:p>
             <a:r>
-              <a:rPr kumimoji="1" lang="zh-CN" altLang="en-US" dirty="0" smtClean="0"/>
-              <a:t>设计任务：</a:t>
-            </a:r>
-            <a:r>
-              <a:rPr kumimoji="1" lang="en-US" altLang="zh-CN" dirty="0" smtClean="0"/>
-              <a:t>sel4</a:t>
-            </a:r>
-            <a:r>
-              <a:rPr kumimoji="1" lang="zh-CN" altLang="en-US" dirty="0" smtClean="0"/>
-              <a:t>的</a:t>
-            </a:r>
-            <a:r>
-              <a:rPr kumimoji="1" lang="en-US" altLang="zh-CN" dirty="0" smtClean="0"/>
-              <a:t>rust</a:t>
-            </a:r>
-            <a:r>
-              <a:rPr kumimoji="1" lang="zh-CN" altLang="en-US" dirty="0" smtClean="0"/>
-              <a:t>化</a:t>
-            </a:r>
-            <a:endParaRPr kumimoji="1" lang="zh-CN" altLang="en-US" dirty="0" smtClean="0"/>
-          </a:p>
-        </p:txBody>
-      </p:sp>
+              <a:rPr lang="zh-CN" altLang="en-US" dirty="0"/>
+              <a:t>设计背景：</a:t>
+            </a:r>
+            <a:r>
+              <a:rPr lang="en-US" altLang="zh-CN" dirty="0"/>
+              <a:t>R-</a:t>
+            </a:r>
+            <a:r>
+              <a:rPr lang="en-US" altLang="zh-CN" dirty="0" err="1"/>
+              <a:t>FreeRTOs</a:t>
+            </a:r>
+            <a:endParaRPr lang="zh-CN" altLang="en-US" dirty="0"/>
+          </a:p>
+        </p:txBody>
+      </p:sp>
+      <p:pic>
+        <p:nvPicPr>
+          <p:cNvPr id="5" name="图片 4">
+            <a:extLst>
+              <a:ext uri="{FF2B5EF4-FFF2-40B4-BE49-F238E27FC236}">
+                <a16:creationId xmlns:a16="http://schemas.microsoft.com/office/drawing/2014/main" id="{9A79D72C-7966-436A-84B8-EB460B79FB00}"/>
+              </a:ext>
+            </a:extLst>
+          </p:cNvPr>
+          <p:cNvPicPr>
+            <a:picLocks noChangeAspect="1"/>
+          </p:cNvPicPr>
+          <p:nvPr/>
+        </p:nvPicPr>
+        <p:blipFill>
+          <a:blip r:embed="rId2"/>
+          <a:stretch>
+            <a:fillRect/>
+          </a:stretch>
+        </p:blipFill>
+        <p:spPr>
+          <a:xfrm>
+            <a:off x="1068079" y="2416882"/>
+            <a:ext cx="6002422" cy="2361875"/>
+          </a:xfrm>
+          <a:prstGeom prst="rect">
+            <a:avLst/>
+          </a:prstGeom>
+        </p:spPr>
+      </p:pic>
     </p:spTree>
+    <p:extLst>
+      <p:ext uri="{BB962C8B-B14F-4D97-AF65-F5344CB8AC3E}">
+        <p14:creationId xmlns:p14="http://schemas.microsoft.com/office/powerpoint/2010/main" val="1815154083"/>
+      </p:ext>
+    </p:extLst>
   </p:cSld>
   <p:clrMapOvr>
     <a:masterClrMapping/>
   </p:clrMapOvr>
-  <p:timing>
-    <p:tnLst>
-      <p:par>
-        <p:cTn id="1" dur="indefinite" restart="never" nodeType="tmRoot"/>
-      </p:par>
-    </p:tnLst>
-  </p:timing>
 </p:sld>
 </file>
 
@@ -5950,7 +6252,7 @@
         </p:nvSpPr>
         <p:spPr>
           <a:xfrm>
-            <a:off x="835307" y="2048614"/>
+            <a:off x="833377" y="1542994"/>
             <a:ext cx="10521387" cy="3678303"/>
           </a:xfrm>
         </p:spPr>
@@ -5960,173 +6262,72 @@
           </a:bodyPr>
           <a:lstStyle/>
           <a:p>
-            <a:r>
-              <a:rPr kumimoji="1" lang="zh-CN" altLang="en-US" dirty="0" smtClean="0"/>
-              <a:t>开题</a:t>
-            </a:r>
-            <a:r>
-              <a:rPr kumimoji="1" lang="en-US" altLang="zh-CN" dirty="0" smtClean="0"/>
-              <a:t>——</a:t>
-            </a:r>
-            <a:r>
-              <a:rPr kumimoji="1" lang="zh-CN" altLang="en-US" dirty="0" smtClean="0"/>
-              <a:t>第二周</a:t>
-            </a:r>
-            <a:endParaRPr kumimoji="1" lang="en-US" altLang="zh-CN" dirty="0" smtClean="0"/>
+            <a:pPr marL="323850" lvl="1" indent="0">
+              <a:buNone/>
+            </a:pPr>
+            <a:endParaRPr kumimoji="1" lang="en-US" altLang="zh-CN" dirty="0"/>
           </a:p>
           <a:p>
             <a:pPr lvl="1"/>
             <a:r>
-              <a:rPr kumimoji="1" lang="zh-CN" altLang="en-US" dirty="0" smtClean="0"/>
-              <a:t>分析</a:t>
-            </a:r>
-            <a:r>
-              <a:rPr kumimoji="1" lang="en-US" altLang="zh-CN" dirty="0" smtClean="0"/>
-              <a:t>rcore</a:t>
-            </a:r>
-            <a:r>
-              <a:rPr kumimoji="1" lang="zh-CN" altLang="en-US" dirty="0" smtClean="0"/>
-              <a:t>、</a:t>
-            </a:r>
-            <a:r>
-              <a:rPr kumimoji="1" lang="en-US" altLang="zh-CN" dirty="0" smtClean="0"/>
-              <a:t>freeRTOS</a:t>
-            </a:r>
-            <a:r>
-              <a:rPr kumimoji="1" lang="zh-CN" altLang="en-US" dirty="0" smtClean="0"/>
-              <a:t>如何实现操作系统，尝试用</a:t>
-            </a:r>
-            <a:r>
-              <a:rPr kumimoji="1" lang="en-US" altLang="zh-CN" dirty="0" smtClean="0"/>
+              <a:rPr kumimoji="1" lang="zh-CN" altLang="en-US" dirty="0"/>
+              <a:t>将</a:t>
+            </a:r>
+            <a:r>
+              <a:rPr kumimoji="1" lang="en-US" altLang="zh-CN" dirty="0"/>
+              <a:t>sel4</a:t>
+            </a:r>
+            <a:r>
+              <a:rPr kumimoji="1" lang="zh-CN" altLang="en-US" dirty="0"/>
+              <a:t>用</a:t>
+            </a:r>
+            <a:r>
+              <a:rPr kumimoji="1" lang="en-US" altLang="zh-CN" dirty="0"/>
               <a:t>rust</a:t>
             </a:r>
             <a:r>
-              <a:rPr kumimoji="1" lang="zh-CN" altLang="en-US" dirty="0" smtClean="0"/>
+              <a:rPr kumimoji="1" lang="zh-CN" altLang="en-US" dirty="0"/>
+              <a:t>语言重新实现，能够在</a:t>
+            </a:r>
+            <a:r>
+              <a:rPr kumimoji="1" lang="en-US" altLang="zh-CN" dirty="0"/>
+              <a:t>qemu</a:t>
+            </a:r>
+            <a:r>
+              <a:rPr kumimoji="1" lang="zh-CN" altLang="en-US" dirty="0"/>
+              <a:t>模拟的</a:t>
+            </a:r>
+            <a:r>
+              <a:rPr kumimoji="1" lang="en-US" altLang="zh-CN" dirty="0"/>
+              <a:t>riscv</a:t>
+            </a:r>
+            <a:r>
+              <a:rPr kumimoji="1" lang="zh-CN" altLang="en-US" dirty="0"/>
+              <a:t>架构</a:t>
+            </a:r>
+            <a:r>
+              <a:rPr kumimoji="1" lang="en-US" altLang="zh-CN" dirty="0"/>
+              <a:t>cpu</a:t>
+            </a:r>
+            <a:r>
+              <a:rPr kumimoji="1" lang="zh-CN" altLang="en-US" dirty="0"/>
+              <a:t>上成功运行</a:t>
+            </a:r>
+          </a:p>
+          <a:p>
+            <a:pPr lvl="1"/>
+            <a:r>
+              <a:rPr kumimoji="1" lang="zh-CN" altLang="en-US" dirty="0"/>
               <a:t>实现</a:t>
             </a:r>
             <a:r>
-              <a:rPr kumimoji="1" lang="en-US" altLang="zh-CN" dirty="0" smtClean="0"/>
-              <a:t>seL</a:t>
-            </a:r>
-            <a:r>
-              <a:rPr kumimoji="1" lang="en-US" altLang="zh-CN" dirty="0" smtClean="0"/>
-              <a:t>4</a:t>
-            </a:r>
-            <a:endParaRPr kumimoji="1" lang="zh-CN" altLang="en-US" dirty="0" smtClean="0"/>
-          </a:p>
-          <a:p>
-            <a:r>
-              <a:rPr kumimoji="1" lang="zh-CN" altLang="en-US" dirty="0" smtClean="0"/>
-              <a:t>第二周</a:t>
-            </a:r>
-            <a:r>
-              <a:rPr kumimoji="1" lang="en-US" altLang="zh-CN" dirty="0" smtClean="0"/>
-              <a:t>——</a:t>
-            </a:r>
-            <a:r>
-              <a:rPr kumimoji="1" lang="zh-CN" altLang="en-US" dirty="0" smtClean="0"/>
-              <a:t>中期前后</a:t>
-            </a:r>
-            <a:endParaRPr kumimoji="1" lang="en-US" altLang="zh-CN" dirty="0" smtClean="0"/>
-          </a:p>
-          <a:p>
-            <a:pPr lvl="1"/>
-            <a:r>
-              <a:rPr kumimoji="1" lang="zh-CN" altLang="en-US" dirty="0" smtClean="0"/>
-              <a:t>实现</a:t>
-            </a:r>
-            <a:r>
-              <a:rPr kumimoji="1" lang="en-US" altLang="zh-CN" dirty="0" smtClean="0"/>
-              <a:t>seL4 rust</a:t>
-            </a:r>
-            <a:r>
-              <a:rPr kumimoji="1" lang="zh-CN" altLang="en-US" dirty="0" smtClean="0"/>
-              <a:t>版，能在</a:t>
-            </a:r>
-            <a:r>
-              <a:rPr kumimoji="1" lang="en-US" altLang="zh-CN" dirty="0" smtClean="0"/>
-              <a:t>qemu</a:t>
-            </a:r>
-            <a:r>
-              <a:rPr kumimoji="1" lang="zh-CN" altLang="en-US" dirty="0" smtClean="0"/>
-              <a:t>模拟的</a:t>
-            </a:r>
-            <a:r>
-              <a:rPr kumimoji="1" lang="en-US" altLang="zh-CN" dirty="0" smtClean="0"/>
-              <a:t>riscv</a:t>
-            </a:r>
-            <a:r>
-              <a:rPr kumimoji="1" lang="zh-CN" altLang="en-US" dirty="0" smtClean="0"/>
-              <a:t>架构</a:t>
-            </a:r>
-            <a:r>
-              <a:rPr kumimoji="1" lang="en-US" altLang="zh-CN" dirty="0" smtClean="0"/>
-              <a:t>cpu</a:t>
-            </a:r>
-            <a:r>
-              <a:rPr kumimoji="1" lang="zh-CN" altLang="en-US" dirty="0" smtClean="0"/>
-              <a:t>上运行</a:t>
-            </a:r>
-            <a:endParaRPr kumimoji="1" lang="en-US" altLang="zh-CN" dirty="0" smtClean="0"/>
-          </a:p>
-          <a:p>
-            <a:r>
-              <a:rPr kumimoji="1" lang="zh-CN" altLang="en-US" dirty="0" smtClean="0"/>
-              <a:t>中期</a:t>
-            </a:r>
-            <a:r>
-              <a:rPr kumimoji="1" lang="en-US" altLang="zh-CN" dirty="0" smtClean="0"/>
-              <a:t>——15</a:t>
-            </a:r>
-            <a:r>
-              <a:rPr kumimoji="1" lang="zh-CN" altLang="en-US" dirty="0" smtClean="0"/>
-              <a:t>周</a:t>
-            </a:r>
-            <a:endParaRPr kumimoji="1" lang="en-US" altLang="zh-CN" dirty="0" smtClean="0"/>
-          </a:p>
-          <a:p>
-            <a:pPr lvl="1"/>
-            <a:r>
-              <a:rPr kumimoji="1" lang="zh-CN" altLang="en-US" dirty="0" smtClean="0"/>
-              <a:t>测试通过</a:t>
-            </a:r>
-            <a:r>
-              <a:rPr kumimoji="1" lang="en-US" altLang="zh-CN" dirty="0" smtClean="0"/>
-              <a:t>seL4-Test</a:t>
-            </a:r>
-            <a:r>
-              <a:rPr kumimoji="1" lang="zh-CN" altLang="en-US" dirty="0" smtClean="0"/>
-              <a:t>中</a:t>
-            </a:r>
-            <a:r>
-              <a:rPr kumimoji="1" lang="zh-CN" altLang="en-US" dirty="0" smtClean="0"/>
-              <a:t>测例，尝试将</a:t>
-            </a:r>
-            <a:r>
-              <a:rPr kumimoji="1" lang="en-US" altLang="zh-CN" dirty="0" smtClean="0"/>
-              <a:t>seL4</a:t>
-            </a:r>
-            <a:r>
-              <a:rPr kumimoji="1" lang="zh-CN" altLang="en-US" dirty="0" smtClean="0"/>
-              <a:t>迁移到</a:t>
-            </a:r>
-            <a:r>
-              <a:rPr kumimoji="1" lang="en-US" altLang="zh-CN" dirty="0" smtClean="0"/>
-              <a:t>loongarch</a:t>
-            </a:r>
-            <a:r>
-              <a:rPr kumimoji="1" lang="zh-CN" altLang="en-US" dirty="0" smtClean="0"/>
-              <a:t>上</a:t>
-            </a:r>
-            <a:endParaRPr kumimoji="1" lang="en-US" altLang="zh-CN" dirty="0" smtClean="0"/>
-          </a:p>
-          <a:p>
-            <a:pPr lvl="1"/>
-            <a:r>
-              <a:rPr kumimoji="1" lang="zh-CN" altLang="en-US" dirty="0" smtClean="0"/>
-              <a:t>撰写论文</a:t>
-            </a:r>
-            <a:endParaRPr kumimoji="1" lang="en-US" altLang="zh-CN" dirty="0" smtClean="0"/>
+              <a:rPr kumimoji="1" lang="en-US" altLang="zh-CN" dirty="0"/>
+              <a:t>sel4</a:t>
+            </a:r>
+            <a:r>
+              <a:rPr kumimoji="1" lang="zh-CN" altLang="en-US" dirty="0"/>
+              <a:t>对上层应用的支持</a:t>
+            </a:r>
           </a:p>
         </p:txBody>
       </p:sp>
@@ -6146,25 +6347,139 @@
           <a:lstStyle/>
           <a:p>
             <a:r>
-              <a:rPr kumimoji="1" lang="zh-CN" altLang="en-US" dirty="0" smtClean="0"/>
-              <a:t>设计规划</a:t>
-            </a:r>
-            <a:endParaRPr kumimoji="1" lang="zh-CN" altLang="en-US" dirty="0"/>
-          </a:p>
-        </p:txBody>
-      </p:sp>
+              <a:rPr kumimoji="1" lang="zh-CN" altLang="en-US" dirty="0"/>
+              <a:t>设计任务：</a:t>
+            </a:r>
+            <a:r>
+              <a:rPr kumimoji="1" lang="en-US" altLang="zh-CN" dirty="0"/>
+              <a:t>sel4</a:t>
+            </a:r>
+            <a:r>
+              <a:rPr kumimoji="1" lang="zh-CN" altLang="en-US" dirty="0"/>
+              <a:t>的</a:t>
+            </a:r>
+            <a:r>
+              <a:rPr kumimoji="1" lang="en-US" altLang="zh-CN" dirty="0"/>
+              <a:t>rust</a:t>
+            </a:r>
+            <a:r>
+              <a:rPr kumimoji="1" lang="zh-CN" altLang="en-US" dirty="0"/>
+              <a:t>化</a:t>
+            </a:r>
+          </a:p>
+        </p:txBody>
+      </p:sp>
+      <p:pic>
+        <p:nvPicPr>
+          <p:cNvPr id="5" name="图片 4">
+            <a:extLst>
+              <a:ext uri="{FF2B5EF4-FFF2-40B4-BE49-F238E27FC236}">
+                <a16:creationId xmlns:a16="http://schemas.microsoft.com/office/drawing/2014/main" id="{EDA60B7F-1E97-44D0-9FEF-1110607568FA}"/>
+              </a:ext>
+            </a:extLst>
+          </p:cNvPr>
+          <p:cNvPicPr>
+            <a:picLocks noChangeAspect="1"/>
+          </p:cNvPicPr>
+          <p:nvPr/>
+        </p:nvPicPr>
+        <p:blipFill>
+          <a:blip r:embed="rId2"/>
+          <a:stretch>
+            <a:fillRect/>
+          </a:stretch>
+        </p:blipFill>
+        <p:spPr>
+          <a:xfrm>
+            <a:off x="1203716" y="2920303"/>
+            <a:ext cx="3911801" cy="2756042"/>
+          </a:xfrm>
+          <a:prstGeom prst="rect">
+            <a:avLst/>
+          </a:prstGeom>
+        </p:spPr>
+      </p:pic>
+      <p:sp>
+        <p:nvSpPr>
+          <p:cNvPr id="8" name="箭头: 右 7">
+            <a:extLst>
+              <a:ext uri="{FF2B5EF4-FFF2-40B4-BE49-F238E27FC236}">
+                <a16:creationId xmlns:a16="http://schemas.microsoft.com/office/drawing/2014/main" id="{9315096A-1E0F-4EB9-96AF-CB1A5E73E803}"/>
+              </a:ext>
+            </a:extLst>
+          </p:cNvPr>
+          <p:cNvSpPr/>
+          <p:nvPr/>
+        </p:nvSpPr>
+        <p:spPr>
+          <a:xfrm>
+            <a:off x="4523160" y="3844343"/>
+            <a:ext cx="1925391" cy="321971"/>
+          </a:xfrm>
+          <a:prstGeom prst="rightArrow">
+            <a:avLst/>
+          </a:prstGeom>
+        </p:spPr>
+        <p:style>
+          <a:lnRef idx="2">
+            <a:schemeClr val="accent3">
+              <a:shade val="50000"/>
+            </a:schemeClr>
+          </a:lnRef>
+          <a:fillRef idx="1">
+            <a:schemeClr val="accent3"/>
+          </a:fillRef>
+          <a:effectRef idx="0">
+            <a:schemeClr val="accent3"/>
+          </a:effectRef>
+          <a:fontRef idx="minor">
+            <a:schemeClr val="lt1"/>
+          </a:fontRef>
+        </p:style>
+        <p:txBody>
+          <a:bodyPr rtlCol="0" anchor="ctr"/>
+          <a:lstStyle/>
+          <a:p>
+            <a:pPr algn="ctr"/>
+            <a:endParaRPr lang="zh-CN" altLang="en-US"/>
+          </a:p>
+        </p:txBody>
+      </p:sp>
+      <p:pic>
+        <p:nvPicPr>
+          <p:cNvPr id="10" name="图片 9">
+            <a:extLst>
+              <a:ext uri="{FF2B5EF4-FFF2-40B4-BE49-F238E27FC236}">
+                <a16:creationId xmlns:a16="http://schemas.microsoft.com/office/drawing/2014/main" id="{04AA33F3-3FDD-4650-8128-4C4FB1F5B934}"/>
+              </a:ext>
+            </a:extLst>
+          </p:cNvPr>
+          <p:cNvPicPr>
+            <a:picLocks noChangeAspect="1"/>
+          </p:cNvPicPr>
+          <p:nvPr/>
+        </p:nvPicPr>
+        <p:blipFill>
+          <a:blip r:embed="rId3"/>
+          <a:stretch>
+            <a:fillRect/>
+          </a:stretch>
+        </p:blipFill>
+        <p:spPr>
+          <a:xfrm>
+            <a:off x="6545808" y="2755073"/>
+            <a:ext cx="3994355" cy="2609984"/>
+          </a:xfrm>
+          <a:prstGeom prst="rect">
+            <a:avLst/>
+          </a:prstGeom>
+        </p:spPr>
+      </p:pic>
     </p:spTree>
   </p:cSld>
   <p:clrMapOvr>
     <a:masterClrMapping/>
   </p:clrMapOvr>
-  <p:timing>
-    <p:tnLst>
-      <p:par>
-        <p:cTn id="1" dur="indefinite" restart="never" nodeType="tmRoot"/>
-      </p:par>
-    </p:tnLst>
-  </p:timing>
 </p:sld>
 </file>
 
@@ -6187,61 +6502,151 @@
       </p:grpSpPr>
       <p:sp>
         <p:nvSpPr>
-          <p:cNvPr id="4" name="标题 3"/>
-          <p:cNvSpPr>
-            <a:spLocks noGrp="1"/>
-          </p:cNvSpPr>
-          <p:nvPr>
-            <p:ph type="ctrTitle"/>
-          </p:nvPr>
-        </p:nvSpPr>
-        <p:spPr/>
-        <p:txBody>
-          <a:bodyPr/>
-          <a:lstStyle/>
-          <a:p>
-            <a:pPr algn="ctr"/>
-            <a:r>
-              <a:rPr kumimoji="1" lang="zh-CN" altLang="en-US" dirty="0" smtClean="0"/>
-              <a:t>谢谢！</a:t>
-            </a:r>
-            <a:endParaRPr kumimoji="1" lang="zh-CN" altLang="en-US" dirty="0"/>
-          </a:p>
-        </p:txBody>
-      </p:sp>
-      <p:sp>
-        <p:nvSpPr>
-          <p:cNvPr id="5" name="副标题 4"/>
-          <p:cNvSpPr>
-            <a:spLocks noGrp="1"/>
-          </p:cNvSpPr>
-          <p:nvPr>
-            <p:ph type="subTitle" idx="1"/>
-          </p:nvPr>
-        </p:nvSpPr>
-        <p:spPr/>
+          <p:cNvPr id="2" name="内容占位符 1"/>
+          <p:cNvSpPr>
+            <a:spLocks noGrp="1"/>
+          </p:cNvSpPr>
+          <p:nvPr>
+            <p:ph idx="1"/>
+          </p:nvPr>
+        </p:nvSpPr>
+        <p:spPr>
+          <a:xfrm>
+            <a:off x="833377" y="1542994"/>
+            <a:ext cx="10521387" cy="3678303"/>
+          </a:xfrm>
+        </p:spPr>
         <p:txBody>
           <a:bodyPr>
             <a:normAutofit/>
           </a:bodyPr>
           <a:lstStyle/>
           <a:p>
+            <a:pPr marL="323850" lvl="1" indent="0">
+              <a:buNone/>
+            </a:pPr>
+            <a:endParaRPr kumimoji="1" lang="en-US" altLang="zh-CN" dirty="0"/>
+          </a:p>
+          <a:p>
+            <a:pPr lvl="1"/>
+            <a:r>
+              <a:rPr kumimoji="1" lang="en-US" altLang="zh-CN" dirty="0" err="1"/>
+              <a:t>Elfloader</a:t>
+            </a:r>
+            <a:r>
+              <a:rPr kumimoji="1" lang="zh-CN" altLang="en-US" dirty="0"/>
+              <a:t>为加载内核的工具，在启动时，先将</a:t>
+            </a:r>
+            <a:r>
+              <a:rPr kumimoji="1" lang="en-US" altLang="zh-CN" dirty="0" err="1"/>
+              <a:t>elfloader</a:t>
+            </a:r>
+            <a:r>
+              <a:rPr kumimoji="1" lang="zh-CN" altLang="en-US" dirty="0"/>
+              <a:t>作为内核运行，它会将真正的内核以及运行在用户态的测试程序加载进来。</a:t>
+            </a:r>
+            <a:endParaRPr kumimoji="1" lang="en-US" altLang="zh-CN" dirty="0"/>
+          </a:p>
+          <a:p>
+            <a:pPr lvl="1"/>
+            <a:r>
+              <a:rPr kumimoji="1" lang="zh-CN" altLang="en-US" dirty="0"/>
+              <a:t>检查内存文件是否合规、内存大小是否充足</a:t>
+            </a:r>
+            <a:endParaRPr kumimoji="1" lang="en-US" altLang="zh-CN" dirty="0"/>
+          </a:p>
+          <a:p>
+            <a:pPr lvl="1"/>
+            <a:r>
+              <a:rPr kumimoji="1" lang="zh-CN" altLang="en-US" dirty="0"/>
+              <a:t>建立简单的页表</a:t>
+            </a:r>
+            <a:endParaRPr kumimoji="1" lang="en-US" altLang="zh-CN" dirty="0"/>
+          </a:p>
+          <a:p>
+            <a:pPr lvl="1"/>
+            <a:r>
+              <a:rPr kumimoji="1" lang="zh-CN" altLang="en-US" dirty="0"/>
+              <a:t>跳转至</a:t>
+            </a:r>
+            <a:r>
+              <a:rPr kumimoji="1" lang="en-US" altLang="zh-CN" dirty="0"/>
+              <a:t>kernel</a:t>
+            </a:r>
+            <a:r>
+              <a:rPr kumimoji="1" lang="zh-CN" altLang="en-US" dirty="0"/>
+              <a:t>运行</a:t>
+            </a:r>
+          </a:p>
+        </p:txBody>
+      </p:sp>
+      <p:sp>
+        <p:nvSpPr>
+          <p:cNvPr id="3" name="标题 2"/>
+          <p:cNvSpPr>
+            <a:spLocks noGrp="1"/>
+          </p:cNvSpPr>
+          <p:nvPr>
+            <p:ph type="title"/>
+          </p:nvPr>
+        </p:nvSpPr>
+        <p:spPr/>
+        <p:txBody>
+          <a:bodyPr/>
+          <a:lstStyle/>
+          <a:p>
+            <a:r>
+              <a:rPr kumimoji="1" lang="zh-CN" altLang="en-US" dirty="0"/>
+              <a:t>设计任务：</a:t>
+            </a:r>
+            <a:r>
+              <a:rPr kumimoji="1" lang="en-US" altLang="zh-CN" dirty="0" err="1"/>
+              <a:t>elfloader</a:t>
+            </a:r>
             <a:endParaRPr kumimoji="1" lang="zh-CN" altLang="en-US" dirty="0"/>
           </a:p>
         </p:txBody>
       </p:sp>
+      <p:pic>
+        <p:nvPicPr>
+          <p:cNvPr id="6" name="图片 5">
+            <a:extLst>
+              <a:ext uri="{FF2B5EF4-FFF2-40B4-BE49-F238E27FC236}">
+                <a16:creationId xmlns:a16="http://schemas.microsoft.com/office/drawing/2014/main" id="{522D9314-06FF-4B95-9AB0-A4EB778E1CBA}"/>
+              </a:ext>
+            </a:extLst>
+          </p:cNvPr>
+          <p:cNvPicPr>
+            <a:picLocks noChangeAspect="1"/>
+          </p:cNvPicPr>
+          <p:nvPr/>
+        </p:nvPicPr>
+        <p:blipFill>
+          <a:blip r:embed="rId2"/>
+          <a:stretch>
+            <a:fillRect/>
+          </a:stretch>
+        </p:blipFill>
+        <p:spPr>
+          <a:xfrm>
+            <a:off x="6403015" y="2654072"/>
+            <a:ext cx="4292821" cy="2444876"/>
+          </a:xfrm>
+          <a:prstGeom prst="rect">
+            <a:avLst/>
+          </a:prstGeom>
+        </p:spPr>
+      </p:pic>
     </p:spTree>
+    <p:extLst>
+      <p:ext uri="{BB962C8B-B14F-4D97-AF65-F5344CB8AC3E}">
+        <p14:creationId xmlns:p14="http://schemas.microsoft.com/office/powerpoint/2010/main" val="3561238737"/>
+      </p:ext>
+    </p:extLst>
   </p:cSld>
   <p:clrMapOvr>
     <a:masterClrMapping/>
   </p:clrMapOvr>
-  <p:timing>
-    <p:tnLst>
-      <p:par>
-        <p:cTn id="1" dur="indefinite" restart="never" nodeType="tmRoot"/>
-      </p:par>
-    </p:tnLst>
-  </p:timing>
 </p:sld>
 </file>
 
@@ -6269,13 +6674,13 @@
             <a:spLocks noGrp="1"/>
           </p:cNvSpPr>
           <p:nvPr>
-            <p:ph sz="half" idx="1"/>
+            <p:ph idx="1"/>
           </p:nvPr>
         </p:nvSpPr>
         <p:spPr>
           <a:xfrm>
-            <a:off x="581025" y="1941195"/>
-            <a:ext cx="10776585" cy="3632835"/>
+            <a:off x="833377" y="1542994"/>
+            <a:ext cx="10521387" cy="3678303"/>
           </a:xfrm>
         </p:spPr>
         <p:txBody>
@@ -6284,152 +6689,444 @@
           </a:bodyPr>
           <a:lstStyle/>
           <a:p>
-            <a:endParaRPr kumimoji="1" lang="en-US" altLang="zh-CN" sz="2000" dirty="0" smtClean="0"/>
-          </a:p>
-          <a:p>
-            <a:r>
-              <a:rPr kumimoji="1" lang="zh-CN" altLang="en-US" sz="2000" dirty="0">
+            <a:pPr marL="323850" lvl="1" indent="0">
+              <a:buNone/>
+            </a:pPr>
+            <a:endParaRPr kumimoji="1" lang="en-US" altLang="zh-CN" dirty="0"/>
+          </a:p>
+          <a:p>
+            <a:pPr lvl="1"/>
+            <a:endParaRPr kumimoji="1" lang="en-US" altLang="zh-CN" dirty="0"/>
+          </a:p>
+        </p:txBody>
+      </p:sp>
+      <p:sp>
+        <p:nvSpPr>
+          <p:cNvPr id="3" name="标题 2"/>
+          <p:cNvSpPr>
+            <a:spLocks noGrp="1"/>
+          </p:cNvSpPr>
+          <p:nvPr>
+            <p:ph type="title"/>
+          </p:nvPr>
+        </p:nvSpPr>
+        <p:spPr/>
+        <p:txBody>
+          <a:bodyPr/>
+          <a:lstStyle/>
+          <a:p>
+            <a:r>
+              <a:rPr kumimoji="1" lang="zh-CN" altLang="en-US" dirty="0"/>
+              <a:t>设计任务：</a:t>
+            </a:r>
+            <a:r>
+              <a:rPr kumimoji="1" lang="en-US" altLang="zh-CN" dirty="0"/>
+              <a:t>kernel</a:t>
+            </a:r>
+            <a:endParaRPr kumimoji="1" lang="zh-CN" altLang="en-US" dirty="0"/>
+          </a:p>
+        </p:txBody>
+      </p:sp>
+      <p:sp>
+        <p:nvSpPr>
+          <p:cNvPr id="5" name="内容占位符 1">
+            <a:extLst>
+              <a:ext uri="{FF2B5EF4-FFF2-40B4-BE49-F238E27FC236}">
+                <a16:creationId xmlns:a16="http://schemas.microsoft.com/office/drawing/2014/main" id="{378CA186-C4CF-479F-8542-4CD21F9CFEDE}"/>
+              </a:ext>
+            </a:extLst>
+          </p:cNvPr>
+          <p:cNvSpPr txBox="1">
+            <a:spLocks/>
+          </p:cNvSpPr>
+          <p:nvPr/>
+        </p:nvSpPr>
+        <p:spPr>
+          <a:xfrm>
+            <a:off x="985777" y="1695394"/>
+            <a:ext cx="10521387" cy="4114710"/>
+          </a:xfrm>
+          <a:prstGeom prst="rect">
+            <a:avLst/>
+          </a:prstGeom>
+        </p:spPr>
+        <p:txBody>
+          <a:bodyPr vert="horz" lIns="91440" tIns="45720" rIns="91440" bIns="45720" rtlCol="0" anchor="t">
+            <a:normAutofit fontScale="92500" lnSpcReduction="10000"/>
+          </a:bodyPr>
+          <a:lstStyle>
+            <a:lvl1pPr marL="306070" indent="-306070" algn="l" defTabSz="457200" rtl="0" eaLnBrk="1" latinLnBrk="0" hangingPunct="1">
+              <a:spcBef>
+                <a:spcPct val="20000"/>
+              </a:spcBef>
+              <a:spcAft>
+                <a:spcPts val="600"/>
+              </a:spcAft>
+              <a:buClr>
+                <a:schemeClr val="accent2"/>
+              </a:buClr>
+              <a:buSzPct val="92000"/>
+              <a:buFont typeface="Wingdings 2" panose="05020102010507070707" pitchFamily="18" charset="2"/>
+              <a:buChar char=""/>
+              <a:defRPr sz="1800" kern="1200">
                 <a:solidFill>
                   <a:schemeClr val="tx2"/>
                 </a:solidFill>
-              </a:rPr>
-              <a:t>微内核发展历程：</a:t>
-            </a:r>
-            <a:r>
-              <a:rPr kumimoji="1" lang="en-US" altLang="zh-CN" sz="2000" dirty="0">
+                <a:latin typeface="+mn-lt"/>
+                <a:ea typeface="+mn-ea"/>
+                <a:cs typeface="+mn-cs"/>
+              </a:defRPr>
+            </a:lvl1pPr>
+            <a:lvl2pPr marL="629920" indent="-306070" algn="l" defTabSz="457200" rtl="0" eaLnBrk="1" latinLnBrk="0" hangingPunct="1">
+              <a:spcBef>
+                <a:spcPct val="20000"/>
+              </a:spcBef>
+              <a:spcAft>
+                <a:spcPts val="600"/>
+              </a:spcAft>
+              <a:buClr>
+                <a:schemeClr val="accent2"/>
+              </a:buClr>
+              <a:buSzPct val="92000"/>
+              <a:buFont typeface="Wingdings 2" panose="05020102010507070707" pitchFamily="18" charset="2"/>
+              <a:buChar char=""/>
+              <a:defRPr sz="1600" kern="1200">
                 <a:solidFill>
                   <a:schemeClr val="tx2"/>
                 </a:solidFill>
-              </a:rPr>
-              <a:t>mach--&gt;L3/L4--&gt;seL4</a:t>
-            </a:r>
-            <a:endParaRPr kumimoji="1" lang="en-US" altLang="zh-CN" sz="2000" dirty="0">
-              <a:solidFill>
-                <a:schemeClr val="tx2"/>
-              </a:solidFill>
-            </a:endParaRPr>
-          </a:p>
-          <a:p>
-            <a:r>
-              <a:rPr kumimoji="1" lang="zh-CN" altLang="en-US" sz="2000" dirty="0">
+                <a:latin typeface="+mn-lt"/>
+                <a:ea typeface="+mn-ea"/>
+                <a:cs typeface="+mn-cs"/>
+              </a:defRPr>
+            </a:lvl2pPr>
+            <a:lvl3pPr marL="899795" indent="-269875" algn="l" defTabSz="457200" rtl="0" eaLnBrk="1" latinLnBrk="0" hangingPunct="1">
+              <a:spcBef>
+                <a:spcPct val="20000"/>
+              </a:spcBef>
+              <a:spcAft>
+                <a:spcPts val="600"/>
+              </a:spcAft>
+              <a:buClr>
+                <a:schemeClr val="accent2"/>
+              </a:buClr>
+              <a:buSzPct val="92000"/>
+              <a:buFont typeface="Wingdings 2" panose="05020102010507070707" pitchFamily="18" charset="2"/>
+              <a:buChar char=""/>
+              <a:defRPr sz="1400" kern="1200">
                 <a:solidFill>
                   <a:schemeClr val="tx2"/>
                 </a:solidFill>
-              </a:rPr>
-              <a:t>所有内核服务都受到访问控制：为了执行特定的操作，应用程序必须调用对所请求的服务具有足够权限的能力。</a:t>
-            </a:r>
-            <a:endParaRPr kumimoji="1" lang="zh-CN" altLang="en-US" sz="2000" dirty="0">
-              <a:solidFill>
-                <a:schemeClr val="tx2"/>
-              </a:solidFill>
-            </a:endParaRPr>
-          </a:p>
-          <a:p>
-            <a:pPr lvl="1"/>
-            <a:r>
-              <a:rPr kumimoji="1" lang="zh-CN" altLang="en-US" sz="1775" dirty="0">
+                <a:latin typeface="+mn-lt"/>
+                <a:ea typeface="+mn-ea"/>
+                <a:cs typeface="+mn-cs"/>
+              </a:defRPr>
+            </a:lvl3pPr>
+            <a:lvl4pPr marL="1242060" indent="-233680" algn="l" defTabSz="457200" rtl="0" eaLnBrk="1" latinLnBrk="0" hangingPunct="1">
+              <a:spcBef>
+                <a:spcPct val="20000"/>
+              </a:spcBef>
+              <a:spcAft>
+                <a:spcPts val="600"/>
+              </a:spcAft>
+              <a:buClr>
+                <a:schemeClr val="accent2"/>
+              </a:buClr>
+              <a:buSzPct val="92000"/>
+              <a:buFont typeface="Wingdings 2" panose="05020102010507070707" pitchFamily="18" charset="2"/>
+              <a:buChar char=""/>
+              <a:defRPr sz="1200" kern="1200">
                 <a:solidFill>
                   <a:schemeClr val="tx2"/>
                 </a:solidFill>
-              </a:rPr>
-              <a:t>细粒度访问</a:t>
-            </a:r>
-            <a:endParaRPr kumimoji="1" lang="zh-CN" altLang="en-US" sz="1775" dirty="0">
-              <a:solidFill>
-                <a:schemeClr val="tx2"/>
-              </a:solidFill>
-            </a:endParaRPr>
-          </a:p>
-          <a:p>
-            <a:pPr lvl="1"/>
-            <a:r>
-              <a:rPr kumimoji="1" lang="zh-CN" altLang="en-US" sz="1775" dirty="0">
+                <a:latin typeface="+mn-lt"/>
+                <a:ea typeface="+mn-ea"/>
+                <a:cs typeface="+mn-cs"/>
+              </a:defRPr>
+            </a:lvl4pPr>
+            <a:lvl5pPr marL="1602105" indent="-233680" algn="l" defTabSz="457200" rtl="0" eaLnBrk="1" latinLnBrk="0" hangingPunct="1">
+              <a:spcBef>
+                <a:spcPct val="20000"/>
+              </a:spcBef>
+              <a:spcAft>
+                <a:spcPts val="600"/>
+              </a:spcAft>
+              <a:buClr>
+                <a:schemeClr val="accent2"/>
+              </a:buClr>
+              <a:buSzPct val="92000"/>
+              <a:buFont typeface="Wingdings 2" panose="05020102010507070707" pitchFamily="18" charset="2"/>
+              <a:buChar char=""/>
+              <a:defRPr sz="1200" kern="1200">
                 <a:solidFill>
                   <a:schemeClr val="tx2"/>
                 </a:solidFill>
-              </a:rPr>
-              <a:t>打桩和授权</a:t>
-            </a:r>
-            <a:r>
-              <a:rPr kumimoji="1" lang="zh-CN" altLang="en-US" sz="1775" dirty="0">
+                <a:latin typeface="+mn-lt"/>
+                <a:ea typeface="+mn-ea"/>
+                <a:cs typeface="+mn-cs"/>
+              </a:defRPr>
+            </a:lvl5pPr>
+            <a:lvl6pPr marL="1899920" indent="-228600" algn="l" defTabSz="457200" rtl="0" eaLnBrk="1" latinLnBrk="0" hangingPunct="1">
+              <a:spcBef>
+                <a:spcPct val="20000"/>
+              </a:spcBef>
+              <a:spcAft>
+                <a:spcPts val="600"/>
+              </a:spcAft>
+              <a:buClr>
+                <a:schemeClr val="accent2"/>
+              </a:buClr>
+              <a:buSzPct val="92000"/>
+              <a:buFont typeface="Wingdings 2" panose="05020102010507070707" pitchFamily="18" charset="2"/>
+              <a:buChar char=""/>
+              <a:defRPr sz="1200" kern="1200">
                 <a:solidFill>
                   <a:schemeClr val="tx2"/>
                 </a:solidFill>
-              </a:rPr>
-              <a:t>机制</a:t>
-            </a:r>
-            <a:endParaRPr kumimoji="1" lang="zh-CN" altLang="en-US" sz="1775" dirty="0">
-              <a:solidFill>
-                <a:schemeClr val="tx2"/>
-              </a:solidFill>
-            </a:endParaRPr>
-          </a:p>
-          <a:p>
-            <a:pPr lvl="1"/>
-            <a:endParaRPr kumimoji="1" lang="en-US" altLang="zh-CN" sz="1775" dirty="0">
-              <a:solidFill>
-                <a:schemeClr val="tx2"/>
-              </a:solidFill>
-            </a:endParaRPr>
-          </a:p>
-          <a:p>
-            <a:pPr marL="0" indent="0">
+                <a:latin typeface="+mn-lt"/>
+                <a:ea typeface="+mn-ea"/>
+                <a:cs typeface="+mn-cs"/>
+              </a:defRPr>
+            </a:lvl6pPr>
+            <a:lvl7pPr marL="2199640" indent="-228600" algn="l" defTabSz="457200" rtl="0" eaLnBrk="1" latinLnBrk="0" hangingPunct="1">
+              <a:spcBef>
+                <a:spcPct val="20000"/>
+              </a:spcBef>
+              <a:spcAft>
+                <a:spcPts val="600"/>
+              </a:spcAft>
+              <a:buClr>
+                <a:schemeClr val="accent2"/>
+              </a:buClr>
+              <a:buSzPct val="92000"/>
+              <a:buFont typeface="Wingdings 2" panose="05020102010507070707" pitchFamily="18" charset="2"/>
+              <a:buChar char=""/>
+              <a:defRPr sz="1200" kern="1200">
+                <a:solidFill>
+                  <a:schemeClr val="tx2"/>
+                </a:solidFill>
+                <a:latin typeface="+mn-lt"/>
+                <a:ea typeface="+mn-ea"/>
+                <a:cs typeface="+mn-cs"/>
+              </a:defRPr>
+            </a:lvl7pPr>
+            <a:lvl8pPr marL="2499995" indent="-228600" algn="l" defTabSz="457200" rtl="0" eaLnBrk="1" latinLnBrk="0" hangingPunct="1">
+              <a:spcBef>
+                <a:spcPct val="20000"/>
+              </a:spcBef>
+              <a:spcAft>
+                <a:spcPts val="600"/>
+              </a:spcAft>
+              <a:buClr>
+                <a:schemeClr val="accent2"/>
+              </a:buClr>
+              <a:buSzPct val="92000"/>
+              <a:buFont typeface="Wingdings 2" panose="05020102010507070707" pitchFamily="18" charset="2"/>
+              <a:buChar char=""/>
+              <a:defRPr sz="1200" kern="1200">
+                <a:solidFill>
+                  <a:schemeClr val="tx2"/>
+                </a:solidFill>
+                <a:latin typeface="+mn-lt"/>
+                <a:ea typeface="+mn-ea"/>
+                <a:cs typeface="+mn-cs"/>
+              </a:defRPr>
+            </a:lvl8pPr>
+            <a:lvl9pPr marL="2799715" indent="-228600" algn="l" defTabSz="457200" rtl="0" eaLnBrk="1" latinLnBrk="0" hangingPunct="1">
+              <a:spcBef>
+                <a:spcPct val="20000"/>
+              </a:spcBef>
+              <a:spcAft>
+                <a:spcPts val="600"/>
+              </a:spcAft>
+              <a:buClr>
+                <a:schemeClr val="accent2"/>
+              </a:buClr>
+              <a:buSzPct val="92000"/>
+              <a:buFont typeface="Wingdings 2" panose="05020102010507070707" pitchFamily="18" charset="2"/>
+              <a:buChar char=""/>
+              <a:defRPr sz="1200" kern="1200">
+                <a:solidFill>
+                  <a:schemeClr val="tx2"/>
+                </a:solidFill>
+                <a:latin typeface="+mn-lt"/>
+                <a:ea typeface="+mn-ea"/>
+                <a:cs typeface="+mn-cs"/>
+              </a:defRPr>
+            </a:lvl9pPr>
+          </a:lstStyle>
+          <a:p>
+            <a:pPr marL="323850" lvl="1" indent="0">
+              <a:buFont typeface="Wingdings 2" panose="05020102010507070707" pitchFamily="18" charset="2"/>
               <a:buNone/>
             </a:pPr>
-            <a:endParaRPr kumimoji="1" lang="en-US" altLang="zh-CN" sz="2000" dirty="0">
-              <a:solidFill>
-                <a:schemeClr val="tx2"/>
-              </a:solidFill>
-            </a:endParaRPr>
-          </a:p>
-        </p:txBody>
-      </p:sp>
-      <p:sp>
-        <p:nvSpPr>
-          <p:cNvPr id="3" name="标题 2"/>
-          <p:cNvSpPr>
-            <a:spLocks noGrp="1"/>
-          </p:cNvSpPr>
-          <p:nvPr>
-            <p:ph type="title"/>
-          </p:nvPr>
-        </p:nvSpPr>
-        <p:spPr/>
-        <p:txBody>
-          <a:bodyPr/>
-          <a:lstStyle/>
-          <a:p>
-            <a:r>
-              <a:rPr kumimoji="1" lang="zh-CN" altLang="en-US" cap="none" dirty="0" smtClean="0"/>
-              <a:t>设计背景：</a:t>
-            </a:r>
-            <a:r>
-              <a:rPr kumimoji="1" lang="en-US" altLang="zh-CN" cap="none" dirty="0" smtClean="0"/>
-              <a:t> </a:t>
-            </a:r>
-            <a:r>
-              <a:rPr kumimoji="1" lang="zh-CN" altLang="en-US" cap="none" dirty="0" smtClean="0"/>
-              <a:t>基于能力的控制</a:t>
-            </a:r>
-            <a:r>
-              <a:rPr kumimoji="1" lang="zh-CN" altLang="en-US" cap="none" dirty="0" smtClean="0"/>
-              <a:t>访问</a:t>
-            </a:r>
-            <a:endParaRPr kumimoji="1" lang="zh-CN" altLang="en-US" cap="none" dirty="0" smtClean="0"/>
+            <a:endParaRPr kumimoji="1" lang="en-US" altLang="zh-CN" dirty="0"/>
+          </a:p>
+          <a:p>
+            <a:pPr lvl="1"/>
+            <a:r>
+              <a:rPr kumimoji="1" lang="zh-CN" altLang="en-US" dirty="0"/>
+              <a:t>实现内容：</a:t>
+            </a:r>
+            <a:endParaRPr kumimoji="1" lang="en-US" altLang="zh-CN" dirty="0"/>
+          </a:p>
+          <a:p>
+            <a:pPr lvl="2"/>
+            <a:r>
+              <a:rPr kumimoji="1" lang="en-US" altLang="zh-CN" dirty="0"/>
+              <a:t>Kernel </a:t>
+            </a:r>
+            <a:r>
+              <a:rPr kumimoji="1" lang="zh-CN" altLang="en-US" dirty="0"/>
+              <a:t>内核对象</a:t>
+            </a:r>
+            <a:endParaRPr kumimoji="1" lang="en-US" altLang="zh-CN" dirty="0"/>
+          </a:p>
+          <a:p>
+            <a:pPr lvl="3"/>
+            <a:r>
+              <a:rPr kumimoji="1" lang="en-US" altLang="zh-CN" dirty="0" err="1"/>
+              <a:t>CSpace</a:t>
+            </a:r>
+            <a:r>
+              <a:rPr kumimoji="1" lang="zh-CN" altLang="en-US" dirty="0"/>
+              <a:t>、</a:t>
+            </a:r>
+            <a:r>
+              <a:rPr kumimoji="1" lang="en-US" altLang="zh-CN" dirty="0" err="1"/>
+              <a:t>CNode</a:t>
+            </a:r>
+            <a:endParaRPr kumimoji="1" lang="en-US" altLang="zh-CN" dirty="0"/>
+          </a:p>
+          <a:p>
+            <a:pPr lvl="3"/>
+            <a:r>
+              <a:rPr kumimoji="1" lang="en-US" altLang="zh-CN" dirty="0"/>
+              <a:t>TCB</a:t>
+            </a:r>
+          </a:p>
+          <a:p>
+            <a:pPr lvl="3"/>
+            <a:r>
+              <a:rPr kumimoji="1" lang="en-US" altLang="zh-CN" dirty="0"/>
+              <a:t>IPC(Endpoint</a:t>
+            </a:r>
+            <a:r>
+              <a:rPr kumimoji="1" lang="zh-CN" altLang="en-US" dirty="0"/>
+              <a:t>、</a:t>
+            </a:r>
+            <a:r>
+              <a:rPr kumimoji="1" lang="en-US" altLang="zh-CN" dirty="0"/>
+              <a:t>Notification)</a:t>
+            </a:r>
+          </a:p>
+          <a:p>
+            <a:pPr lvl="3"/>
+            <a:r>
+              <a:rPr kumimoji="1" lang="en-US" altLang="zh-CN" dirty="0" err="1"/>
+              <a:t>VSpace</a:t>
+            </a:r>
+            <a:endParaRPr kumimoji="1" lang="en-US" altLang="zh-CN" dirty="0"/>
+          </a:p>
+          <a:p>
+            <a:pPr lvl="3"/>
+            <a:r>
+              <a:rPr kumimoji="1" lang="en-US" altLang="zh-CN" dirty="0" err="1"/>
+              <a:t>IRQHandler</a:t>
+            </a:r>
+            <a:endParaRPr kumimoji="1" lang="en-US" altLang="zh-CN" dirty="0"/>
+          </a:p>
+          <a:p>
+            <a:pPr lvl="3"/>
+            <a:r>
+              <a:rPr kumimoji="1" lang="en-US" altLang="zh-CN" dirty="0"/>
+              <a:t>Reply Object</a:t>
+            </a:r>
+          </a:p>
+          <a:p>
+            <a:pPr lvl="2"/>
+            <a:r>
+              <a:rPr kumimoji="1" lang="en-US" altLang="zh-CN" dirty="0"/>
+              <a:t>Kernel</a:t>
+            </a:r>
+            <a:r>
+              <a:rPr kumimoji="1" lang="zh-CN" altLang="en-US" dirty="0"/>
+              <a:t>内核服务</a:t>
+            </a:r>
+            <a:endParaRPr kumimoji="1" lang="en-US" altLang="zh-CN" dirty="0"/>
+          </a:p>
+          <a:p>
+            <a:pPr lvl="3"/>
+            <a:r>
+              <a:rPr kumimoji="1" lang="zh-CN" altLang="en-US" dirty="0"/>
+              <a:t>启动流程</a:t>
+            </a:r>
+            <a:endParaRPr kumimoji="1" lang="en-US" altLang="zh-CN" dirty="0"/>
+          </a:p>
+          <a:p>
+            <a:pPr lvl="4"/>
+            <a:r>
+              <a:rPr kumimoji="1" lang="zh-CN" altLang="en-US" dirty="0"/>
+              <a:t>初始化中断处理程序</a:t>
+            </a:r>
+            <a:endParaRPr kumimoji="1" lang="en-US" altLang="zh-CN" dirty="0"/>
+          </a:p>
+          <a:p>
+            <a:pPr lvl="4"/>
+            <a:r>
+              <a:rPr kumimoji="1" lang="zh-CN" altLang="en-US" dirty="0"/>
+              <a:t>创建</a:t>
+            </a:r>
+            <a:r>
+              <a:rPr kumimoji="1" lang="en-US" altLang="zh-CN" dirty="0" err="1"/>
+              <a:t>BootInfo</a:t>
+            </a:r>
+            <a:r>
+              <a:rPr kumimoji="1" lang="en-US" altLang="zh-CN" dirty="0"/>
+              <a:t> frame </a:t>
+            </a:r>
+            <a:r>
+              <a:rPr kumimoji="1" lang="zh-CN" altLang="en-US" dirty="0"/>
+              <a:t>，引导创建初始线程</a:t>
+            </a:r>
+            <a:endParaRPr kumimoji="1" lang="en-US" altLang="zh-CN" dirty="0"/>
+          </a:p>
+          <a:p>
+            <a:pPr lvl="4"/>
+            <a:r>
+              <a:rPr kumimoji="1" lang="zh-CN" altLang="en-US" dirty="0"/>
+              <a:t>开启页表</a:t>
+            </a:r>
+            <a:endParaRPr kumimoji="1" lang="en-US" altLang="zh-CN" dirty="0"/>
+          </a:p>
+          <a:p>
+            <a:pPr marL="1008380" lvl="3" indent="0">
+              <a:buNone/>
+            </a:pPr>
+            <a:endParaRPr kumimoji="1" lang="en-US" altLang="zh-CN" dirty="0"/>
+          </a:p>
+          <a:p>
+            <a:pPr lvl="3"/>
+            <a:endParaRPr kumimoji="1" lang="en-US" altLang="zh-CN" dirty="0"/>
+          </a:p>
+          <a:p>
+            <a:pPr lvl="3"/>
+            <a:endParaRPr kumimoji="1" lang="zh-CN" altLang="en-US" dirty="0"/>
           </a:p>
         </p:txBody>
       </p:sp>
       <p:pic>
         <p:nvPicPr>
-          <p:cNvPr id="5" name="图片 4"/>
+          <p:cNvPr id="9" name="图片 8">
+            <a:extLst>
+              <a:ext uri="{FF2B5EF4-FFF2-40B4-BE49-F238E27FC236}">
+                <a16:creationId xmlns:a16="http://schemas.microsoft.com/office/drawing/2014/main" id="{32339FAE-DC10-4B2F-92E9-2F2C8BD35B25}"/>
+              </a:ext>
+            </a:extLst>
+          </p:cNvPr>
           <p:cNvPicPr>
             <a:picLocks noChangeAspect="1"/>
           </p:cNvPicPr>
-          <p:nvPr>
-            <p:custDataLst>
-              <p:tags r:id="rId1"/>
-            </p:custDataLst>
-          </p:nvPr>
+          <p:nvPr/>
         </p:nvPicPr>
         <p:blipFill>
           <a:blip r:embed="rId2"/>
@@ -6439,8 +7136,38 @@
         </p:blipFill>
         <p:spPr>
           <a:xfrm>
-            <a:off x="6651625" y="533400"/>
-            <a:ext cx="4464050" cy="1612900"/>
+            <a:off x="6075116" y="815238"/>
+            <a:ext cx="5584448" cy="4267110"/>
+          </a:xfrm>
+          <a:prstGeom prst="rect">
+            <a:avLst/>
+          </a:prstGeom>
+        </p:spPr>
+      </p:pic>
+      <p:pic>
+        <p:nvPicPr>
+          <p:cNvPr id="13" name="图片 12">
+            <a:extLst>
+              <a:ext uri="{FF2B5EF4-FFF2-40B4-BE49-F238E27FC236}">
+                <a16:creationId xmlns:a16="http://schemas.microsoft.com/office/drawing/2014/main" id="{C821DD45-A8CA-4615-849C-9E7FB9D42374}"/>
+              </a:ext>
+            </a:extLst>
+          </p:cNvPr>
+          <p:cNvPicPr>
+            <a:picLocks noChangeAspect="1"/>
+          </p:cNvPicPr>
+          <p:nvPr/>
+        </p:nvPicPr>
+        <p:blipFill>
+          <a:blip r:embed="rId3"/>
+          <a:stretch>
+            <a:fillRect/>
+          </a:stretch>
+        </p:blipFill>
+        <p:spPr>
+          <a:xfrm>
+            <a:off x="6158464" y="5255888"/>
+            <a:ext cx="4390063" cy="1281972"/>
           </a:xfrm>
           <a:prstGeom prst="rect">
             <a:avLst/>
@@ -6448,29 +7175,21 @@
         </p:spPr>
       </p:pic>
     </p:spTree>
+    <p:extLst>
+      <p:ext uri="{BB962C8B-B14F-4D97-AF65-F5344CB8AC3E}">
+        <p14:creationId xmlns:p14="http://schemas.microsoft.com/office/powerpoint/2010/main" val="711345352"/>
+      </p:ext>
+    </p:extLst>
   </p:cSld>
   <p:clrMapOvr>
     <a:masterClrMapping/>
   </p:clrMapOvr>
-  <p:timing>
-    <p:tnLst>
-      <p:par>
-        <p:cTn id="1" dur="indefinite" restart="never" nodeType="tmRoot"/>
-      </p:par>
-    </p:tnLst>
-  </p:timing>
 </p:sld>
 </file>
 
 <file path=ppt/tags/tag1.xml><?xml version="1.0" encoding="utf-8"?>
-<p:tagLst xmlns:p="http://schemas.openxmlformats.org/presentationml/2006/main">
+<p:tagLst xmlns:a="http://schemas.openxmlformats.org/drawingml/2006/main" xmlns:r="http://schemas.openxmlformats.org/officeDocument/2006/relationships" xmlns:p="http://schemas.openxmlformats.org/presentationml/2006/main">
   <p:tag name="KSO_WM_UNIT_PLACING_PICTURE_USER_VIEWPORT" val="{&quot;height&quot;:9570,&quot;width&quot;:16420}"/>
-</p:tagLst>
-</file>
-
-<file path=ppt/tags/tag2.xml><?xml version="1.0" encoding="utf-8"?>
-<p:tagLst xmlns:p="http://schemas.openxmlformats.org/presentationml/2006/main">
-  <p:tag name="KSO_WM_UNIT_PLACING_PICTURE_USER_VIEWPORT" val="{&quot;height&quot;:2800,&quot;width&quot;:7750}"/>
 </p:tagLst>
 </file>
 
@@ -6733,6 +7452,8 @@
       </a:bgFillStyleLst>
     </a:fmtScheme>
   </a:themeElements>
+  <a:objectDefaults/>
+  <a:extraClrSchemeLst/>
   <a:extLst>
     <a:ext uri="{05A4C25C-085E-4340-85A3-A5531E510DB2}">
       <thm15:themeFamily xmlns:thm15="http://schemas.microsoft.com/office/thememl/2012/main" name="Office Theme" id="{62F939B6-93AF-4DB8-9C6B-D6C7DFDC589F}" vid="{4A3C46E8-61CC-4603-A589-7422A47A8E4A}"/>
@@ -6992,6 +7713,8 @@
       </a:bgFillStyleLst>
     </a:fmtScheme>
   </a:themeElements>
+  <a:objectDefaults/>
+  <a:extraClrSchemeLst/>
   <a:extLst>
     <a:ext uri="{05A4C25C-085E-4340-85A3-A5531E510DB2}">
       <thm15:themeFamily xmlns:thm15="http://schemas.microsoft.com/office/thememl/2012/main" name="Office Theme" id="{62F939B6-93AF-4DB8-9C6B-D6C7DFDC589F}" vid="{4A3C46E8-61CC-4603-A589-7422A47A8E4A}"/>

</xml_diff>

<commit_message>
modify opening report 2
</commit_message>
<xml_diff>
--- a/record/开题报告——李龙昊.pptx
+++ b/record/开题报告——李龙昊.pptx
@@ -5118,7 +5118,11 @@
             <a:pPr lvl="1"/>
             <a:r>
               <a:rPr kumimoji="1" lang="zh-CN" altLang="zh-CN" dirty="0"/>
-              <a:t>代码量大</a:t>
+              <a:t>代码量大，涉及代码类型</a:t>
+            </a:r>
+            <a:r>
+              <a:rPr kumimoji="1" lang="zh-CN" altLang="zh-CN" dirty="0"/>
+              <a:t>众多</a:t>
             </a:r>
             <a:endParaRPr kumimoji="1" lang="zh-CN" altLang="zh-CN" dirty="0"/>
           </a:p>
@@ -5134,7 +5138,47 @@
             </a:r>
             <a:r>
               <a:rPr kumimoji="1" lang="zh-CN" altLang="en-US" sz="1400" dirty="0"/>
-              <a:t>行</a:t>
+              <a:t>行，包含</a:t>
+            </a:r>
+            <a:r>
+              <a:rPr kumimoji="1" lang="en-US" altLang="zh-CN" sz="1400" dirty="0"/>
+              <a:t>.c </a:t>
+            </a:r>
+            <a:r>
+              <a:rPr kumimoji="1" lang="zh-CN" altLang="en-US" sz="1400" dirty="0"/>
+              <a:t>、汇编、</a:t>
+            </a:r>
+            <a:r>
+              <a:rPr kumimoji="1" lang="en-US" altLang="zh-CN" sz="1400" dirty="0"/>
+              <a:t>.ld</a:t>
+            </a:r>
+            <a:r>
+              <a:rPr kumimoji="1" lang="zh-CN" altLang="en-US" sz="1400" dirty="0"/>
+              <a:t>、</a:t>
+            </a:r>
+            <a:r>
+              <a:rPr kumimoji="1" lang="en-US" altLang="zh-CN" sz="1400" dirty="0"/>
+              <a:t>.py </a:t>
+            </a:r>
+            <a:r>
+              <a:rPr kumimoji="1" lang="zh-CN" altLang="en-US" sz="1400" dirty="0"/>
+              <a:t>、</a:t>
+            </a:r>
+            <a:r>
+              <a:rPr kumimoji="1" lang="en-US" altLang="zh-CN" sz="1400" dirty="0"/>
+              <a:t> .sh</a:t>
+            </a:r>
+            <a:r>
+              <a:rPr kumimoji="1" lang="zh-CN" altLang="en-US" sz="1400" dirty="0"/>
+              <a:t>、</a:t>
+            </a:r>
+            <a:r>
+              <a:rPr kumimoji="1" lang="en-US" altLang="zh-CN" sz="1400" dirty="0"/>
+              <a:t>cmake</a:t>
+            </a:r>
+            <a:r>
+              <a:rPr kumimoji="1" lang="zh-CN" altLang="en-US" sz="1400" dirty="0"/>
+              <a:t>等文件</a:t>
             </a:r>
             <a:endParaRPr kumimoji="1" lang="zh-CN" altLang="zh-CN" dirty="0"/>
           </a:p>
@@ -5155,6 +5199,18 @@
             <a:r>
               <a:rPr kumimoji="1" lang="zh-CN" altLang="en-US" dirty="0"/>
               <a:t>相关资料内容少</a:t>
+            </a:r>
+            <a:endParaRPr kumimoji="1" lang="zh-CN" altLang="en-US" dirty="0"/>
+          </a:p>
+          <a:p>
+            <a:pPr lvl="2"/>
+            <a:r>
+              <a:rPr kumimoji="1" lang="en-US" altLang="zh-CN" dirty="0"/>
+              <a:t>相比于 </a:t>
+            </a:r>
+            <a:r>
+              <a:rPr kumimoji="1" lang="en-US" altLang="zh-CN" dirty="0"/>
+              <a:t>freerots，seL4 的官方指导资料和技术博客较少，官方只提供了架构无关的设计思想，</a:t>
             </a:r>
             <a:endParaRPr kumimoji="1" lang="en-US" altLang="zh-CN" dirty="0"/>
           </a:p>
@@ -5188,8 +5244,8 @@
         </p:blipFill>
         <p:spPr>
           <a:xfrm>
-            <a:off x="6780530" y="1100455"/>
-            <a:ext cx="4574540" cy="2311400"/>
+            <a:off x="7519670" y="1125220"/>
+            <a:ext cx="4389120" cy="2217420"/>
           </a:xfrm>
           <a:prstGeom prst="rect">
             <a:avLst/>
@@ -5212,7 +5268,7 @@
         </p:blipFill>
         <p:spPr>
           <a:xfrm>
-            <a:off x="6102350" y="3720465"/>
+            <a:off x="6026150" y="4541520"/>
             <a:ext cx="5576570" cy="1384935"/>
           </a:xfrm>
           <a:prstGeom prst="rect">
@@ -5675,30 +5731,6 @@
           </a:prstGeom>
         </p:spPr>
       </p:pic>
-      <p:pic>
-        <p:nvPicPr>
-          <p:cNvPr id="7" name="图片 6"/>
-          <p:cNvPicPr>
-            <a:picLocks noChangeAspect="1"/>
-          </p:cNvPicPr>
-          <p:nvPr/>
-        </p:nvPicPr>
-        <p:blipFill>
-          <a:blip r:embed="rId2"/>
-          <a:stretch>
-            <a:fillRect/>
-          </a:stretch>
-        </p:blipFill>
-        <p:spPr>
-          <a:xfrm>
-            <a:off x="1767840" y="4179570"/>
-            <a:ext cx="7518400" cy="2190750"/>
-          </a:xfrm>
-          <a:prstGeom prst="rect">
-            <a:avLst/>
-          </a:prstGeom>
-        </p:spPr>
-      </p:pic>
     </p:spTree>
   </p:cSld>
   <p:clrMapOvr>
@@ -5771,7 +5803,17 @@
             <a:pPr lvl="1"/>
             <a:r>
               <a:rPr kumimoji="1" lang="zh-CN" altLang="en-US" sz="1600" dirty="0"/>
-              <a:t>打桩和授权机制</a:t>
+              <a:t>打桩机制</a:t>
+            </a:r>
+            <a:endParaRPr kumimoji="1" lang="zh-CN" altLang="en-US" sz="1600" dirty="0"/>
+          </a:p>
+          <a:p>
+            <a:pPr lvl="0"/>
+            <a:r>
+              <a:rPr kumimoji="1" lang="zh-CN" altLang="en-US" dirty="0">
+                <a:sym typeface="+mn-ea"/>
+              </a:rPr>
+              <a:t>可信计算库小</a:t>
             </a:r>
             <a:endParaRPr kumimoji="1" lang="zh-CN" altLang="en-US" dirty="0"/>
           </a:p>
@@ -5853,8 +5895,32 @@
         </p:blipFill>
         <p:spPr>
           <a:xfrm>
-            <a:off x="5739130" y="1548765"/>
-            <a:ext cx="6022975" cy="3510280"/>
+            <a:off x="5358765" y="3577590"/>
+            <a:ext cx="5004435" cy="2916555"/>
+          </a:xfrm>
+          <a:prstGeom prst="rect">
+            <a:avLst/>
+          </a:prstGeom>
+        </p:spPr>
+      </p:pic>
+      <p:pic>
+        <p:nvPicPr>
+          <p:cNvPr id="7" name="图片 6"/>
+          <p:cNvPicPr>
+            <a:picLocks noChangeAspect="1"/>
+          </p:cNvPicPr>
+          <p:nvPr/>
+        </p:nvPicPr>
+        <p:blipFill>
+          <a:blip r:embed="rId3"/>
+          <a:stretch>
+            <a:fillRect/>
+          </a:stretch>
+        </p:blipFill>
+        <p:spPr>
+          <a:xfrm>
+            <a:off x="4364990" y="1303655"/>
+            <a:ext cx="7518400" cy="2190750"/>
           </a:xfrm>
           <a:prstGeom prst="rect">
             <a:avLst/>
@@ -6002,12 +6068,36 @@
               <a:buChar char=""/>
             </a:pPr>
             <a:r>
+              <a:rPr lang="en-US" altLang="zh-CN" dirty="0">
+                <a:solidFill>
+                  <a:schemeClr val="tx2"/>
+                </a:solidFill>
+              </a:rPr>
+              <a:t>benchmark </a:t>
+            </a:r>
+            <a:r>
               <a:rPr lang="zh-CN" altLang="en-US" dirty="0">
                 <a:solidFill>
                   <a:schemeClr val="tx2"/>
                 </a:solidFill>
               </a:rPr>
-              <a:t>零成本抽象</a:t>
+              <a:t>测试与</a:t>
+            </a:r>
+            <a:r>
+              <a:rPr lang="en-US" altLang="zh-CN" dirty="0">
+                <a:solidFill>
+                  <a:schemeClr val="tx2"/>
+                </a:solidFill>
+              </a:rPr>
+              <a:t>c</a:t>
+            </a:r>
+            <a:r>
+              <a:rPr lang="zh-CN" altLang="en-US" dirty="0">
+                <a:solidFill>
+                  <a:schemeClr val="tx2"/>
+                </a:solidFill>
+              </a:rPr>
+              <a:t>不相上下</a:t>
             </a:r>
             <a:endParaRPr lang="zh-CN" altLang="en-US" dirty="0">
               <a:solidFill>
@@ -6305,7 +6395,7 @@
                 <a:latin typeface="黑体" panose="02010609060101010101" pitchFamily="49" charset="-122"/>
                 <a:ea typeface="黑体" panose="02010609060101010101" pitchFamily="49" charset="-122"/>
               </a:rPr>
-              <a:t>基础事件组操作，不同任务间的同步。</a:t>
+              <a:t>基础事件组，不同任务间的同步。</a:t>
             </a:r>
             <a:endParaRPr lang="en-US" altLang="zh-CN" dirty="0"/>
           </a:p>
@@ -6328,7 +6418,11 @@
           <a:p>
             <a:r>
               <a:rPr lang="zh-CN" altLang="en-US" dirty="0"/>
-              <a:t>设计背景：</a:t>
+              <a:t>相关</a:t>
+            </a:r>
+            <a:r>
+              <a:rPr lang="zh-CN" altLang="en-US" dirty="0"/>
+              <a:t>工作：</a:t>
             </a:r>
             <a:r>
               <a:rPr lang="en-US" altLang="zh-CN" dirty="0"/>
@@ -6643,7 +6737,11 @@
           <a:p>
             <a:r>
               <a:rPr lang="zh-CN" altLang="en-US" dirty="0"/>
-              <a:t>设计背景：</a:t>
+              <a:t>相关</a:t>
+            </a:r>
+            <a:r>
+              <a:rPr lang="zh-CN" altLang="en-US" dirty="0"/>
+              <a:t>工作：</a:t>
             </a:r>
             <a:r>
               <a:rPr lang="en-US" altLang="zh-CN" dirty="0"/>
@@ -6659,7 +6757,7 @@
       </p:sp>
       <p:pic>
         <p:nvPicPr>
-          <p:cNvPr id="5" name="图片 4"/>
+          <p:cNvPr id="4" name="图片 3"/>
           <p:cNvPicPr>
             <a:picLocks noChangeAspect="1"/>
           </p:cNvPicPr>
@@ -6673,8 +6771,8 @@
         </p:blipFill>
         <p:spPr>
           <a:xfrm>
-            <a:off x="1068079" y="2416882"/>
-            <a:ext cx="6002422" cy="2361875"/>
+            <a:off x="1272540" y="2384425"/>
+            <a:ext cx="5424170" cy="2478405"/>
           </a:xfrm>
           <a:prstGeom prst="rect">
             <a:avLst/>
@@ -6820,21 +6918,17 @@
             </a:r>
             <a:r>
               <a:rPr kumimoji="1" lang="en-US" altLang="zh-CN" dirty="0"/>
+              <a:t>rust</a:t>
+            </a:r>
+            <a:r>
+              <a:rPr kumimoji="1" lang="zh-CN" altLang="en-US" dirty="0"/>
+              <a:t>语言实现</a:t>
+            </a:r>
+            <a:r>
+              <a:rPr kumimoji="1" lang="en-US" altLang="zh-CN" dirty="0"/>
               <a:t>sel4</a:t>
             </a:r>
-            <a:r>
-              <a:rPr kumimoji="1" lang="zh-CN" altLang="en-US" dirty="0"/>
-              <a:t>的</a:t>
-            </a:r>
-            <a:r>
-              <a:rPr kumimoji="1" lang="en-US" altLang="zh-CN" dirty="0"/>
-              <a:t>rust</a:t>
-            </a:r>
-            <a:r>
-              <a:rPr kumimoji="1" lang="zh-CN" altLang="en-US" dirty="0"/>
-              <a:t>化</a:t>
-            </a:r>
-            <a:endParaRPr kumimoji="1" lang="zh-CN" altLang="en-US" dirty="0"/>
+            <a:endParaRPr kumimoji="1" lang="en-US" altLang="zh-CN" dirty="0"/>
           </a:p>
         </p:txBody>
       </p:sp>
@@ -7185,7 +7279,7 @@
         </p:spPr>
         <p:txBody>
           <a:bodyPr vert="horz" lIns="91440" tIns="45720" rIns="91440" bIns="45720" rtlCol="0" anchor="t">
-            <a:normAutofit fontScale="92500" lnSpcReduction="10000"/>
+            <a:normAutofit/>
           </a:bodyPr>
           <a:lstStyle>
             <a:lvl1pPr marL="306070" indent="-306070" algn="l" defTabSz="457200" rtl="0" eaLnBrk="1" latinLnBrk="0" hangingPunct="1">
@@ -7457,8 +7551,12 @@
           <a:p>
             <a:pPr lvl="3"/>
             <a:r>
-              <a:rPr kumimoji="1" lang="en-US" altLang="zh-CN" dirty="0" err="1"/>
-              <a:t>VSpace</a:t>
+              <a:rPr kumimoji="1" lang="en-US" altLang="zh-CN" dirty="0"/>
+              <a:t>Reply </a:t>
+            </a:r>
+            <a:r>
+              <a:rPr kumimoji="1" lang="en-US" altLang="zh-CN" dirty="0"/>
+              <a:t>Object</a:t>
             </a:r>
             <a:endParaRPr kumimoji="1" lang="en-US" altLang="zh-CN" dirty="0"/>
           </a:p>
@@ -7471,14 +7569,6 @@
             <a:endParaRPr kumimoji="1" lang="en-US" altLang="zh-CN" dirty="0"/>
           </a:p>
           <a:p>
-            <a:pPr lvl="3"/>
-            <a:r>
-              <a:rPr kumimoji="1" lang="en-US" altLang="zh-CN" dirty="0"/>
-              <a:t>Reply Object</a:t>
-            </a:r>
-            <a:endParaRPr kumimoji="1" lang="en-US" altLang="zh-CN" dirty="0"/>
-          </a:p>
-          <a:p>
             <a:pPr lvl="2"/>
             <a:r>
               <a:rPr kumimoji="1" lang="en-US" altLang="zh-CN" dirty="0"/>
@@ -7494,44 +7584,28 @@
             <a:pPr lvl="3"/>
             <a:r>
               <a:rPr kumimoji="1" lang="zh-CN" altLang="en-US" dirty="0"/>
-              <a:t>启动流程</a:t>
-            </a:r>
-            <a:endParaRPr kumimoji="1" lang="en-US" altLang="zh-CN" dirty="0"/>
-          </a:p>
-          <a:p>
-            <a:pPr lvl="4"/>
+              <a:t>启动</a:t>
+            </a:r>
             <a:r>
               <a:rPr kumimoji="1" lang="zh-CN" altLang="en-US" dirty="0"/>
-              <a:t>初始化中断处理程序</a:t>
-            </a:r>
-            <a:endParaRPr kumimoji="1" lang="en-US" altLang="zh-CN" dirty="0"/>
-          </a:p>
-          <a:p>
-            <a:pPr lvl="4"/>
+              <a:t>初始化流程</a:t>
+            </a:r>
+            <a:endParaRPr kumimoji="1" lang="zh-CN" altLang="en-US" dirty="0"/>
+          </a:p>
+          <a:p>
+            <a:pPr lvl="3"/>
             <a:r>
               <a:rPr kumimoji="1" lang="zh-CN" altLang="en-US" dirty="0"/>
-              <a:t>创建</a:t>
-            </a:r>
-            <a:r>
-              <a:rPr kumimoji="1" lang="en-US" altLang="zh-CN" dirty="0" err="1"/>
-              <a:t>BootInfo</a:t>
-            </a:r>
-            <a:r>
-              <a:rPr kumimoji="1" lang="en-US" altLang="zh-CN" dirty="0"/>
-              <a:t> frame </a:t>
+              <a:t>操控内核对象的</a:t>
             </a:r>
             <a:r>
               <a:rPr kumimoji="1" lang="zh-CN" altLang="en-US" dirty="0"/>
-              <a:t>，引导创建初始线程</a:t>
-            </a:r>
-            <a:endParaRPr kumimoji="1" lang="en-US" altLang="zh-CN" dirty="0"/>
-          </a:p>
-          <a:p>
-            <a:pPr lvl="4"/>
-            <a:r>
-              <a:rPr kumimoji="1" lang="zh-CN" altLang="en-US" dirty="0"/>
-              <a:t>开启页表</a:t>
-            </a:r>
+              <a:t>服务</a:t>
+            </a:r>
+            <a:endParaRPr kumimoji="1" lang="zh-CN" altLang="en-US" dirty="0"/>
+          </a:p>
+          <a:p>
+            <a:pPr lvl="3"/>
             <a:endParaRPr kumimoji="1" lang="en-US" altLang="zh-CN" dirty="0"/>
           </a:p>
           <a:p>

</xml_diff>

<commit_message>
transfer trap syscall task part from rcore to sel4
</commit_message>
<xml_diff>
--- a/record/开题报告——李龙昊.pptx
+++ b/record/开题报告——李龙昊.pptx
@@ -5,19 +5,18 @@
     <p:sldMasterId id="2147483648" r:id="rId1"/>
   </p:sldMasterIdLst>
   <p:notesMasterIdLst>
-    <p:notesMasterId r:id="rId15"/>
+    <p:notesMasterId r:id="rId6"/>
   </p:notesMasterIdLst>
   <p:sldIdLst>
     <p:sldId id="270" r:id="rId3"/>
     <p:sldId id="277" r:id="rId4"/>
     <p:sldId id="271" r:id="rId5"/>
-    <p:sldId id="272" r:id="rId6"/>
-    <p:sldId id="286" r:id="rId7"/>
-    <p:sldId id="292" r:id="rId8"/>
+    <p:sldId id="272" r:id="rId7"/>
+    <p:sldId id="286" r:id="rId8"/>
     <p:sldId id="291" r:id="rId9"/>
     <p:sldId id="293" r:id="rId10"/>
-    <p:sldId id="294" r:id="rId11"/>
-    <p:sldId id="298" r:id="rId12"/>
+    <p:sldId id="301" r:id="rId11"/>
+    <p:sldId id="294" r:id="rId12"/>
     <p:sldId id="276" r:id="rId13"/>
     <p:sldId id="282" r:id="rId14"/>
   </p:sldIdLst>
@@ -466,6 +465,138 @@
     </a:lvl9pPr>
   </p:notesStyle>
 </p:notesMaster>
+</file>
+
+<file path=ppt/notesSlides/notesSlide1.xml><?xml version="1.0" encoding="utf-8"?>
+<p:notes xmlns:a="http://schemas.openxmlformats.org/drawingml/2006/main" xmlns:r="http://schemas.openxmlformats.org/officeDocument/2006/relationships" xmlns:p="http://schemas.openxmlformats.org/presentationml/2006/main">
+  <p:cSld>
+    <p:spTree>
+      <p:nvGrpSpPr>
+        <p:cNvPr id="1" name=""/>
+        <p:cNvGrpSpPr/>
+        <p:nvPr/>
+      </p:nvGrpSpPr>
+      <p:grpSpPr/>
+      <p:sp>
+        <p:nvSpPr>
+          <p:cNvPr id="2" name="幻灯片图像占位符 1"/>
+          <p:cNvSpPr/>
+          <p:nvPr>
+            <p:ph type="sldImg" idx="2"/>
+          </p:nvPr>
+        </p:nvSpPr>
+        <p:spPr/>
+      </p:sp>
+      <p:sp>
+        <p:nvSpPr>
+          <p:cNvPr id="3" name="文本占位符 2"/>
+          <p:cNvSpPr/>
+          <p:nvPr>
+            <p:ph type="body" idx="3"/>
+          </p:nvPr>
+        </p:nvSpPr>
+        <p:spPr/>
+        <p:txBody>
+          <a:bodyPr/>
+          <a:p>
+            <a:endParaRPr lang="zh-CN" altLang="en-US"/>
+          </a:p>
+        </p:txBody>
+      </p:sp>
+    </p:spTree>
+  </p:cSld>
+  <p:clrMapOvr>
+    <a:masterClrMapping/>
+  </p:clrMapOvr>
+</p:notes>
+</file>
+
+<file path=ppt/notesSlides/notesSlide2.xml><?xml version="1.0" encoding="utf-8"?>
+<p:notes xmlns:a="http://schemas.openxmlformats.org/drawingml/2006/main" xmlns:r="http://schemas.openxmlformats.org/officeDocument/2006/relationships" xmlns:p="http://schemas.openxmlformats.org/presentationml/2006/main">
+  <p:cSld>
+    <p:spTree>
+      <p:nvGrpSpPr>
+        <p:cNvPr id="1" name=""/>
+        <p:cNvGrpSpPr/>
+        <p:nvPr/>
+      </p:nvGrpSpPr>
+      <p:grpSpPr/>
+      <p:sp>
+        <p:nvSpPr>
+          <p:cNvPr id="2" name="幻灯片图像占位符 1"/>
+          <p:cNvSpPr/>
+          <p:nvPr>
+            <p:ph type="sldImg" idx="2"/>
+          </p:nvPr>
+        </p:nvSpPr>
+        <p:spPr/>
+      </p:sp>
+      <p:sp>
+        <p:nvSpPr>
+          <p:cNvPr id="3" name="文本占位符 2"/>
+          <p:cNvSpPr/>
+          <p:nvPr>
+            <p:ph type="body" idx="3"/>
+          </p:nvPr>
+        </p:nvSpPr>
+        <p:spPr/>
+        <p:txBody>
+          <a:bodyPr/>
+          <a:p>
+            <a:endParaRPr lang="zh-CN" altLang="en-US"/>
+          </a:p>
+        </p:txBody>
+      </p:sp>
+    </p:spTree>
+  </p:cSld>
+  <p:clrMapOvr>
+    <a:masterClrMapping/>
+  </p:clrMapOvr>
+</p:notes>
+</file>
+
+<file path=ppt/notesSlides/notesSlide3.xml><?xml version="1.0" encoding="utf-8"?>
+<p:notes xmlns:a="http://schemas.openxmlformats.org/drawingml/2006/main" xmlns:r="http://schemas.openxmlformats.org/officeDocument/2006/relationships" xmlns:p="http://schemas.openxmlformats.org/presentationml/2006/main">
+  <p:cSld>
+    <p:spTree>
+      <p:nvGrpSpPr>
+        <p:cNvPr id="1" name=""/>
+        <p:cNvGrpSpPr/>
+        <p:nvPr/>
+      </p:nvGrpSpPr>
+      <p:grpSpPr/>
+      <p:sp>
+        <p:nvSpPr>
+          <p:cNvPr id="2" name="幻灯片图像占位符 1"/>
+          <p:cNvSpPr/>
+          <p:nvPr>
+            <p:ph type="sldImg" idx="2"/>
+          </p:nvPr>
+        </p:nvSpPr>
+        <p:spPr/>
+      </p:sp>
+      <p:sp>
+        <p:nvSpPr>
+          <p:cNvPr id="3" name="文本占位符 2"/>
+          <p:cNvSpPr/>
+          <p:nvPr>
+            <p:ph type="body" idx="3"/>
+          </p:nvPr>
+        </p:nvSpPr>
+        <p:spPr/>
+        <p:txBody>
+          <a:bodyPr/>
+          <a:p>
+            <a:endParaRPr lang="zh-CN" altLang="en-US"/>
+          </a:p>
+        </p:txBody>
+      </p:sp>
+    </p:spTree>
+  </p:cSld>
+  <p:clrMapOvr>
+    <a:masterClrMapping/>
+  </p:clrMapOvr>
+</p:notes>
 </file>
 
 <file path=ppt/slideLayouts/slideLayout1.xml><?xml version="1.0" encoding="utf-8"?>
@@ -4778,15 +4909,15 @@
             </a:r>
             <a:r>
               <a:rPr kumimoji="1" lang="en-US" altLang="zh-CN" dirty="0"/>
+              <a:t>01</a:t>
+            </a:r>
+            <a:r>
+              <a:rPr kumimoji="1" lang="zh-CN" altLang="en-US" dirty="0"/>
+              <a:t>月</a:t>
+            </a:r>
+            <a:r>
+              <a:rPr kumimoji="1" lang="en-US" altLang="zh-CN" dirty="0"/>
               <a:t>12</a:t>
-            </a:r>
-            <a:r>
-              <a:rPr kumimoji="1" lang="zh-CN" altLang="en-US" dirty="0"/>
-              <a:t>月</a:t>
-            </a:r>
-            <a:r>
-              <a:rPr kumimoji="1" lang="en-US" altLang="zh-CN" dirty="0"/>
-              <a:t>31</a:t>
             </a:r>
             <a:r>
               <a:rPr kumimoji="1" lang="zh-CN" altLang="en-US" dirty="0"/>
@@ -4840,6 +4971,1104 @@
         </p:nvSpPr>
         <p:spPr>
           <a:xfrm>
+            <a:off x="835307" y="2048614"/>
+            <a:ext cx="10521387" cy="4448778"/>
+          </a:xfrm>
+        </p:spPr>
+        <p:txBody>
+          <a:bodyPr>
+            <a:normAutofit/>
+          </a:bodyPr>
+          <a:lstStyle/>
+          <a:p>
+            <a:r>
+              <a:rPr kumimoji="1" lang="zh-CN" altLang="en-US" dirty="0"/>
+              <a:t>开题</a:t>
+            </a:r>
+            <a:r>
+              <a:rPr kumimoji="1" lang="en-US" altLang="zh-CN" dirty="0"/>
+              <a:t>——</a:t>
+            </a:r>
+            <a:r>
+              <a:rPr kumimoji="1" lang="zh-CN" altLang="en-US" dirty="0"/>
+              <a:t>开题</a:t>
+            </a:r>
+            <a:r>
+              <a:rPr kumimoji="1" lang="zh-CN" altLang="en-US" dirty="0"/>
+              <a:t>一周后</a:t>
+            </a:r>
+            <a:endParaRPr kumimoji="1" lang="en-US" altLang="zh-CN" dirty="0"/>
+          </a:p>
+          <a:p>
+            <a:pPr lvl="1"/>
+            <a:r>
+              <a:rPr kumimoji="1" lang="zh-CN" altLang="en-US" dirty="0"/>
+              <a:t>调研</a:t>
+            </a:r>
+            <a:r>
+              <a:rPr kumimoji="1" lang="en-US" altLang="zh-CN" dirty="0"/>
+              <a:t>sel4</a:t>
+            </a:r>
+            <a:r>
+              <a:rPr kumimoji="1" lang="zh-CN" altLang="en-US" dirty="0"/>
+              <a:t>代码，理解各部分</a:t>
+            </a:r>
+            <a:r>
+              <a:rPr kumimoji="1" lang="zh-CN" altLang="en-US" dirty="0"/>
+              <a:t>功能原理</a:t>
+            </a:r>
+            <a:endParaRPr kumimoji="1" lang="zh-CN" altLang="en-US" dirty="0"/>
+          </a:p>
+          <a:p>
+            <a:r>
+              <a:rPr kumimoji="1" lang="zh-CN" altLang="en-US" dirty="0"/>
+              <a:t>开题两周后</a:t>
+            </a:r>
+            <a:r>
+              <a:rPr kumimoji="1" lang="en-US" altLang="zh-CN" dirty="0"/>
+              <a:t>——</a:t>
+            </a:r>
+            <a:r>
+              <a:rPr kumimoji="1" lang="zh-CN" altLang="en-US" dirty="0"/>
+              <a:t>开学前后</a:t>
+            </a:r>
+            <a:endParaRPr kumimoji="1" lang="en-US" altLang="zh-CN" dirty="0"/>
+          </a:p>
+          <a:p>
+            <a:pPr lvl="1"/>
+            <a:r>
+              <a:rPr kumimoji="1" lang="zh-CN" altLang="en-US" dirty="0"/>
+              <a:t>编写一个简单的内核并实现任务调度</a:t>
+            </a:r>
+            <a:endParaRPr kumimoji="1" lang="en-US" altLang="zh-CN" dirty="0"/>
+          </a:p>
+          <a:p>
+            <a:r>
+              <a:rPr kumimoji="1" lang="zh-CN" altLang="en-US" dirty="0"/>
+              <a:t>开学前后</a:t>
+            </a:r>
+            <a:r>
+              <a:rPr kumimoji="1" lang="en-US" altLang="zh-CN" dirty="0"/>
+              <a:t>——</a:t>
+            </a:r>
+            <a:r>
+              <a:rPr kumimoji="1" lang="zh-CN" altLang="en-US" dirty="0"/>
+              <a:t>中期前后</a:t>
+            </a:r>
+            <a:endParaRPr kumimoji="1" lang="en-US" altLang="zh-CN" dirty="0"/>
+          </a:p>
+          <a:p>
+            <a:pPr lvl="1"/>
+            <a:r>
+              <a:rPr kumimoji="1" lang="zh-CN" altLang="en-US" dirty="0"/>
+              <a:t>完成能力空间、内存管理、中断异常三部分的工作</a:t>
+            </a:r>
+            <a:endParaRPr kumimoji="1" lang="en-US" altLang="zh-CN" dirty="0"/>
+          </a:p>
+          <a:p>
+            <a:r>
+              <a:rPr kumimoji="1" lang="zh-CN" altLang="en-US" dirty="0"/>
+              <a:t>中期</a:t>
+            </a:r>
+            <a:r>
+              <a:rPr kumimoji="1" lang="en-US" altLang="zh-CN" dirty="0"/>
+              <a:t>——</a:t>
+            </a:r>
+            <a:r>
+              <a:rPr kumimoji="1" lang="zh-CN" altLang="en-US" dirty="0"/>
+              <a:t>中期两周后</a:t>
+            </a:r>
+            <a:endParaRPr kumimoji="1" lang="en-US" altLang="zh-CN" dirty="0"/>
+          </a:p>
+          <a:p>
+            <a:pPr lvl="1"/>
+            <a:r>
+              <a:rPr kumimoji="1" lang="zh-CN" altLang="en-US" dirty="0"/>
+              <a:t>完成进程间通信部分</a:t>
+            </a:r>
+            <a:endParaRPr kumimoji="1" lang="en-US" altLang="zh-CN" dirty="0"/>
+          </a:p>
+          <a:p>
+            <a:r>
+              <a:rPr kumimoji="1" lang="zh-CN" altLang="en-US" dirty="0"/>
+              <a:t>中期</a:t>
+            </a:r>
+            <a:r>
+              <a:rPr kumimoji="1" lang="en-US" altLang="zh-CN" dirty="0"/>
+              <a:t>——</a:t>
+            </a:r>
+            <a:r>
+              <a:rPr kumimoji="1" lang="zh-CN" altLang="en-US" dirty="0"/>
+              <a:t>最后</a:t>
+            </a:r>
+            <a:endParaRPr kumimoji="1" lang="en-US" altLang="zh-CN" dirty="0"/>
+          </a:p>
+          <a:p>
+            <a:pPr lvl="1"/>
+            <a:r>
+              <a:rPr kumimoji="1" lang="zh-CN" altLang="en-US" dirty="0"/>
+              <a:t>寻找、修改</a:t>
+            </a:r>
+            <a:r>
+              <a:rPr kumimoji="1" lang="en-US" altLang="zh-CN" dirty="0"/>
+              <a:t>bug</a:t>
+            </a:r>
+            <a:r>
+              <a:rPr kumimoji="1" lang="zh-CN" altLang="en-US" dirty="0"/>
+              <a:t>，撰写论文</a:t>
+            </a:r>
+            <a:endParaRPr kumimoji="1" lang="en-US" altLang="zh-CN" dirty="0"/>
+          </a:p>
+          <a:p>
+            <a:endParaRPr kumimoji="1" lang="en-US" altLang="zh-CN" dirty="0"/>
+          </a:p>
+        </p:txBody>
+      </p:sp>
+      <p:sp>
+        <p:nvSpPr>
+          <p:cNvPr id="3" name="标题 2"/>
+          <p:cNvSpPr>
+            <a:spLocks noGrp="1"/>
+          </p:cNvSpPr>
+          <p:nvPr>
+            <p:ph type="title"/>
+          </p:nvPr>
+        </p:nvSpPr>
+        <p:spPr/>
+        <p:txBody>
+          <a:bodyPr/>
+          <a:lstStyle/>
+          <a:p>
+            <a:r>
+              <a:rPr kumimoji="1" lang="zh-CN" altLang="en-US" dirty="0"/>
+              <a:t>设计规划</a:t>
+            </a:r>
+            <a:endParaRPr kumimoji="1" lang="zh-CN" altLang="en-US" dirty="0"/>
+          </a:p>
+        </p:txBody>
+      </p:sp>
+    </p:spTree>
+  </p:cSld>
+  <p:clrMapOvr>
+    <a:masterClrMapping/>
+  </p:clrMapOvr>
+</p:sld>
+</file>
+
+<file path=ppt/slides/slide11.xml><?xml version="1.0" encoding="utf-8"?>
+<p:sld xmlns:a="http://schemas.openxmlformats.org/drawingml/2006/main" xmlns:r="http://schemas.openxmlformats.org/officeDocument/2006/relationships" xmlns:p="http://schemas.openxmlformats.org/presentationml/2006/main">
+  <p:cSld>
+    <p:spTree>
+      <p:nvGrpSpPr>
+        <p:cNvPr id="1" name=""/>
+        <p:cNvGrpSpPr/>
+        <p:nvPr/>
+      </p:nvGrpSpPr>
+      <p:grpSpPr>
+        <a:xfrm>
+          <a:off x="0" y="0"/>
+          <a:ext cx="0" cy="0"/>
+          <a:chOff x="0" y="0"/>
+          <a:chExt cx="0" cy="0"/>
+        </a:xfrm>
+      </p:grpSpPr>
+      <p:sp>
+        <p:nvSpPr>
+          <p:cNvPr id="4" name="标题 3"/>
+          <p:cNvSpPr>
+            <a:spLocks noGrp="1"/>
+          </p:cNvSpPr>
+          <p:nvPr>
+            <p:ph type="ctrTitle"/>
+          </p:nvPr>
+        </p:nvSpPr>
+        <p:spPr/>
+        <p:txBody>
+          <a:bodyPr/>
+          <a:lstStyle/>
+          <a:p>
+            <a:pPr algn="ctr"/>
+            <a:r>
+              <a:rPr kumimoji="1" lang="zh-CN" altLang="en-US" dirty="0"/>
+              <a:t>谢谢！</a:t>
+            </a:r>
+            <a:endParaRPr kumimoji="1" lang="zh-CN" altLang="en-US" dirty="0"/>
+          </a:p>
+        </p:txBody>
+      </p:sp>
+      <p:sp>
+        <p:nvSpPr>
+          <p:cNvPr id="5" name="副标题 4"/>
+          <p:cNvSpPr>
+            <a:spLocks noGrp="1"/>
+          </p:cNvSpPr>
+          <p:nvPr>
+            <p:ph type="subTitle" idx="1"/>
+          </p:nvPr>
+        </p:nvSpPr>
+        <p:spPr/>
+        <p:txBody>
+          <a:bodyPr>
+            <a:normAutofit/>
+          </a:bodyPr>
+          <a:lstStyle/>
+          <a:p>
+            <a:endParaRPr kumimoji="1" lang="zh-CN" altLang="en-US" dirty="0"/>
+          </a:p>
+        </p:txBody>
+      </p:sp>
+    </p:spTree>
+  </p:cSld>
+  <p:clrMapOvr>
+    <a:masterClrMapping/>
+  </p:clrMapOvr>
+</p:sld>
+</file>
+
+<file path=ppt/slides/slide2.xml><?xml version="1.0" encoding="utf-8"?>
+<p:sld xmlns:a="http://schemas.openxmlformats.org/drawingml/2006/main" xmlns:r="http://schemas.openxmlformats.org/officeDocument/2006/relationships" xmlns:p="http://schemas.openxmlformats.org/presentationml/2006/main">
+  <p:cSld>
+    <p:spTree>
+      <p:nvGrpSpPr>
+        <p:cNvPr id="1" name=""/>
+        <p:cNvGrpSpPr/>
+        <p:nvPr/>
+      </p:nvGrpSpPr>
+      <p:grpSpPr>
+        <a:xfrm>
+          <a:off x="0" y="0"/>
+          <a:ext cx="0" cy="0"/>
+          <a:chOff x="0" y="0"/>
+          <a:chExt cx="0" cy="0"/>
+        </a:xfrm>
+      </p:grpSpPr>
+      <p:sp>
+        <p:nvSpPr>
+          <p:cNvPr id="2" name="内容占位符 1"/>
+          <p:cNvSpPr>
+            <a:spLocks noGrp="1"/>
+          </p:cNvSpPr>
+          <p:nvPr>
+            <p:ph idx="1"/>
+          </p:nvPr>
+        </p:nvSpPr>
+        <p:spPr/>
+        <p:txBody>
+          <a:bodyPr/>
+          <a:lstStyle/>
+          <a:p>
+            <a:r>
+              <a:rPr kumimoji="1" lang="zh-CN" altLang="en-US" dirty="0"/>
+              <a:t>高安全性 、高性能的操作系统微内核</a:t>
+            </a:r>
+            <a:endParaRPr kumimoji="1" lang="zh-CN" altLang="en-US" dirty="0"/>
+          </a:p>
+          <a:p>
+            <a:r>
+              <a:rPr kumimoji="1" lang="zh-CN" altLang="en-US" dirty="0"/>
+              <a:t>混合临界系统：即在同时运行可靠和不可靠代码的情况下，可以保证关键可靠代码的硬实时性，可信代码实时性不会被非可信代码的异常行为破坏</a:t>
+            </a:r>
+            <a:endParaRPr kumimoji="1" lang="zh-CN" altLang="en-US" dirty="0"/>
+          </a:p>
+          <a:p>
+            <a:r>
+              <a:rPr kumimoji="1" lang="en-US" altLang="zh-CN" dirty="0"/>
+              <a:t>c</a:t>
+            </a:r>
+            <a:r>
+              <a:rPr kumimoji="1" lang="zh-CN" altLang="en-US" dirty="0"/>
+              <a:t>编写，内核部分代码有</a:t>
+            </a:r>
+            <a:r>
+              <a:rPr kumimoji="1" lang="en-US" altLang="zh-CN" dirty="0"/>
+              <a:t>1w</a:t>
+            </a:r>
+            <a:r>
+              <a:rPr kumimoji="1" lang="zh-CN" altLang="en-US" dirty="0"/>
+              <a:t>行左右</a:t>
+            </a:r>
+            <a:endParaRPr kumimoji="1" lang="zh-CN" altLang="en-US" dirty="0"/>
+          </a:p>
+        </p:txBody>
+      </p:sp>
+      <p:sp>
+        <p:nvSpPr>
+          <p:cNvPr id="3" name="标题 2"/>
+          <p:cNvSpPr>
+            <a:spLocks noGrp="1"/>
+          </p:cNvSpPr>
+          <p:nvPr>
+            <p:ph type="title"/>
+          </p:nvPr>
+        </p:nvSpPr>
+        <p:spPr/>
+        <p:txBody>
+          <a:bodyPr/>
+          <a:lstStyle/>
+          <a:p>
+            <a:r>
+              <a:rPr kumimoji="1" lang="zh-CN" altLang="en-US" dirty="0"/>
+              <a:t>设计背景：</a:t>
+            </a:r>
+            <a:r>
+              <a:rPr kumimoji="1" lang="en-US" altLang="zh-CN" dirty="0"/>
+              <a:t>sEL4</a:t>
+            </a:r>
+            <a:endParaRPr kumimoji="1" lang="en-US" altLang="zh-CN" dirty="0"/>
+          </a:p>
+        </p:txBody>
+      </p:sp>
+      <p:pic>
+        <p:nvPicPr>
+          <p:cNvPr id="6" name="图片 5"/>
+          <p:cNvPicPr>
+            <a:picLocks noChangeAspect="1"/>
+          </p:cNvPicPr>
+          <p:nvPr/>
+        </p:nvPicPr>
+        <p:blipFill>
+          <a:blip r:embed="rId1"/>
+          <a:stretch>
+            <a:fillRect/>
+          </a:stretch>
+        </p:blipFill>
+        <p:spPr>
+          <a:xfrm>
+            <a:off x="8919210" y="618490"/>
+            <a:ext cx="2051050" cy="965200"/>
+          </a:xfrm>
+          <a:prstGeom prst="rect">
+            <a:avLst/>
+          </a:prstGeom>
+        </p:spPr>
+      </p:pic>
+    </p:spTree>
+  </p:cSld>
+  <p:clrMapOvr>
+    <a:masterClrMapping/>
+  </p:clrMapOvr>
+</p:sld>
+</file>
+
+<file path=ppt/slides/slide3.xml><?xml version="1.0" encoding="utf-8"?>
+<p:sld xmlns:a="http://schemas.openxmlformats.org/drawingml/2006/main" xmlns:r="http://schemas.openxmlformats.org/officeDocument/2006/relationships" xmlns:p="http://schemas.openxmlformats.org/presentationml/2006/main">
+  <p:cSld>
+    <p:spTree>
+      <p:nvGrpSpPr>
+        <p:cNvPr id="1" name=""/>
+        <p:cNvGrpSpPr/>
+        <p:nvPr/>
+      </p:nvGrpSpPr>
+      <p:grpSpPr>
+        <a:xfrm>
+          <a:off x="0" y="0"/>
+          <a:ext cx="0" cy="0"/>
+          <a:chOff x="0" y="0"/>
+          <a:chExt cx="0" cy="0"/>
+        </a:xfrm>
+      </p:grpSpPr>
+      <p:sp>
+        <p:nvSpPr>
+          <p:cNvPr id="6" name="内容占位符 5"/>
+          <p:cNvSpPr>
+            <a:spLocks noGrp="1"/>
+          </p:cNvSpPr>
+          <p:nvPr>
+            <p:ph idx="1"/>
+          </p:nvPr>
+        </p:nvSpPr>
+        <p:spPr>
+          <a:xfrm>
+            <a:off x="890528" y="1729648"/>
+            <a:ext cx="6306774" cy="3678303"/>
+          </a:xfrm>
+        </p:spPr>
+        <p:txBody>
+          <a:bodyPr>
+            <a:normAutofit/>
+          </a:bodyPr>
+          <a:lstStyle/>
+          <a:p>
+            <a:endParaRPr kumimoji="1" lang="en-US" altLang="zh-CN" dirty="0"/>
+          </a:p>
+          <a:p>
+            <a:r>
+              <a:rPr kumimoji="1" lang="en-US" altLang="zh-CN" dirty="0"/>
+              <a:t>capability</a:t>
+            </a:r>
+            <a:r>
+              <a:rPr kumimoji="1" lang="zh-CN" altLang="en-US" dirty="0"/>
+              <a:t>机制</a:t>
+            </a:r>
+            <a:endParaRPr kumimoji="1" lang="zh-CN" altLang="en-US" dirty="0"/>
+          </a:p>
+          <a:p>
+            <a:pPr lvl="0"/>
+            <a:r>
+              <a:rPr kumimoji="1" lang="zh-CN" altLang="en-US" dirty="0">
+                <a:sym typeface="+mn-ea"/>
+              </a:rPr>
+              <a:t>可信计算库小</a:t>
+            </a:r>
+            <a:endParaRPr kumimoji="1" lang="zh-CN" altLang="en-US" dirty="0"/>
+          </a:p>
+          <a:p>
+            <a:r>
+              <a:rPr kumimoji="1" lang="zh-CN" altLang="en-US" dirty="0"/>
+              <a:t>用户程序之间的</a:t>
+            </a:r>
+            <a:r>
+              <a:rPr kumimoji="1" lang="zh-CN" altLang="en-US" dirty="0"/>
+              <a:t>隔离</a:t>
+            </a:r>
+            <a:endParaRPr kumimoji="1" lang="zh-CN" altLang="en-US" dirty="0"/>
+          </a:p>
+          <a:p>
+            <a:r>
+              <a:rPr kumimoji="1" lang="zh-CN" altLang="en-US" dirty="0"/>
+              <a:t>全面的形式化</a:t>
+            </a:r>
+            <a:r>
+              <a:rPr kumimoji="1" lang="zh-CN" altLang="en-US" dirty="0"/>
+              <a:t>验证</a:t>
+            </a:r>
+            <a:endParaRPr kumimoji="1" lang="zh-CN" altLang="en-US" dirty="0"/>
+          </a:p>
+          <a:p>
+            <a:endParaRPr kumimoji="1" lang="zh-CN" altLang="en-US" dirty="0"/>
+          </a:p>
+        </p:txBody>
+      </p:sp>
+      <p:sp>
+        <p:nvSpPr>
+          <p:cNvPr id="5" name="标题 4"/>
+          <p:cNvSpPr>
+            <a:spLocks noGrp="1"/>
+          </p:cNvSpPr>
+          <p:nvPr>
+            <p:ph type="title"/>
+          </p:nvPr>
+        </p:nvSpPr>
+        <p:spPr/>
+        <p:txBody>
+          <a:bodyPr/>
+          <a:lstStyle/>
+          <a:p>
+            <a:r>
+              <a:rPr kumimoji="1" lang="zh-CN" altLang="en-US" dirty="0"/>
+              <a:t>设计背景：</a:t>
+            </a:r>
+            <a:r>
+              <a:rPr kumimoji="1" lang="en-US" altLang="zh-CN" dirty="0"/>
+              <a:t>sel4</a:t>
+            </a:r>
+            <a:r>
+              <a:rPr kumimoji="1" lang="zh-CN" altLang="en-US" dirty="0"/>
+              <a:t>安全性</a:t>
+            </a:r>
+            <a:endParaRPr kumimoji="1" lang="zh-CN" altLang="en-US" dirty="0"/>
+          </a:p>
+        </p:txBody>
+      </p:sp>
+      <p:pic>
+        <p:nvPicPr>
+          <p:cNvPr id="2" name="图片 1"/>
+          <p:cNvPicPr>
+            <a:picLocks noChangeAspect="1"/>
+          </p:cNvPicPr>
+          <p:nvPr>
+            <p:custDataLst>
+              <p:tags r:id="rId1"/>
+            </p:custDataLst>
+          </p:nvPr>
+        </p:nvPicPr>
+        <p:blipFill>
+          <a:blip r:embed="rId2"/>
+          <a:stretch>
+            <a:fillRect/>
+          </a:stretch>
+        </p:blipFill>
+        <p:spPr>
+          <a:xfrm>
+            <a:off x="5358765" y="3577590"/>
+            <a:ext cx="5004435" cy="2916555"/>
+          </a:xfrm>
+          <a:prstGeom prst="rect">
+            <a:avLst/>
+          </a:prstGeom>
+        </p:spPr>
+      </p:pic>
+      <p:pic>
+        <p:nvPicPr>
+          <p:cNvPr id="7" name="图片 6"/>
+          <p:cNvPicPr>
+            <a:picLocks noChangeAspect="1"/>
+          </p:cNvPicPr>
+          <p:nvPr/>
+        </p:nvPicPr>
+        <p:blipFill>
+          <a:blip r:embed="rId3"/>
+          <a:stretch>
+            <a:fillRect/>
+          </a:stretch>
+        </p:blipFill>
+        <p:spPr>
+          <a:xfrm>
+            <a:off x="4364990" y="1303655"/>
+            <a:ext cx="7518400" cy="2190750"/>
+          </a:xfrm>
+          <a:prstGeom prst="rect">
+            <a:avLst/>
+          </a:prstGeom>
+        </p:spPr>
+      </p:pic>
+    </p:spTree>
+  </p:cSld>
+  <p:clrMapOvr>
+    <a:masterClrMapping/>
+  </p:clrMapOvr>
+</p:sld>
+</file>
+
+<file path=ppt/slides/slide4.xml><?xml version="1.0" encoding="utf-8"?>
+<p:sld xmlns:a="http://schemas.openxmlformats.org/drawingml/2006/main" xmlns:r="http://schemas.openxmlformats.org/officeDocument/2006/relationships" xmlns:p="http://schemas.openxmlformats.org/presentationml/2006/main">
+  <p:cSld>
+    <p:spTree>
+      <p:nvGrpSpPr>
+        <p:cNvPr id="1" name=""/>
+        <p:cNvGrpSpPr/>
+        <p:nvPr/>
+      </p:nvGrpSpPr>
+      <p:grpSpPr>
+        <a:xfrm>
+          <a:off x="0" y="0"/>
+          <a:ext cx="0" cy="0"/>
+          <a:chOff x="0" y="0"/>
+          <a:chExt cx="0" cy="0"/>
+        </a:xfrm>
+      </p:grpSpPr>
+      <p:sp>
+        <p:nvSpPr>
+          <p:cNvPr id="2" name="内容占位符 1"/>
+          <p:cNvSpPr>
+            <a:spLocks noGrp="1"/>
+          </p:cNvSpPr>
+          <p:nvPr>
+            <p:ph idx="1"/>
+          </p:nvPr>
+        </p:nvSpPr>
+        <p:spPr>
+          <a:xfrm>
+            <a:off x="835307" y="1942707"/>
+            <a:ext cx="10521387" cy="3859816"/>
+          </a:xfrm>
+        </p:spPr>
+        <p:txBody>
+          <a:bodyPr>
+            <a:normAutofit/>
+          </a:bodyPr>
+          <a:lstStyle/>
+          <a:p>
+            <a:r>
+              <a:rPr lang="zh-CN" altLang="en-US" dirty="0"/>
+              <a:t>安全性</a:t>
+            </a:r>
+            <a:endParaRPr lang="zh-CN" altLang="en-US" dirty="0"/>
+          </a:p>
+          <a:p>
+            <a:pPr lvl="1"/>
+            <a:r>
+              <a:rPr lang="zh-CN" altLang="en-US" dirty="0"/>
+              <a:t>内存安全：所有权机制、借用规则</a:t>
+            </a:r>
+            <a:endParaRPr lang="zh-CN" altLang="en-US" dirty="0"/>
+          </a:p>
+          <a:p>
+            <a:pPr lvl="1"/>
+            <a:r>
+              <a:rPr lang="zh-CN" altLang="en-US" dirty="0"/>
+              <a:t>类型安全：基本不存在隐式的类型转换</a:t>
+            </a:r>
+            <a:endParaRPr lang="zh-CN" altLang="en-US" dirty="0"/>
+          </a:p>
+          <a:p>
+            <a:pPr lvl="1"/>
+            <a:r>
+              <a:rPr lang="zh-CN" altLang="en-US" dirty="0"/>
+              <a:t>并发安全：编译</a:t>
+            </a:r>
+            <a:r>
+              <a:rPr lang="zh-CN" altLang="en-US" dirty="0"/>
+              <a:t>期间就可以检测出存在的数据竞争</a:t>
+            </a:r>
+            <a:endParaRPr lang="zh-CN" altLang="en-US" dirty="0">
+              <a:solidFill>
+                <a:schemeClr val="tx2"/>
+              </a:solidFill>
+            </a:endParaRPr>
+          </a:p>
+          <a:p>
+            <a:pPr marL="306070" lvl="0" indent="-306070">
+              <a:buFont typeface="Wingdings 2" panose="05020102010507070707" charset="0"/>
+              <a:buChar char=""/>
+            </a:pPr>
+            <a:r>
+              <a:rPr lang="en-US" altLang="zh-CN" dirty="0">
+                <a:solidFill>
+                  <a:schemeClr val="tx2"/>
+                </a:solidFill>
+              </a:rPr>
+              <a:t>benchmark </a:t>
+            </a:r>
+            <a:r>
+              <a:rPr lang="zh-CN" altLang="en-US" dirty="0">
+                <a:solidFill>
+                  <a:schemeClr val="tx2"/>
+                </a:solidFill>
+              </a:rPr>
+              <a:t>测试与</a:t>
+            </a:r>
+            <a:r>
+              <a:rPr lang="en-US" altLang="zh-CN" dirty="0">
+                <a:solidFill>
+                  <a:schemeClr val="tx2"/>
+                </a:solidFill>
+              </a:rPr>
+              <a:t>c</a:t>
+            </a:r>
+            <a:r>
+              <a:rPr lang="zh-CN" altLang="en-US" dirty="0">
+                <a:solidFill>
+                  <a:schemeClr val="tx2"/>
+                </a:solidFill>
+              </a:rPr>
+              <a:t>不相上下</a:t>
+            </a:r>
+            <a:endParaRPr lang="zh-CN" altLang="en-US" dirty="0">
+              <a:solidFill>
+                <a:schemeClr val="tx2"/>
+              </a:solidFill>
+            </a:endParaRPr>
+          </a:p>
+          <a:p>
+            <a:pPr marL="306070" lvl="0" indent="-306070">
+              <a:buFont typeface="Wingdings 2" panose="05020102010507070707" charset="0"/>
+              <a:buChar char=""/>
+            </a:pPr>
+            <a:r>
+              <a:rPr lang="zh-CN" altLang="en-US" dirty="0">
+                <a:solidFill>
+                  <a:schemeClr val="tx2"/>
+                </a:solidFill>
+              </a:rPr>
+              <a:t>方便的集成化工具链和包管理工具</a:t>
+            </a:r>
+            <a:endParaRPr lang="zh-CN" altLang="en-US" dirty="0">
+              <a:solidFill>
+                <a:schemeClr val="tx2"/>
+              </a:solidFill>
+            </a:endParaRPr>
+          </a:p>
+        </p:txBody>
+      </p:sp>
+      <p:sp>
+        <p:nvSpPr>
+          <p:cNvPr id="3" name="标题 2"/>
+          <p:cNvSpPr>
+            <a:spLocks noGrp="1"/>
+          </p:cNvSpPr>
+          <p:nvPr>
+            <p:ph type="title"/>
+          </p:nvPr>
+        </p:nvSpPr>
+        <p:spPr/>
+        <p:txBody>
+          <a:bodyPr/>
+          <a:lstStyle/>
+          <a:p>
+            <a:r>
+              <a:rPr kumimoji="1" lang="zh-CN" altLang="en-US" dirty="0"/>
+              <a:t>设计背景：</a:t>
+            </a:r>
+            <a:r>
+              <a:rPr kumimoji="1" lang="en-US" altLang="zh-CN" dirty="0"/>
+              <a:t>why rust</a:t>
+            </a:r>
+            <a:r>
+              <a:rPr kumimoji="1" lang="zh-CN" altLang="en-US" dirty="0"/>
+              <a:t>？</a:t>
+            </a:r>
+            <a:endParaRPr kumimoji="1" lang="zh-CN" altLang="en-US" dirty="0"/>
+          </a:p>
+        </p:txBody>
+      </p:sp>
+    </p:spTree>
+  </p:cSld>
+  <p:clrMapOvr>
+    <a:masterClrMapping/>
+  </p:clrMapOvr>
+</p:sld>
+</file>
+
+<file path=ppt/slides/slide5.xml><?xml version="1.0" encoding="utf-8"?>
+<p:sld xmlns:a="http://schemas.openxmlformats.org/drawingml/2006/main" xmlns:r="http://schemas.openxmlformats.org/officeDocument/2006/relationships" xmlns:p="http://schemas.openxmlformats.org/presentationml/2006/main">
+  <p:cSld>
+    <p:spTree>
+      <p:nvGrpSpPr>
+        <p:cNvPr id="1" name=""/>
+        <p:cNvGrpSpPr/>
+        <p:nvPr/>
+      </p:nvGrpSpPr>
+      <p:grpSpPr>
+        <a:xfrm>
+          <a:off x="0" y="0"/>
+          <a:ext cx="0" cy="0"/>
+          <a:chOff x="0" y="0"/>
+          <a:chExt cx="0" cy="0"/>
+        </a:xfrm>
+      </p:grpSpPr>
+      <p:sp>
+        <p:nvSpPr>
+          <p:cNvPr id="2" name="内容占位符 1"/>
+          <p:cNvSpPr>
+            <a:spLocks noGrp="1"/>
+          </p:cNvSpPr>
+          <p:nvPr>
+            <p:ph idx="1"/>
+          </p:nvPr>
+        </p:nvSpPr>
+        <p:spPr>
+          <a:xfrm>
+            <a:off x="833377" y="1638170"/>
+            <a:ext cx="10521387" cy="4569199"/>
+          </a:xfrm>
+        </p:spPr>
+        <p:txBody>
+          <a:bodyPr>
+            <a:normAutofit/>
+          </a:bodyPr>
+          <a:lstStyle/>
+          <a:p>
+            <a:r>
+              <a:rPr lang="zh-CN" altLang="en-US" dirty="0"/>
+              <a:t>陈云逸、李东阳、周宜辉：</a:t>
+            </a:r>
+            <a:endParaRPr lang="zh-CN" altLang="en-US" dirty="0"/>
+          </a:p>
+          <a:p>
+            <a:pPr lvl="1"/>
+            <a:r>
+              <a:rPr lang="en-US" altLang="zh-CN" dirty="0"/>
+              <a:t>R-</a:t>
+            </a:r>
+            <a:r>
+              <a:rPr lang="en-US" altLang="zh-CN" dirty="0" err="1"/>
+              <a:t>FreeRTOS</a:t>
+            </a:r>
+            <a:r>
+              <a:rPr lang="en-US" altLang="zh-CN" dirty="0"/>
+              <a:t>:</a:t>
+            </a:r>
+            <a:r>
+              <a:rPr lang="zh-CN" altLang="en-US" dirty="0"/>
+              <a:t>用</a:t>
+            </a:r>
+            <a:r>
+              <a:rPr lang="en-US" altLang="zh-CN" dirty="0"/>
+              <a:t>rust</a:t>
+            </a:r>
+            <a:r>
+              <a:rPr lang="zh-CN" altLang="en-US" dirty="0"/>
+              <a:t>语言重新实现了</a:t>
+            </a:r>
+            <a:r>
+              <a:rPr lang="en-US" altLang="zh-CN" dirty="0"/>
+              <a:t>FREERTOS</a:t>
+            </a:r>
+            <a:endParaRPr lang="en-US" altLang="zh-CN" dirty="0"/>
+          </a:p>
+          <a:p>
+            <a:pPr lvl="1"/>
+            <a:r>
+              <a:rPr lang="zh-CN" altLang="en-US" dirty="0"/>
+              <a:t>实现效果：实现了</a:t>
+            </a:r>
+            <a:r>
+              <a:rPr lang="en-US" altLang="zh-CN" dirty="0" err="1"/>
+              <a:t>FreeRTOS</a:t>
+            </a:r>
+            <a:r>
+              <a:rPr lang="zh-CN" altLang="en-US" dirty="0"/>
+              <a:t>的基本功能</a:t>
+            </a:r>
+            <a:r>
+              <a:rPr lang="en-US" altLang="zh-CN" dirty="0"/>
+              <a:t>,</a:t>
+            </a:r>
+            <a:r>
+              <a:rPr lang="zh-CN" altLang="en-US" dirty="0"/>
+              <a:t>并通过了</a:t>
+            </a:r>
+            <a:r>
+              <a:rPr lang="en-US" altLang="zh-CN" dirty="0" err="1"/>
+              <a:t>FreeRTOS</a:t>
+            </a:r>
+            <a:r>
+              <a:rPr lang="zh-CN" altLang="en-US" dirty="0"/>
+              <a:t>自带的测试。</a:t>
+            </a:r>
+            <a:endParaRPr lang="zh-CN" altLang="en-US" dirty="0"/>
+          </a:p>
+          <a:p>
+            <a:pPr lvl="1"/>
+            <a:r>
+              <a:rPr lang="zh-CN" altLang="en-US" dirty="0"/>
+              <a:t>四个模块：</a:t>
+            </a:r>
+            <a:endParaRPr lang="en-US" altLang="zh-CN" dirty="0"/>
+          </a:p>
+          <a:p>
+            <a:pPr lvl="2"/>
+            <a:r>
+              <a:rPr lang="en-US" altLang="zh-CN" dirty="0"/>
+              <a:t>kernel</a:t>
+            </a:r>
+            <a:r>
+              <a:rPr lang="zh-CN" altLang="en-US" dirty="0"/>
+              <a:t>模块实现为</a:t>
+            </a:r>
+            <a:r>
+              <a:rPr lang="en-US" altLang="zh-CN" dirty="0" err="1"/>
+              <a:t>FreeRTOS</a:t>
+            </a:r>
+            <a:r>
+              <a:rPr lang="zh-CN" altLang="en-US" dirty="0"/>
+              <a:t>的内核，实现的功能有：</a:t>
+            </a:r>
+            <a:endParaRPr lang="en-US" altLang="zh-CN" dirty="0"/>
+          </a:p>
+          <a:p>
+            <a:pPr lvl="3"/>
+            <a:r>
+              <a:rPr lang="zh-CN" altLang="en-US" b="0" i="0" u="none" strike="noStrike" baseline="0" dirty="0">
+                <a:solidFill>
+                  <a:srgbClr val="333333"/>
+                </a:solidFill>
+                <a:latin typeface="黑体" panose="02010609060101010101" pitchFamily="49" charset="-122"/>
+                <a:ea typeface="黑体" panose="02010609060101010101" pitchFamily="49" charset="-122"/>
+              </a:rPr>
+              <a:t>任务调度，包括任务创建、删除、延迟、挂起与恢复、调度器挂起与恢复等；</a:t>
+            </a:r>
+            <a:endParaRPr lang="en-US" altLang="zh-CN" b="0" i="0" u="none" strike="noStrike" baseline="0" dirty="0">
+              <a:solidFill>
+                <a:srgbClr val="333333"/>
+              </a:solidFill>
+              <a:latin typeface="黑体" panose="02010609060101010101" pitchFamily="49" charset="-122"/>
+              <a:ea typeface="黑体" panose="02010609060101010101" pitchFamily="49" charset="-122"/>
+            </a:endParaRPr>
+          </a:p>
+          <a:p>
+            <a:pPr lvl="3"/>
+            <a:r>
+              <a:rPr lang="zh-CN" altLang="en-US" b="0" i="0" u="none" strike="noStrike" baseline="0" dirty="0">
+                <a:solidFill>
+                  <a:srgbClr val="333333"/>
+                </a:solidFill>
+                <a:latin typeface="黑体" panose="02010609060101010101" pitchFamily="49" charset="-122"/>
+                <a:ea typeface="黑体" panose="02010609060101010101" pitchFamily="49" charset="-122"/>
+              </a:rPr>
+              <a:t>消息队列与信号量，用于不同任务之间的通信。</a:t>
+            </a:r>
+            <a:endParaRPr lang="en-US" altLang="zh-CN" b="0" i="0" u="none" strike="noStrike" baseline="0" dirty="0">
+              <a:solidFill>
+                <a:srgbClr val="333333"/>
+              </a:solidFill>
+              <a:latin typeface="黑体" panose="02010609060101010101" pitchFamily="49" charset="-122"/>
+              <a:ea typeface="黑体" panose="02010609060101010101" pitchFamily="49" charset="-122"/>
+            </a:endParaRPr>
+          </a:p>
+          <a:p>
+            <a:pPr lvl="3"/>
+            <a:r>
+              <a:rPr lang="zh-CN" altLang="en-US" b="0" i="0" u="none" strike="noStrike" baseline="0" dirty="0">
+                <a:solidFill>
+                  <a:srgbClr val="333333"/>
+                </a:solidFill>
+                <a:latin typeface="黑体" panose="02010609060101010101" pitchFamily="49" charset="-122"/>
+                <a:ea typeface="黑体" panose="02010609060101010101" pitchFamily="49" charset="-122"/>
+              </a:rPr>
+              <a:t>基础事件组，不同任务间的同步。</a:t>
+            </a:r>
+            <a:endParaRPr lang="zh-CN" altLang="en-US" b="0" i="0" u="none" strike="noStrike" baseline="0" dirty="0">
+              <a:solidFill>
+                <a:srgbClr val="333333"/>
+              </a:solidFill>
+              <a:latin typeface="黑体" panose="02010609060101010101" pitchFamily="49" charset="-122"/>
+              <a:ea typeface="黑体" panose="02010609060101010101" pitchFamily="49" charset="-122"/>
+            </a:endParaRPr>
+          </a:p>
+          <a:p>
+            <a:pPr lvl="2"/>
+            <a:r>
+              <a:rPr lang="zh-CN" altLang="en-US" dirty="0"/>
+              <a:t>与硬件交互的</a:t>
+            </a:r>
+            <a:r>
+              <a:rPr lang="en-US" altLang="zh-CN" dirty="0"/>
+              <a:t>portable</a:t>
+            </a:r>
+            <a:r>
+              <a:rPr lang="zh-CN" altLang="en-US" dirty="0"/>
+              <a:t>模块</a:t>
+            </a:r>
+            <a:endParaRPr lang="zh-CN" altLang="en-US" dirty="0"/>
+          </a:p>
+          <a:p>
+            <a:pPr lvl="2"/>
+            <a:r>
+              <a:rPr lang="zh-CN" altLang="en-US" dirty="0"/>
+              <a:t>与</a:t>
+            </a:r>
+            <a:r>
+              <a:rPr lang="en-US" altLang="zh-CN" dirty="0"/>
+              <a:t>c</a:t>
+            </a:r>
+            <a:r>
+              <a:rPr lang="zh-CN" altLang="en-US" dirty="0"/>
+              <a:t>语言交互实现</a:t>
+            </a:r>
+            <a:r>
+              <a:rPr lang="en-US" altLang="zh-CN" dirty="0"/>
+              <a:t>api</a:t>
+            </a:r>
+            <a:r>
+              <a:rPr lang="zh-CN" altLang="en-US" dirty="0"/>
+              <a:t>接口的</a:t>
+            </a:r>
+            <a:r>
+              <a:rPr lang="en-US" altLang="zh-CN" dirty="0"/>
+              <a:t>ffi</a:t>
+            </a:r>
+            <a:r>
+              <a:rPr lang="zh-CN" altLang="en-US" dirty="0"/>
+              <a:t>模块</a:t>
+            </a:r>
+            <a:endParaRPr lang="zh-CN" altLang="en-US" dirty="0"/>
+          </a:p>
+          <a:p>
+            <a:pPr lvl="2"/>
+            <a:r>
+              <a:rPr lang="zh-CN" altLang="en-US" dirty="0"/>
+              <a:t>完成测试的</a:t>
+            </a:r>
+            <a:r>
+              <a:rPr lang="en-US" altLang="zh-CN" dirty="0"/>
+              <a:t>test</a:t>
+            </a:r>
+            <a:r>
+              <a:rPr lang="zh-CN" altLang="en-US" dirty="0"/>
+              <a:t>模块</a:t>
+            </a:r>
+            <a:endParaRPr lang="zh-CN" altLang="en-US" dirty="0"/>
+          </a:p>
+        </p:txBody>
+      </p:sp>
+      <p:sp>
+        <p:nvSpPr>
+          <p:cNvPr id="3" name="标题 2"/>
+          <p:cNvSpPr>
+            <a:spLocks noGrp="1"/>
+          </p:cNvSpPr>
+          <p:nvPr>
+            <p:ph type="title"/>
+          </p:nvPr>
+        </p:nvSpPr>
+        <p:spPr/>
+        <p:txBody>
+          <a:bodyPr/>
+          <a:lstStyle/>
+          <a:p>
+            <a:r>
+              <a:rPr lang="zh-CN" altLang="en-US" dirty="0"/>
+              <a:t>相关</a:t>
+            </a:r>
+            <a:r>
+              <a:rPr lang="zh-CN" altLang="en-US" dirty="0"/>
+              <a:t>工作：</a:t>
+            </a:r>
+            <a:r>
+              <a:rPr lang="en-US" altLang="zh-CN" dirty="0"/>
+              <a:t>R-</a:t>
+            </a:r>
+            <a:r>
+              <a:rPr lang="en-US" altLang="zh-CN" dirty="0" err="1"/>
+              <a:t>Freertos</a:t>
+            </a:r>
+            <a:endParaRPr lang="zh-CN" altLang="en-US" dirty="0"/>
+          </a:p>
+        </p:txBody>
+      </p:sp>
+      <p:pic>
+        <p:nvPicPr>
+          <p:cNvPr id="8" name="内容占位符 2"/>
+          <p:cNvPicPr>
+            <a:picLocks noChangeAspect="1"/>
+          </p:cNvPicPr>
+          <p:nvPr/>
+        </p:nvPicPr>
+        <p:blipFill>
+          <a:blip r:embed="rId1"/>
+          <a:stretch>
+            <a:fillRect/>
+          </a:stretch>
+        </p:blipFill>
+        <p:spPr>
+          <a:xfrm>
+            <a:off x="8297591" y="1782600"/>
+            <a:ext cx="2720285" cy="3292799"/>
+          </a:xfrm>
+          <a:prstGeom prst="rect">
+            <a:avLst/>
+          </a:prstGeom>
+        </p:spPr>
+      </p:pic>
+    </p:spTree>
+  </p:cSld>
+  <p:clrMapOvr>
+    <a:masterClrMapping/>
+  </p:clrMapOvr>
+</p:sld>
+</file>
+
+<file path=ppt/slides/slide6.xml><?xml version="1.0" encoding="utf-8"?>
+<p:sld xmlns:a="http://schemas.openxmlformats.org/drawingml/2006/main" xmlns:r="http://schemas.openxmlformats.org/officeDocument/2006/relationships" xmlns:p="http://schemas.openxmlformats.org/presentationml/2006/main">
+  <p:cSld>
+    <p:spTree>
+      <p:nvGrpSpPr>
+        <p:cNvPr id="1" name=""/>
+        <p:cNvGrpSpPr/>
+        <p:nvPr/>
+      </p:nvGrpSpPr>
+      <p:grpSpPr>
+        <a:xfrm>
+          <a:off x="0" y="0"/>
+          <a:ext cx="0" cy="0"/>
+          <a:chOff x="0" y="0"/>
+          <a:chExt cx="0" cy="0"/>
+        </a:xfrm>
+      </p:grpSpPr>
+      <p:sp>
+        <p:nvSpPr>
+          <p:cNvPr id="2" name="内容占位符 1"/>
+          <p:cNvSpPr>
+            <a:spLocks noGrp="1"/>
+          </p:cNvSpPr>
+          <p:nvPr>
+            <p:ph idx="1"/>
+          </p:nvPr>
+        </p:nvSpPr>
+        <p:spPr>
+          <a:xfrm>
             <a:off x="833377" y="1542994"/>
             <a:ext cx="10521387" cy="3678303"/>
           </a:xfrm>
@@ -4856,6 +6085,680 @@
             <a:endParaRPr kumimoji="1" lang="en-US" altLang="zh-CN" dirty="0"/>
           </a:p>
           <a:p>
+            <a:pPr marL="0" lvl="0" indent="-269875">
+              <a:buFont typeface="Wingdings 2" panose="05020102010507070707" charset="0"/>
+              <a:buChar char=""/>
+            </a:pPr>
+            <a:r>
+              <a:rPr kumimoji="1" lang="zh-CN" altLang="en-US" sz="1600" dirty="0">
+                <a:solidFill>
+                  <a:schemeClr val="tx2"/>
+                </a:solidFill>
+              </a:rPr>
+              <a:t>任务目标</a:t>
+            </a:r>
+            <a:endParaRPr kumimoji="1" lang="en-US" altLang="zh-CN" sz="1600" dirty="0">
+              <a:solidFill>
+                <a:schemeClr val="tx2"/>
+              </a:solidFill>
+            </a:endParaRPr>
+          </a:p>
+          <a:p>
+            <a:pPr lvl="1"/>
+            <a:r>
+              <a:rPr kumimoji="1" lang="zh-CN" altLang="en-US" dirty="0"/>
+              <a:t>将</a:t>
+            </a:r>
+            <a:r>
+              <a:rPr kumimoji="1" lang="en-US" altLang="zh-CN" dirty="0"/>
+              <a:t>sel4</a:t>
+            </a:r>
+            <a:r>
+              <a:rPr kumimoji="1" lang="zh-CN" altLang="en-US" dirty="0"/>
+              <a:t>用</a:t>
+            </a:r>
+            <a:r>
+              <a:rPr kumimoji="1" lang="en-US" altLang="zh-CN" dirty="0"/>
+              <a:t>rust</a:t>
+            </a:r>
+            <a:r>
+              <a:rPr kumimoji="1" lang="zh-CN" altLang="en-US" dirty="0"/>
+              <a:t>语言重新实现，能够在</a:t>
+            </a:r>
+            <a:r>
+              <a:rPr kumimoji="1" lang="en-US" altLang="zh-CN" dirty="0"/>
+              <a:t>qemu</a:t>
+            </a:r>
+            <a:r>
+              <a:rPr kumimoji="1" lang="zh-CN" altLang="en-US" dirty="0"/>
+              <a:t>模拟的</a:t>
+            </a:r>
+            <a:r>
+              <a:rPr kumimoji="1" lang="en-US" altLang="zh-CN" dirty="0"/>
+              <a:t>riscv</a:t>
+            </a:r>
+            <a:r>
+              <a:rPr kumimoji="1" lang="zh-CN" altLang="en-US" dirty="0"/>
+              <a:t>架构</a:t>
+            </a:r>
+            <a:r>
+              <a:rPr kumimoji="1" lang="en-US" altLang="zh-CN" dirty="0"/>
+              <a:t>cpu</a:t>
+            </a:r>
+            <a:r>
+              <a:rPr kumimoji="1" lang="zh-CN" altLang="en-US" dirty="0"/>
+              <a:t>上成功运行</a:t>
+            </a:r>
+            <a:endParaRPr kumimoji="1" lang="zh-CN" altLang="en-US" dirty="0"/>
+          </a:p>
+          <a:p>
+            <a:pPr lvl="1"/>
+            <a:r>
+              <a:rPr kumimoji="1" lang="zh-CN" altLang="en-US" dirty="0"/>
+              <a:t>实现</a:t>
+            </a:r>
+            <a:r>
+              <a:rPr kumimoji="1" lang="en-US" altLang="zh-CN" dirty="0"/>
+              <a:t>sel4</a:t>
+            </a:r>
+            <a:r>
+              <a:rPr kumimoji="1" lang="zh-CN" altLang="en-US" dirty="0"/>
+              <a:t>对上层应用的支持</a:t>
+            </a:r>
+            <a:endParaRPr kumimoji="1" lang="zh-CN" altLang="en-US" dirty="0"/>
+          </a:p>
+          <a:p>
+            <a:pPr lvl="0"/>
+            <a:r>
+              <a:rPr kumimoji="1" lang="zh-CN" altLang="en-US" dirty="0"/>
+              <a:t>实现</a:t>
+            </a:r>
+            <a:r>
+              <a:rPr kumimoji="1" lang="zh-CN" altLang="en-US" dirty="0"/>
+              <a:t>方法</a:t>
+            </a:r>
+            <a:endParaRPr kumimoji="1" lang="zh-CN" altLang="en-US" dirty="0"/>
+          </a:p>
+          <a:p>
+            <a:pPr lvl="1"/>
+            <a:r>
+              <a:rPr kumimoji="1" lang="zh-CN" altLang="en-US" dirty="0"/>
+              <a:t>按照</a:t>
+            </a:r>
+            <a:r>
+              <a:rPr kumimoji="1" lang="en-US" altLang="zh-CN" dirty="0"/>
+              <a:t>sel4</a:t>
+            </a:r>
+            <a:r>
+              <a:rPr kumimoji="1" lang="zh-CN" altLang="en-US" dirty="0"/>
+              <a:t>内核的源码一点一点</a:t>
+            </a:r>
+            <a:r>
+              <a:rPr kumimoji="1" lang="zh-CN" altLang="en-US" dirty="0"/>
+              <a:t>翻译</a:t>
+            </a:r>
+            <a:endParaRPr kumimoji="1" lang="zh-CN" altLang="en-US" dirty="0"/>
+          </a:p>
+          <a:p>
+            <a:pPr lvl="1"/>
+            <a:r>
+              <a:rPr kumimoji="1" lang="zh-CN" altLang="en-US" dirty="0"/>
+              <a:t>先写一个简单的能够运行的内核，再向其中一点点加入</a:t>
+            </a:r>
+            <a:r>
+              <a:rPr kumimoji="1" lang="en-US" altLang="zh-CN" dirty="0"/>
+              <a:t>sel4</a:t>
+            </a:r>
+            <a:r>
+              <a:rPr kumimoji="1" lang="zh-CN" altLang="en-US" dirty="0"/>
+              <a:t>内核的基本</a:t>
+            </a:r>
+            <a:r>
+              <a:rPr kumimoji="1" lang="zh-CN" altLang="en-US" dirty="0"/>
+              <a:t>功能</a:t>
+            </a:r>
+            <a:endParaRPr kumimoji="1" lang="zh-CN" altLang="en-US" dirty="0"/>
+          </a:p>
+          <a:p>
+            <a:pPr lvl="1"/>
+            <a:r>
+              <a:rPr kumimoji="1" lang="zh-CN" altLang="en-US" dirty="0"/>
+              <a:t>尝试使用</a:t>
+            </a:r>
+            <a:r>
+              <a:rPr kumimoji="1" lang="en-US" altLang="zh-CN" dirty="0"/>
+              <a:t>c</a:t>
+            </a:r>
+            <a:r>
+              <a:rPr kumimoji="1" lang="zh-CN" altLang="en-US" dirty="0"/>
+              <a:t>转</a:t>
+            </a:r>
+            <a:r>
+              <a:rPr kumimoji="1" lang="en-US" altLang="zh-CN" dirty="0"/>
+              <a:t>rust</a:t>
+            </a:r>
+            <a:r>
+              <a:rPr kumimoji="1" lang="zh-CN" altLang="en-US" dirty="0"/>
+              <a:t>工具（</a:t>
+            </a:r>
+            <a:r>
+              <a:rPr kumimoji="1" lang="en-US" altLang="zh-CN" dirty="0"/>
+              <a:t>c2rust)</a:t>
+            </a:r>
+            <a:r>
+              <a:rPr kumimoji="1" lang="zh-CN" altLang="en-US" dirty="0"/>
+              <a:t>将</a:t>
+            </a:r>
+            <a:r>
+              <a:rPr kumimoji="1" lang="en-US" altLang="zh-CN" dirty="0"/>
+              <a:t>sel4</a:t>
+            </a:r>
+            <a:r>
+              <a:rPr kumimoji="1" lang="zh-CN" altLang="en-US" dirty="0"/>
+              <a:t>内核或部分内码转为</a:t>
+            </a:r>
+            <a:r>
+              <a:rPr kumimoji="1" lang="en-US" altLang="zh-CN" dirty="0"/>
+              <a:t>rust</a:t>
+            </a:r>
+            <a:r>
+              <a:rPr kumimoji="1" lang="zh-CN" altLang="en-US" dirty="0"/>
+              <a:t>代码，再以此为</a:t>
+            </a:r>
+            <a:r>
+              <a:rPr kumimoji="1" lang="zh-CN" altLang="en-US" dirty="0"/>
+              <a:t>基础进行</a:t>
+            </a:r>
+            <a:r>
+              <a:rPr kumimoji="1" lang="zh-CN" altLang="en-US" dirty="0"/>
+              <a:t>修改</a:t>
+            </a:r>
+            <a:endParaRPr kumimoji="1" lang="zh-CN" altLang="en-US" dirty="0"/>
+          </a:p>
+        </p:txBody>
+      </p:sp>
+      <p:sp>
+        <p:nvSpPr>
+          <p:cNvPr id="3" name="标题 2"/>
+          <p:cNvSpPr>
+            <a:spLocks noGrp="1"/>
+          </p:cNvSpPr>
+          <p:nvPr>
+            <p:ph type="title"/>
+          </p:nvPr>
+        </p:nvSpPr>
+        <p:spPr/>
+        <p:txBody>
+          <a:bodyPr/>
+          <a:lstStyle/>
+          <a:p>
+            <a:r>
+              <a:rPr kumimoji="1" lang="zh-CN" altLang="en-US" dirty="0"/>
+              <a:t>设计任务：</a:t>
+            </a:r>
+            <a:r>
+              <a:rPr kumimoji="1" lang="en-US" altLang="zh-CN" dirty="0"/>
+              <a:t>rust</a:t>
+            </a:r>
+            <a:r>
+              <a:rPr kumimoji="1" lang="zh-CN" altLang="en-US" dirty="0"/>
+              <a:t>语言实现</a:t>
+            </a:r>
+            <a:r>
+              <a:rPr kumimoji="1" lang="en-US" altLang="zh-CN" dirty="0"/>
+              <a:t>sel4</a:t>
+            </a:r>
+            <a:endParaRPr kumimoji="1" lang="en-US" altLang="zh-CN" dirty="0"/>
+          </a:p>
+        </p:txBody>
+      </p:sp>
+    </p:spTree>
+  </p:cSld>
+  <p:clrMapOvr>
+    <a:masterClrMapping/>
+  </p:clrMapOvr>
+</p:sld>
+</file>
+
+<file path=ppt/slides/slide7.xml><?xml version="1.0" encoding="utf-8"?>
+<p:sld xmlns:a="http://schemas.openxmlformats.org/drawingml/2006/main" xmlns:r="http://schemas.openxmlformats.org/officeDocument/2006/relationships" xmlns:p="http://schemas.openxmlformats.org/presentationml/2006/main">
+  <p:cSld>
+    <p:spTree>
+      <p:nvGrpSpPr>
+        <p:cNvPr id="1" name=""/>
+        <p:cNvGrpSpPr/>
+        <p:nvPr/>
+      </p:nvGrpSpPr>
+      <p:grpSpPr>
+        <a:xfrm>
+          <a:off x="0" y="0"/>
+          <a:ext cx="0" cy="0"/>
+          <a:chOff x="0" y="0"/>
+          <a:chExt cx="0" cy="0"/>
+        </a:xfrm>
+      </p:grpSpPr>
+      <p:sp>
+        <p:nvSpPr>
+          <p:cNvPr id="2" name="内容占位符 1"/>
+          <p:cNvSpPr>
+            <a:spLocks noGrp="1"/>
+          </p:cNvSpPr>
+          <p:nvPr>
+            <p:ph idx="1"/>
+          </p:nvPr>
+        </p:nvSpPr>
+        <p:spPr>
+          <a:xfrm>
+            <a:off x="833377" y="1542994"/>
+            <a:ext cx="10521387" cy="3678303"/>
+          </a:xfrm>
+        </p:spPr>
+        <p:txBody>
+          <a:bodyPr>
+            <a:normAutofit/>
+          </a:bodyPr>
+          <a:lstStyle/>
+          <a:p>
+            <a:pPr marL="323850" lvl="1" indent="0">
+              <a:buNone/>
+            </a:pPr>
+            <a:endParaRPr kumimoji="1" lang="en-US" altLang="zh-CN" dirty="0"/>
+          </a:p>
+          <a:p>
+            <a:pPr lvl="1"/>
+            <a:r>
+              <a:rPr kumimoji="1" lang="zh-CN" altLang="en-US" dirty="0"/>
+              <a:t>优点</a:t>
+            </a:r>
+            <a:endParaRPr kumimoji="1" lang="zh-CN" altLang="en-US" dirty="0"/>
+          </a:p>
+          <a:p>
+            <a:pPr lvl="2"/>
+            <a:r>
+              <a:rPr kumimoji="1" lang="zh-CN" altLang="en-US" dirty="0"/>
+              <a:t>有</a:t>
+            </a:r>
+            <a:r>
+              <a:rPr kumimoji="1" lang="en-US" altLang="zh-CN" dirty="0"/>
+              <a:t>sel4</a:t>
+            </a:r>
+            <a:r>
+              <a:rPr kumimoji="1" lang="zh-CN" altLang="en-US" dirty="0"/>
+              <a:t>代码做</a:t>
+            </a:r>
+            <a:r>
+              <a:rPr kumimoji="1" lang="zh-CN" altLang="en-US" dirty="0"/>
+              <a:t>参考，易于</a:t>
+            </a:r>
+            <a:r>
+              <a:rPr kumimoji="1" lang="zh-CN" altLang="en-US" dirty="0"/>
+              <a:t>实现</a:t>
+            </a:r>
+            <a:endParaRPr kumimoji="1" lang="zh-CN" altLang="en-US" dirty="0"/>
+          </a:p>
+          <a:p>
+            <a:pPr lvl="2"/>
+            <a:r>
+              <a:rPr kumimoji="1" lang="zh-CN" altLang="en-US" dirty="0"/>
+              <a:t>可以边复现边理解</a:t>
+            </a:r>
+            <a:r>
+              <a:rPr kumimoji="1" lang="en-US" altLang="zh-CN" dirty="0"/>
+              <a:t>sel4</a:t>
+            </a:r>
+            <a:r>
+              <a:rPr kumimoji="1" lang="zh-CN" altLang="en-US" dirty="0"/>
+              <a:t>设计</a:t>
+            </a:r>
+            <a:r>
+              <a:rPr kumimoji="1" lang="zh-CN" altLang="en-US" dirty="0"/>
+              <a:t>理念</a:t>
+            </a:r>
+            <a:endParaRPr kumimoji="1" lang="zh-CN" altLang="en-US" dirty="0"/>
+          </a:p>
+          <a:p>
+            <a:pPr lvl="1"/>
+            <a:r>
+              <a:rPr kumimoji="1" lang="zh-CN" altLang="en-US" dirty="0"/>
+              <a:t>缺点</a:t>
+            </a:r>
+            <a:endParaRPr kumimoji="1" lang="en-US" altLang="zh-CN" dirty="0"/>
+          </a:p>
+          <a:p>
+            <a:pPr lvl="2"/>
+            <a:r>
+              <a:rPr kumimoji="1" lang="zh-CN" altLang="en-US" dirty="0"/>
+              <a:t>各个模块间的关系复杂，涉及的</a:t>
+            </a:r>
+            <a:r>
+              <a:rPr kumimoji="1" lang="en-US" altLang="zh-CN" dirty="0"/>
+              <a:t>cmake</a:t>
+            </a:r>
+            <a:r>
+              <a:rPr kumimoji="1" lang="zh-CN" altLang="en-US" dirty="0"/>
+              <a:t>复杂</a:t>
+            </a:r>
+            <a:endParaRPr kumimoji="1" lang="zh-CN" altLang="en-US" dirty="0"/>
+          </a:p>
+          <a:p>
+            <a:pPr lvl="2"/>
+            <a:r>
+              <a:rPr kumimoji="1" lang="zh-CN" altLang="en-US" dirty="0"/>
+              <a:t>调试</a:t>
+            </a:r>
+            <a:r>
+              <a:rPr kumimoji="1" lang="zh-CN" altLang="en-US" dirty="0"/>
+              <a:t>成本高，需全部实现后才能运行</a:t>
+            </a:r>
+            <a:r>
+              <a:rPr kumimoji="1" lang="zh-CN" altLang="en-US" dirty="0"/>
+              <a:t>测试</a:t>
+            </a:r>
+            <a:endParaRPr kumimoji="1" lang="zh-CN" altLang="en-US" dirty="0"/>
+          </a:p>
+        </p:txBody>
+      </p:sp>
+      <p:sp>
+        <p:nvSpPr>
+          <p:cNvPr id="3" name="标题 2"/>
+          <p:cNvSpPr>
+            <a:spLocks noGrp="1"/>
+          </p:cNvSpPr>
+          <p:nvPr>
+            <p:ph type="title"/>
+          </p:nvPr>
+        </p:nvSpPr>
+        <p:spPr/>
+        <p:txBody>
+          <a:bodyPr/>
+          <a:lstStyle/>
+          <a:p>
+            <a:r>
+              <a:rPr kumimoji="1" lang="zh-CN" altLang="en-US" dirty="0"/>
+              <a:t>方案一：</a:t>
+            </a:r>
+            <a:r>
+              <a:rPr kumimoji="1" lang="zh-CN" altLang="en-US" dirty="0"/>
+              <a:t>按模块复现</a:t>
+            </a:r>
+            <a:endParaRPr kumimoji="1" lang="zh-CN" altLang="en-US" dirty="0"/>
+          </a:p>
+        </p:txBody>
+      </p:sp>
+      <p:pic>
+        <p:nvPicPr>
+          <p:cNvPr id="7" name="图片 6" descr="微信图片_202301050903041"/>
+          <p:cNvPicPr>
+            <a:picLocks noChangeAspect="1"/>
+          </p:cNvPicPr>
+          <p:nvPr/>
+        </p:nvPicPr>
+        <p:blipFill>
+          <a:blip r:embed="rId1"/>
+          <a:stretch>
+            <a:fillRect/>
+          </a:stretch>
+        </p:blipFill>
+        <p:spPr>
+          <a:xfrm>
+            <a:off x="6022975" y="4617720"/>
+            <a:ext cx="5576570" cy="1384935"/>
+          </a:xfrm>
+          <a:prstGeom prst="rect">
+            <a:avLst/>
+          </a:prstGeom>
+        </p:spPr>
+      </p:pic>
+      <p:pic>
+        <p:nvPicPr>
+          <p:cNvPr id="4" name="图片 3"/>
+          <p:cNvPicPr>
+            <a:picLocks noChangeAspect="1"/>
+          </p:cNvPicPr>
+          <p:nvPr>
+            <p:custDataLst>
+              <p:tags r:id="rId2"/>
+            </p:custDataLst>
+          </p:nvPr>
+        </p:nvPicPr>
+        <p:blipFill>
+          <a:blip r:embed="rId3"/>
+          <a:stretch>
+            <a:fillRect/>
+          </a:stretch>
+        </p:blipFill>
+        <p:spPr>
+          <a:xfrm>
+            <a:off x="965200" y="4501515"/>
+            <a:ext cx="4389120" cy="2217420"/>
+          </a:xfrm>
+          <a:prstGeom prst="rect">
+            <a:avLst/>
+          </a:prstGeom>
+        </p:spPr>
+      </p:pic>
+    </p:spTree>
+  </p:cSld>
+  <p:clrMapOvr>
+    <a:masterClrMapping/>
+  </p:clrMapOvr>
+</p:sld>
+</file>
+
+<file path=ppt/slides/slide8.xml><?xml version="1.0" encoding="utf-8"?>
+<p:sld xmlns:a="http://schemas.openxmlformats.org/drawingml/2006/main" xmlns:r="http://schemas.openxmlformats.org/officeDocument/2006/relationships" xmlns:p="http://schemas.openxmlformats.org/presentationml/2006/main">
+  <p:cSld>
+    <p:spTree>
+      <p:nvGrpSpPr>
+        <p:cNvPr id="1" name=""/>
+        <p:cNvGrpSpPr/>
+        <p:nvPr/>
+      </p:nvGrpSpPr>
+      <p:grpSpPr>
+        <a:xfrm>
+          <a:off x="0" y="0"/>
+          <a:ext cx="0" cy="0"/>
+          <a:chOff x="0" y="0"/>
+          <a:chExt cx="0" cy="0"/>
+        </a:xfrm>
+      </p:grpSpPr>
+      <p:sp>
+        <p:nvSpPr>
+          <p:cNvPr id="2" name="内容占位符 1"/>
+          <p:cNvSpPr>
+            <a:spLocks noGrp="1"/>
+          </p:cNvSpPr>
+          <p:nvPr>
+            <p:ph idx="1"/>
+          </p:nvPr>
+        </p:nvSpPr>
+        <p:spPr>
+          <a:xfrm>
+            <a:off x="833377" y="1542994"/>
+            <a:ext cx="10521387" cy="3678303"/>
+          </a:xfrm>
+        </p:spPr>
+        <p:txBody>
+          <a:bodyPr>
+            <a:normAutofit/>
+          </a:bodyPr>
+          <a:lstStyle/>
+          <a:p>
+            <a:pPr marL="323850" lvl="1" indent="0">
+              <a:buNone/>
+            </a:pPr>
+            <a:endParaRPr kumimoji="1" lang="en-US" altLang="zh-CN" dirty="0"/>
+          </a:p>
+          <a:p>
+            <a:pPr lvl="1"/>
+            <a:r>
+              <a:rPr kumimoji="1" lang="zh-CN" altLang="en-US" dirty="0"/>
+              <a:t>优点</a:t>
+            </a:r>
+            <a:endParaRPr kumimoji="1" lang="zh-CN" altLang="en-US" dirty="0"/>
+          </a:p>
+          <a:p>
+            <a:pPr lvl="2"/>
+            <a:r>
+              <a:rPr kumimoji="1" lang="zh-CN" altLang="en-US" dirty="0"/>
+              <a:t>调试成本</a:t>
+            </a:r>
+            <a:r>
+              <a:rPr kumimoji="1" lang="zh-CN" altLang="en-US" dirty="0"/>
+              <a:t>低，实现一个功能即可开始对该功能进行简单</a:t>
+            </a:r>
+            <a:r>
+              <a:rPr kumimoji="1" lang="zh-CN" altLang="en-US" dirty="0"/>
+              <a:t>测试</a:t>
+            </a:r>
+            <a:endParaRPr kumimoji="1" lang="zh-CN" altLang="en-US" dirty="0"/>
+          </a:p>
+          <a:p>
+            <a:pPr lvl="2"/>
+            <a:r>
+              <a:rPr kumimoji="1" lang="zh-CN" altLang="en-US" dirty="0"/>
+              <a:t>任务量相对方案一</a:t>
+            </a:r>
+            <a:r>
+              <a:rPr kumimoji="1" lang="zh-CN" altLang="en-US" dirty="0"/>
+              <a:t>稍小</a:t>
+            </a:r>
+            <a:endParaRPr kumimoji="1" lang="zh-CN" altLang="en-US" dirty="0"/>
+          </a:p>
+          <a:p>
+            <a:pPr lvl="1"/>
+            <a:r>
+              <a:rPr kumimoji="1" lang="zh-CN" altLang="en-US" dirty="0"/>
+              <a:t>缺点</a:t>
+            </a:r>
+            <a:endParaRPr kumimoji="1" lang="en-US" altLang="zh-CN" dirty="0"/>
+          </a:p>
+          <a:p>
+            <a:pPr lvl="2"/>
+            <a:r>
+              <a:rPr kumimoji="1" lang="zh-CN" altLang="en-US" dirty="0"/>
+              <a:t>没有现成的代码可以</a:t>
+            </a:r>
+            <a:r>
+              <a:rPr kumimoji="1" lang="zh-CN" altLang="en-US" dirty="0"/>
+              <a:t>参考</a:t>
+            </a:r>
+            <a:endParaRPr kumimoji="1" lang="zh-CN" altLang="en-US" dirty="0"/>
+          </a:p>
+          <a:p>
+            <a:pPr lvl="2"/>
+            <a:r>
+              <a:rPr kumimoji="1" lang="zh-CN" altLang="en-US" dirty="0"/>
+              <a:t>需要对</a:t>
+            </a:r>
+            <a:r>
+              <a:rPr kumimoji="1" lang="en-US" altLang="zh-CN" dirty="0"/>
+              <a:t>sel4</a:t>
+            </a:r>
+            <a:r>
+              <a:rPr kumimoji="1" lang="zh-CN" altLang="en-US" dirty="0"/>
+              <a:t>的设计理念比较熟，而网络上官网内容、相关博客比较少</a:t>
+            </a:r>
+            <a:endParaRPr kumimoji="1" lang="zh-CN" altLang="en-US" dirty="0"/>
+          </a:p>
+          <a:p>
+            <a:pPr marL="629920" lvl="2" indent="0">
+              <a:buNone/>
+            </a:pPr>
+            <a:endParaRPr kumimoji="1" lang="zh-CN" altLang="en-US" dirty="0"/>
+          </a:p>
+          <a:p>
+            <a:pPr marL="629920" lvl="2" indent="0">
+              <a:buNone/>
+            </a:pPr>
+            <a:endParaRPr kumimoji="1" lang="zh-CN" altLang="en-US" dirty="0"/>
+          </a:p>
+        </p:txBody>
+      </p:sp>
+      <p:sp>
+        <p:nvSpPr>
+          <p:cNvPr id="3" name="标题 2"/>
+          <p:cNvSpPr>
+            <a:spLocks noGrp="1"/>
+          </p:cNvSpPr>
+          <p:nvPr>
+            <p:ph type="title"/>
+          </p:nvPr>
+        </p:nvSpPr>
+        <p:spPr/>
+        <p:txBody>
+          <a:bodyPr/>
+          <a:lstStyle/>
+          <a:p>
+            <a:r>
+              <a:rPr kumimoji="1" lang="zh-CN" altLang="en-US" dirty="0"/>
+              <a:t>方案二：借用</a:t>
+            </a:r>
+            <a:r>
+              <a:rPr kumimoji="1" lang="en-US" altLang="zh-CN" dirty="0"/>
+              <a:t>sel4</a:t>
+            </a:r>
+            <a:r>
+              <a:rPr kumimoji="1" lang="zh-CN" altLang="en-US" dirty="0"/>
+              <a:t>思想</a:t>
+            </a:r>
+            <a:endParaRPr kumimoji="1" lang="zh-CN" altLang="en-US" dirty="0"/>
+          </a:p>
+        </p:txBody>
+      </p:sp>
+    </p:spTree>
+  </p:cSld>
+  <p:clrMapOvr>
+    <a:masterClrMapping/>
+  </p:clrMapOvr>
+</p:sld>
+</file>
+
+<file path=ppt/slides/slide9.xml><?xml version="1.0" encoding="utf-8"?>
+<p:sld xmlns:a="http://schemas.openxmlformats.org/drawingml/2006/main" xmlns:r="http://schemas.openxmlformats.org/officeDocument/2006/relationships" xmlns:p="http://schemas.openxmlformats.org/presentationml/2006/main">
+  <p:cSld>
+    <p:spTree>
+      <p:nvGrpSpPr>
+        <p:cNvPr id="1" name=""/>
+        <p:cNvGrpSpPr/>
+        <p:nvPr/>
+      </p:nvGrpSpPr>
+      <p:grpSpPr>
+        <a:xfrm>
+          <a:off x="0" y="0"/>
+          <a:ext cx="0" cy="0"/>
+          <a:chOff x="0" y="0"/>
+          <a:chExt cx="0" cy="0"/>
+        </a:xfrm>
+      </p:grpSpPr>
+      <p:sp>
+        <p:nvSpPr>
+          <p:cNvPr id="2" name="内容占位符 1"/>
+          <p:cNvSpPr>
+            <a:spLocks noGrp="1"/>
+          </p:cNvSpPr>
+          <p:nvPr>
+            <p:ph idx="1"/>
+          </p:nvPr>
+        </p:nvSpPr>
+        <p:spPr>
+          <a:xfrm>
+            <a:off x="833377" y="1542994"/>
+            <a:ext cx="10521387" cy="3678303"/>
+          </a:xfrm>
+        </p:spPr>
+        <p:txBody>
+          <a:bodyPr>
+            <a:normAutofit/>
+          </a:bodyPr>
+          <a:lstStyle/>
+          <a:p>
+            <a:pPr marL="323850" lvl="1" indent="0">
+              <a:buNone/>
+            </a:pPr>
+            <a:endParaRPr kumimoji="1" lang="en-US" altLang="zh-CN" dirty="0"/>
+          </a:p>
+          <a:p>
             <a:pPr lvl="1"/>
             <a:endParaRPr kumimoji="1" lang="en-US" altLang="zh-CN" dirty="0"/>
           </a:p>
@@ -4878,11 +6781,11 @@
           <a:p>
             <a:r>
               <a:rPr kumimoji="1" lang="zh-CN" altLang="en-US" dirty="0"/>
-              <a:t>任务</a:t>
-            </a:r>
-            <a:r>
-              <a:rPr kumimoji="1" lang="zh-CN" altLang="en-US" dirty="0"/>
-              <a:t>难点</a:t>
+              <a:t>设计任务：</a:t>
+            </a:r>
+            <a:r>
+              <a:rPr kumimoji="1" lang="en-US" altLang="zh-CN" dirty="0"/>
+              <a:t>kernel</a:t>
             </a:r>
             <a:endParaRPr kumimoji="1" lang="zh-CN" altLang="en-US" dirty="0"/>
           </a:p>
@@ -4896,7 +6799,7 @@
         </p:nvSpPr>
         <p:spPr>
           <a:xfrm>
-            <a:off x="985777" y="1689044"/>
+            <a:off x="978792" y="1695394"/>
             <a:ext cx="10521387" cy="4114710"/>
           </a:xfrm>
           <a:prstGeom prst="rect">
@@ -4905,7 +6808,7 @@
         </p:spPr>
         <p:txBody>
           <a:bodyPr vert="horz" lIns="91440" tIns="45720" rIns="91440" bIns="45720" rtlCol="0" anchor="t">
-            <a:normAutofit/>
+            <a:normAutofit lnSpcReduction="20000"/>
           </a:bodyPr>
           <a:lstStyle>
             <a:lvl1pPr marL="306070" indent="-306070" algn="l" defTabSz="457200" rtl="0" eaLnBrk="1" latinLnBrk="0" hangingPunct="1">
@@ -5115,2497 +7018,123 @@
             <a:endParaRPr kumimoji="1" lang="en-US" altLang="zh-CN" dirty="0"/>
           </a:p>
           <a:p>
+            <a:pPr lvl="0"/>
+            <a:r>
+              <a:rPr kumimoji="1" lang="zh-CN" altLang="en-US" dirty="0"/>
+              <a:t>实现内容：</a:t>
+            </a:r>
+            <a:endParaRPr kumimoji="1" lang="zh-CN" altLang="en-US" dirty="0"/>
+          </a:p>
+          <a:p>
             <a:pPr lvl="1"/>
             <a:r>
-              <a:rPr kumimoji="1" lang="zh-CN" altLang="zh-CN" dirty="0"/>
-              <a:t>代码量大，涉及代码类型</a:t>
-            </a:r>
-            <a:r>
-              <a:rPr kumimoji="1" lang="zh-CN" altLang="zh-CN" dirty="0"/>
-              <a:t>众多</a:t>
-            </a:r>
-            <a:endParaRPr kumimoji="1" lang="zh-CN" altLang="zh-CN" dirty="0"/>
+              <a:rPr kumimoji="1" lang="zh-CN" altLang="en-US" sz="1600" dirty="0"/>
+              <a:t>一个基本的内核</a:t>
+            </a:r>
+            <a:endParaRPr kumimoji="1" lang="zh-CN" altLang="en-US" dirty="0"/>
+          </a:p>
+          <a:p>
+            <a:pPr lvl="1"/>
+            <a:r>
+              <a:rPr kumimoji="1" lang="zh-CN" altLang="en-US" dirty="0"/>
+              <a:t>任务调度（</a:t>
+            </a:r>
+            <a:r>
+              <a:rPr kumimoji="1" lang="en-US" altLang="zh-CN" dirty="0"/>
+              <a:t>tcb </a:t>
+            </a:r>
+            <a:r>
+              <a:rPr kumimoji="1" lang="zh-CN" altLang="en-US" dirty="0"/>
+              <a:t>、</a:t>
+            </a:r>
+            <a:r>
+              <a:rPr kumimoji="1" lang="en-US" altLang="zh-CN" dirty="0"/>
+              <a:t> </a:t>
+            </a:r>
+            <a:r>
+              <a:rPr kumimoji="1" lang="en-US" altLang="zh-CN" dirty="0"/>
+              <a:t>schedule context</a:t>
+            </a:r>
+            <a:r>
+              <a:rPr kumimoji="1" lang="zh-CN" altLang="en-US" dirty="0"/>
+              <a:t>）</a:t>
+            </a:r>
+            <a:endParaRPr kumimoji="1" lang="zh-CN" altLang="en-US" dirty="0"/>
+          </a:p>
+          <a:p>
+            <a:pPr lvl="1"/>
+            <a:r>
+              <a:rPr kumimoji="1" lang="zh-CN" altLang="en-US" dirty="0"/>
+              <a:t>中断异常</a:t>
+            </a:r>
+            <a:r>
+              <a:rPr kumimoji="1" lang="zh-CN" altLang="en-US" dirty="0"/>
+              <a:t>处理</a:t>
+            </a:r>
+            <a:endParaRPr kumimoji="1" lang="zh-CN" altLang="en-US" dirty="0"/>
+          </a:p>
+          <a:p>
+            <a:pPr lvl="1"/>
+            <a:r>
+              <a:rPr kumimoji="1" lang="zh-CN" altLang="en-US" dirty="0"/>
+              <a:t>内存管理（</a:t>
+            </a:r>
+            <a:r>
+              <a:rPr kumimoji="1" lang="en-US" altLang="zh-CN" dirty="0"/>
+              <a:t>VSpace</a:t>
+            </a:r>
+            <a:r>
+              <a:rPr kumimoji="1" lang="zh-CN" altLang="en-US" dirty="0"/>
+              <a:t>）</a:t>
+            </a:r>
+            <a:endParaRPr kumimoji="1" lang="zh-CN" altLang="en-US" dirty="0"/>
+          </a:p>
+          <a:p>
+            <a:pPr lvl="1"/>
+            <a:r>
+              <a:rPr kumimoji="1" lang="zh-CN" altLang="en-US" dirty="0"/>
+              <a:t>能力空间（</a:t>
+            </a:r>
+            <a:r>
+              <a:rPr kumimoji="1" lang="en-US" altLang="zh-CN" dirty="0"/>
+              <a:t>CNode</a:t>
+            </a:r>
+            <a:r>
+              <a:rPr kumimoji="1" lang="zh-CN" altLang="en-US" dirty="0"/>
+              <a:t>）</a:t>
+            </a:r>
+            <a:endParaRPr kumimoji="1" lang="zh-CN" altLang="en-US" dirty="0"/>
+          </a:p>
+          <a:p>
+            <a:pPr lvl="1"/>
+            <a:r>
+              <a:rPr kumimoji="1" lang="zh-CN" altLang="en-US" dirty="0"/>
+              <a:t>进程间通信（</a:t>
+            </a:r>
+            <a:r>
+              <a:rPr kumimoji="1" lang="en-US" altLang="zh-CN" dirty="0"/>
+              <a:t>notification</a:t>
+            </a:r>
+            <a:r>
+              <a:rPr kumimoji="1" lang="zh-CN" altLang="en-US" dirty="0"/>
+              <a:t>、</a:t>
+            </a:r>
+            <a:r>
+              <a:rPr kumimoji="1" lang="en-US" altLang="zh-CN" dirty="0"/>
+              <a:t>endpoint</a:t>
+            </a:r>
+            <a:r>
+              <a:rPr kumimoji="1" lang="zh-CN" altLang="en-US" dirty="0"/>
+              <a:t>）</a:t>
+            </a:r>
+            <a:endParaRPr kumimoji="1" lang="zh-CN" altLang="en-US" dirty="0"/>
+          </a:p>
+          <a:p>
+            <a:pPr lvl="1"/>
+            <a:endParaRPr kumimoji="1" lang="zh-CN" altLang="en-US" dirty="0"/>
           </a:p>
           <a:p>
             <a:pPr lvl="2"/>
-            <a:r>
-              <a:rPr kumimoji="1" lang="zh-CN" altLang="zh-CN" sz="1400" dirty="0"/>
-              <a:t>内核代码量行数</a:t>
-            </a:r>
-            <a:r>
-              <a:rPr kumimoji="1" lang="en-US" altLang="zh-CN" sz="1400" dirty="0"/>
-              <a:t>1w+</a:t>
-            </a:r>
-            <a:r>
-              <a:rPr kumimoji="1" lang="zh-CN" altLang="en-US" sz="1400" dirty="0"/>
-              <a:t>行，包含</a:t>
-            </a:r>
-            <a:r>
-              <a:rPr kumimoji="1" lang="en-US" altLang="zh-CN" sz="1400" dirty="0"/>
-              <a:t>.c </a:t>
-            </a:r>
-            <a:r>
-              <a:rPr kumimoji="1" lang="zh-CN" altLang="en-US" sz="1400" dirty="0"/>
-              <a:t>、汇编、</a:t>
-            </a:r>
-            <a:r>
-              <a:rPr kumimoji="1" lang="en-US" altLang="zh-CN" sz="1400" dirty="0"/>
-              <a:t>.ld</a:t>
-            </a:r>
-            <a:r>
-              <a:rPr kumimoji="1" lang="zh-CN" altLang="en-US" sz="1400" dirty="0"/>
-              <a:t>、</a:t>
-            </a:r>
-            <a:r>
-              <a:rPr kumimoji="1" lang="en-US" altLang="zh-CN" sz="1400" dirty="0"/>
-              <a:t>.py </a:t>
-            </a:r>
-            <a:r>
-              <a:rPr kumimoji="1" lang="zh-CN" altLang="en-US" sz="1400" dirty="0"/>
-              <a:t>、</a:t>
-            </a:r>
-            <a:r>
-              <a:rPr kumimoji="1" lang="en-US" altLang="zh-CN" sz="1400" dirty="0"/>
-              <a:t> .sh</a:t>
-            </a:r>
-            <a:r>
-              <a:rPr kumimoji="1" lang="zh-CN" altLang="en-US" sz="1400" dirty="0"/>
-              <a:t>、</a:t>
-            </a:r>
-            <a:r>
-              <a:rPr kumimoji="1" lang="en-US" altLang="zh-CN" sz="1400" dirty="0"/>
-              <a:t>cmake</a:t>
-            </a:r>
-            <a:r>
-              <a:rPr kumimoji="1" lang="zh-CN" altLang="en-US" sz="1400" dirty="0"/>
-              <a:t>等文件</a:t>
-            </a:r>
-            <a:endParaRPr kumimoji="1" lang="zh-CN" altLang="zh-CN" dirty="0"/>
-          </a:p>
-          <a:p>
-            <a:pPr lvl="1"/>
-            <a:r>
-              <a:rPr kumimoji="1" lang="zh-CN" altLang="en-US" dirty="0"/>
-              <a:t>适配的工程项目复杂</a:t>
-            </a:r>
-            <a:endParaRPr kumimoji="1" lang="zh-CN" altLang="en-US" dirty="0"/>
-          </a:p>
-          <a:p>
-            <a:pPr lvl="1"/>
-            <a:r>
-              <a:rPr kumimoji="1" lang="en-US" altLang="zh-CN" dirty="0"/>
-              <a:t>sel4</a:t>
-            </a:r>
-            <a:r>
-              <a:rPr kumimoji="1" lang="zh-CN" altLang="en-US" dirty="0"/>
-              <a:t>相关资料内容少</a:t>
-            </a:r>
-            <a:endParaRPr kumimoji="1" lang="zh-CN" altLang="en-US" dirty="0"/>
-          </a:p>
-          <a:p>
-            <a:pPr lvl="2"/>
-            <a:r>
-              <a:rPr kumimoji="1" lang="en-US" altLang="zh-CN" dirty="0"/>
-              <a:t>相比于 </a:t>
-            </a:r>
-            <a:r>
-              <a:rPr kumimoji="1" lang="en-US" altLang="zh-CN" dirty="0"/>
-              <a:t>freerots，seL4 的官方指导资料和技术博客较少，官方只提供了架构无关的设计思想，</a:t>
-            </a:r>
-            <a:endParaRPr kumimoji="1" lang="en-US" altLang="zh-CN" dirty="0"/>
-          </a:p>
-          <a:p>
-            <a:pPr lvl="3"/>
-            <a:endParaRPr kumimoji="1" lang="en-US" altLang="zh-CN" dirty="0"/>
-          </a:p>
-          <a:p>
-            <a:pPr lvl="3"/>
-            <a:endParaRPr kumimoji="1" lang="zh-CN" altLang="en-US" dirty="0"/>
-          </a:p>
-        </p:txBody>
-      </p:sp>
-      <p:pic>
-        <p:nvPicPr>
-          <p:cNvPr id="4" name="图片 3"/>
-          <p:cNvPicPr>
-            <a:picLocks noChangeAspect="1"/>
-          </p:cNvPicPr>
-          <p:nvPr>
-            <p:custDataLst>
-              <p:tags r:id="rId1"/>
-            </p:custDataLst>
-          </p:nvPr>
-        </p:nvPicPr>
-        <p:blipFill>
-          <a:blip r:embed="rId2"/>
-          <a:stretch>
-            <a:fillRect/>
-          </a:stretch>
-        </p:blipFill>
-        <p:spPr>
-          <a:xfrm>
-            <a:off x="7519670" y="1125220"/>
-            <a:ext cx="4389120" cy="2217420"/>
-          </a:xfrm>
-          <a:prstGeom prst="rect">
-            <a:avLst/>
-          </a:prstGeom>
-        </p:spPr>
-      </p:pic>
-      <p:pic>
-        <p:nvPicPr>
-          <p:cNvPr id="7" name="图片 6" descr="微信图片_202301050903041"/>
-          <p:cNvPicPr>
-            <a:picLocks noChangeAspect="1"/>
-          </p:cNvPicPr>
-          <p:nvPr/>
-        </p:nvPicPr>
-        <p:blipFill>
-          <a:blip r:embed="rId3"/>
-          <a:stretch>
-            <a:fillRect/>
-          </a:stretch>
-        </p:blipFill>
-        <p:spPr>
-          <a:xfrm>
-            <a:off x="6026150" y="4541520"/>
-            <a:ext cx="5576570" cy="1384935"/>
-          </a:xfrm>
-          <a:prstGeom prst="rect">
-            <a:avLst/>
-          </a:prstGeom>
-        </p:spPr>
-      </p:pic>
-    </p:spTree>
-  </p:cSld>
-  <p:clrMapOvr>
-    <a:masterClrMapping/>
-  </p:clrMapOvr>
-</p:sld>
-</file>
-
-<file path=ppt/slides/slide11.xml><?xml version="1.0" encoding="utf-8"?>
-<p:sld xmlns:a="http://schemas.openxmlformats.org/drawingml/2006/main" xmlns:r="http://schemas.openxmlformats.org/officeDocument/2006/relationships" xmlns:p="http://schemas.openxmlformats.org/presentationml/2006/main">
-  <p:cSld>
-    <p:spTree>
-      <p:nvGrpSpPr>
-        <p:cNvPr id="1" name=""/>
-        <p:cNvGrpSpPr/>
-        <p:nvPr/>
-      </p:nvGrpSpPr>
-      <p:grpSpPr>
-        <a:xfrm>
-          <a:off x="0" y="0"/>
-          <a:ext cx="0" cy="0"/>
-          <a:chOff x="0" y="0"/>
-          <a:chExt cx="0" cy="0"/>
-        </a:xfrm>
-      </p:grpSpPr>
-      <p:sp>
-        <p:nvSpPr>
-          <p:cNvPr id="2" name="内容占位符 1"/>
-          <p:cNvSpPr>
-            <a:spLocks noGrp="1"/>
-          </p:cNvSpPr>
-          <p:nvPr>
-            <p:ph idx="1"/>
-          </p:nvPr>
-        </p:nvSpPr>
-        <p:spPr>
-          <a:xfrm>
-            <a:off x="835307" y="2048614"/>
-            <a:ext cx="10521387" cy="4448778"/>
-          </a:xfrm>
-        </p:spPr>
-        <p:txBody>
-          <a:bodyPr>
-            <a:normAutofit/>
-          </a:bodyPr>
-          <a:lstStyle/>
-          <a:p>
-            <a:r>
-              <a:rPr kumimoji="1" lang="zh-CN" altLang="en-US" dirty="0"/>
-              <a:t>开题</a:t>
-            </a:r>
-            <a:r>
-              <a:rPr kumimoji="1" lang="en-US" altLang="zh-CN" dirty="0"/>
-              <a:t>——</a:t>
-            </a:r>
-            <a:r>
-              <a:rPr kumimoji="1" lang="zh-CN" altLang="en-US" dirty="0"/>
-              <a:t>开题两周后</a:t>
-            </a:r>
-            <a:endParaRPr kumimoji="1" lang="en-US" altLang="zh-CN" dirty="0"/>
-          </a:p>
-          <a:p>
-            <a:pPr lvl="1"/>
-            <a:r>
-              <a:rPr kumimoji="1" lang="zh-CN" altLang="en-US" dirty="0"/>
-              <a:t>完成</a:t>
-            </a:r>
-            <a:r>
-              <a:rPr kumimoji="1" lang="en-US" altLang="zh-CN" dirty="0" err="1"/>
-              <a:t>elfloader</a:t>
-            </a:r>
-            <a:r>
-              <a:rPr kumimoji="1" lang="zh-CN" altLang="en-US" dirty="0"/>
-              <a:t>部分的迁移</a:t>
-            </a:r>
-            <a:endParaRPr kumimoji="1" lang="en-US" altLang="zh-CN" dirty="0"/>
-          </a:p>
-          <a:p>
-            <a:r>
-              <a:rPr kumimoji="1" lang="zh-CN" altLang="en-US" dirty="0"/>
-              <a:t>开题两周后</a:t>
-            </a:r>
-            <a:r>
-              <a:rPr kumimoji="1" lang="en-US" altLang="zh-CN" dirty="0"/>
-              <a:t>——</a:t>
-            </a:r>
-            <a:r>
-              <a:rPr kumimoji="1" lang="zh-CN" altLang="en-US" dirty="0"/>
-              <a:t>开学前后</a:t>
-            </a:r>
-            <a:endParaRPr kumimoji="1" lang="en-US" altLang="zh-CN" dirty="0"/>
-          </a:p>
-          <a:p>
-            <a:pPr lvl="1"/>
-            <a:r>
-              <a:rPr kumimoji="1" lang="zh-CN" altLang="en-US" dirty="0"/>
-              <a:t>完成</a:t>
-            </a:r>
-            <a:r>
-              <a:rPr kumimoji="1" lang="en-US" altLang="zh-CN" dirty="0"/>
-              <a:t>sel4</a:t>
-            </a:r>
-            <a:r>
-              <a:rPr kumimoji="1" lang="zh-CN" altLang="en-US" dirty="0"/>
-              <a:t>内核对象的</a:t>
-            </a:r>
-            <a:r>
-              <a:rPr kumimoji="1" lang="en-US" altLang="zh-CN" dirty="0"/>
-              <a:t>rust</a:t>
-            </a:r>
-            <a:r>
-              <a:rPr kumimoji="1" lang="zh-CN" altLang="en-US" dirty="0"/>
-              <a:t>实现</a:t>
-            </a:r>
-            <a:endParaRPr kumimoji="1" lang="en-US" altLang="zh-CN" dirty="0"/>
-          </a:p>
-          <a:p>
-            <a:r>
-              <a:rPr kumimoji="1" lang="zh-CN" altLang="en-US" dirty="0"/>
-              <a:t>开学前后</a:t>
-            </a:r>
-            <a:r>
-              <a:rPr kumimoji="1" lang="en-US" altLang="zh-CN" dirty="0"/>
-              <a:t>——</a:t>
-            </a:r>
-            <a:r>
-              <a:rPr kumimoji="1" lang="zh-CN" altLang="en-US" dirty="0"/>
-              <a:t>中期前后</a:t>
-            </a:r>
-            <a:endParaRPr kumimoji="1" lang="en-US" altLang="zh-CN" dirty="0"/>
-          </a:p>
-          <a:p>
-            <a:pPr lvl="1"/>
-            <a:r>
-              <a:rPr kumimoji="1" lang="zh-CN" altLang="en-US" dirty="0"/>
-              <a:t>完成</a:t>
-            </a:r>
-            <a:r>
-              <a:rPr kumimoji="1" lang="en-US" altLang="zh-CN" dirty="0"/>
-              <a:t>sel4</a:t>
-            </a:r>
-            <a:r>
-              <a:rPr kumimoji="1" lang="zh-CN" altLang="en-US" dirty="0"/>
-              <a:t>内核服务的</a:t>
-            </a:r>
-            <a:r>
-              <a:rPr kumimoji="1" lang="en-US" altLang="zh-CN" dirty="0"/>
-              <a:t>rust</a:t>
-            </a:r>
-            <a:r>
-              <a:rPr kumimoji="1" lang="zh-CN" altLang="en-US" dirty="0"/>
-              <a:t>实现</a:t>
-            </a:r>
-            <a:endParaRPr kumimoji="1" lang="en-US" altLang="zh-CN" dirty="0"/>
-          </a:p>
-          <a:p>
-            <a:r>
-              <a:rPr kumimoji="1" lang="zh-CN" altLang="en-US" dirty="0"/>
-              <a:t>中期</a:t>
-            </a:r>
-            <a:r>
-              <a:rPr kumimoji="1" lang="en-US" altLang="zh-CN" dirty="0"/>
-              <a:t>——</a:t>
-            </a:r>
-            <a:r>
-              <a:rPr kumimoji="1" lang="zh-CN" altLang="en-US" dirty="0"/>
-              <a:t>中期两周后</a:t>
-            </a:r>
-            <a:endParaRPr kumimoji="1" lang="en-US" altLang="zh-CN" dirty="0"/>
-          </a:p>
-          <a:p>
-            <a:pPr lvl="1"/>
-            <a:r>
-              <a:rPr kumimoji="1" lang="zh-CN" altLang="en-US" dirty="0"/>
-              <a:t>编写</a:t>
-            </a:r>
-            <a:r>
-              <a:rPr kumimoji="1" lang="en-US" altLang="zh-CN" dirty="0"/>
-              <a:t>sel4test </a:t>
-            </a:r>
-            <a:r>
-              <a:rPr kumimoji="1" lang="zh-CN" altLang="en-US" dirty="0"/>
-              <a:t>所需的</a:t>
-            </a:r>
-            <a:r>
-              <a:rPr kumimoji="1" lang="en-US" altLang="zh-CN" dirty="0" err="1"/>
-              <a:t>api</a:t>
-            </a:r>
-            <a:r>
-              <a:rPr kumimoji="1" lang="zh-CN" altLang="en-US" dirty="0"/>
-              <a:t>接口</a:t>
-            </a:r>
-            <a:endParaRPr kumimoji="1" lang="en-US" altLang="zh-CN" dirty="0"/>
-          </a:p>
-          <a:p>
-            <a:r>
-              <a:rPr kumimoji="1" lang="zh-CN" altLang="en-US" dirty="0"/>
-              <a:t>中期</a:t>
-            </a:r>
-            <a:r>
-              <a:rPr kumimoji="1" lang="en-US" altLang="zh-CN" dirty="0"/>
-              <a:t>——</a:t>
-            </a:r>
-            <a:r>
-              <a:rPr kumimoji="1" lang="zh-CN" altLang="en-US" dirty="0"/>
-              <a:t>最后</a:t>
-            </a:r>
-            <a:endParaRPr kumimoji="1" lang="en-US" altLang="zh-CN" dirty="0"/>
-          </a:p>
-          <a:p>
-            <a:pPr lvl="1"/>
-            <a:r>
-              <a:rPr kumimoji="1" lang="zh-CN" altLang="en-US" dirty="0"/>
-              <a:t>寻找可能的</a:t>
-            </a:r>
-            <a:r>
-              <a:rPr kumimoji="1" lang="en-US" altLang="zh-CN" dirty="0"/>
-              <a:t>bug</a:t>
-            </a:r>
-            <a:r>
-              <a:rPr kumimoji="1" lang="zh-CN" altLang="en-US" dirty="0"/>
-              <a:t>，撰写论文</a:t>
-            </a:r>
-            <a:endParaRPr kumimoji="1" lang="en-US" altLang="zh-CN" dirty="0"/>
-          </a:p>
-          <a:p>
-            <a:endParaRPr kumimoji="1" lang="en-US" altLang="zh-CN" dirty="0"/>
-          </a:p>
-        </p:txBody>
-      </p:sp>
-      <p:sp>
-        <p:nvSpPr>
-          <p:cNvPr id="3" name="标题 2"/>
-          <p:cNvSpPr>
-            <a:spLocks noGrp="1"/>
-          </p:cNvSpPr>
-          <p:nvPr>
-            <p:ph type="title"/>
-          </p:nvPr>
-        </p:nvSpPr>
-        <p:spPr/>
-        <p:txBody>
-          <a:bodyPr/>
-          <a:lstStyle/>
-          <a:p>
-            <a:r>
-              <a:rPr kumimoji="1" lang="zh-CN" altLang="en-US" dirty="0"/>
-              <a:t>设计规划</a:t>
-            </a:r>
-            <a:endParaRPr kumimoji="1" lang="zh-CN" altLang="en-US" dirty="0"/>
-          </a:p>
-        </p:txBody>
-      </p:sp>
-    </p:spTree>
-  </p:cSld>
-  <p:clrMapOvr>
-    <a:masterClrMapping/>
-  </p:clrMapOvr>
-</p:sld>
-</file>
-
-<file path=ppt/slides/slide12.xml><?xml version="1.0" encoding="utf-8"?>
-<p:sld xmlns:a="http://schemas.openxmlformats.org/drawingml/2006/main" xmlns:r="http://schemas.openxmlformats.org/officeDocument/2006/relationships" xmlns:p="http://schemas.openxmlformats.org/presentationml/2006/main">
-  <p:cSld>
-    <p:spTree>
-      <p:nvGrpSpPr>
-        <p:cNvPr id="1" name=""/>
-        <p:cNvGrpSpPr/>
-        <p:nvPr/>
-      </p:nvGrpSpPr>
-      <p:grpSpPr>
-        <a:xfrm>
-          <a:off x="0" y="0"/>
-          <a:ext cx="0" cy="0"/>
-          <a:chOff x="0" y="0"/>
-          <a:chExt cx="0" cy="0"/>
-        </a:xfrm>
-      </p:grpSpPr>
-      <p:sp>
-        <p:nvSpPr>
-          <p:cNvPr id="4" name="标题 3"/>
-          <p:cNvSpPr>
-            <a:spLocks noGrp="1"/>
-          </p:cNvSpPr>
-          <p:nvPr>
-            <p:ph type="ctrTitle"/>
-          </p:nvPr>
-        </p:nvSpPr>
-        <p:spPr/>
-        <p:txBody>
-          <a:bodyPr/>
-          <a:lstStyle/>
-          <a:p>
-            <a:pPr algn="ctr"/>
-            <a:r>
-              <a:rPr kumimoji="1" lang="zh-CN" altLang="en-US" dirty="0"/>
-              <a:t>谢谢！</a:t>
-            </a:r>
-            <a:endParaRPr kumimoji="1" lang="zh-CN" altLang="en-US" dirty="0"/>
-          </a:p>
-        </p:txBody>
-      </p:sp>
-      <p:sp>
-        <p:nvSpPr>
-          <p:cNvPr id="5" name="副标题 4"/>
-          <p:cNvSpPr>
-            <a:spLocks noGrp="1"/>
-          </p:cNvSpPr>
-          <p:nvPr>
-            <p:ph type="subTitle" idx="1"/>
-          </p:nvPr>
-        </p:nvSpPr>
-        <p:spPr/>
-        <p:txBody>
-          <a:bodyPr>
-            <a:normAutofit/>
-          </a:bodyPr>
-          <a:lstStyle/>
-          <a:p>
-            <a:endParaRPr kumimoji="1" lang="zh-CN" altLang="en-US" dirty="0"/>
-          </a:p>
-        </p:txBody>
-      </p:sp>
-    </p:spTree>
-  </p:cSld>
-  <p:clrMapOvr>
-    <a:masterClrMapping/>
-  </p:clrMapOvr>
-</p:sld>
-</file>
-
-<file path=ppt/slides/slide2.xml><?xml version="1.0" encoding="utf-8"?>
-<p:sld xmlns:a="http://schemas.openxmlformats.org/drawingml/2006/main" xmlns:r="http://schemas.openxmlformats.org/officeDocument/2006/relationships" xmlns:p="http://schemas.openxmlformats.org/presentationml/2006/main">
-  <p:cSld>
-    <p:spTree>
-      <p:nvGrpSpPr>
-        <p:cNvPr id="1" name=""/>
-        <p:cNvGrpSpPr/>
-        <p:nvPr/>
-      </p:nvGrpSpPr>
-      <p:grpSpPr>
-        <a:xfrm>
-          <a:off x="0" y="0"/>
-          <a:ext cx="0" cy="0"/>
-          <a:chOff x="0" y="0"/>
-          <a:chExt cx="0" cy="0"/>
-        </a:xfrm>
-      </p:grpSpPr>
-      <p:sp>
-        <p:nvSpPr>
-          <p:cNvPr id="2" name="内容占位符 1"/>
-          <p:cNvSpPr>
-            <a:spLocks noGrp="1"/>
-          </p:cNvSpPr>
-          <p:nvPr>
-            <p:ph idx="1"/>
-          </p:nvPr>
-        </p:nvSpPr>
-        <p:spPr/>
-        <p:txBody>
-          <a:bodyPr/>
-          <a:lstStyle/>
-          <a:p>
-            <a:r>
-              <a:rPr kumimoji="1" lang="zh-CN" altLang="en-US" dirty="0"/>
-              <a:t>高安全性 、高性能的操作系统微内核</a:t>
-            </a:r>
-            <a:endParaRPr kumimoji="1" lang="zh-CN" altLang="en-US" dirty="0"/>
-          </a:p>
-          <a:p>
-            <a:r>
-              <a:rPr kumimoji="1" lang="zh-CN" altLang="en-US" dirty="0"/>
-              <a:t>数据完整性、数据保密性</a:t>
-            </a:r>
-            <a:endParaRPr kumimoji="1" lang="zh-CN" altLang="en-US" dirty="0"/>
-          </a:p>
-          <a:p>
-            <a:r>
-              <a:rPr kumimoji="1" lang="zh-CN" altLang="en-US" dirty="0"/>
-              <a:t>混合临界系统：即在同时运行可靠和不可靠代码的情况下，可以保证关键可靠代码的硬实时性，可信代码实时性不会被非可信代码的异常行为破坏</a:t>
-            </a:r>
-            <a:endParaRPr kumimoji="1" lang="zh-CN" altLang="en-US" dirty="0"/>
-          </a:p>
-          <a:p>
-            <a:r>
-              <a:rPr kumimoji="1" lang="en-US" altLang="zh-CN" dirty="0"/>
-              <a:t>c</a:t>
-            </a:r>
-            <a:r>
-              <a:rPr kumimoji="1" lang="zh-CN" altLang="en-US" dirty="0"/>
-              <a:t>编写，内核部分代码有</a:t>
-            </a:r>
-            <a:r>
-              <a:rPr kumimoji="1" lang="en-US" altLang="zh-CN" dirty="0"/>
-              <a:t>1w</a:t>
-            </a:r>
-            <a:r>
-              <a:rPr kumimoji="1" lang="zh-CN" altLang="en-US" dirty="0"/>
-              <a:t>行左右</a:t>
-            </a:r>
-            <a:endParaRPr kumimoji="1" lang="zh-CN" altLang="en-US" dirty="0"/>
-          </a:p>
-        </p:txBody>
-      </p:sp>
-      <p:sp>
-        <p:nvSpPr>
-          <p:cNvPr id="3" name="标题 2"/>
-          <p:cNvSpPr>
-            <a:spLocks noGrp="1"/>
-          </p:cNvSpPr>
-          <p:nvPr>
-            <p:ph type="title"/>
-          </p:nvPr>
-        </p:nvSpPr>
-        <p:spPr/>
-        <p:txBody>
-          <a:bodyPr/>
-          <a:lstStyle/>
-          <a:p>
-            <a:r>
-              <a:rPr kumimoji="1" lang="zh-CN" altLang="en-US" dirty="0"/>
-              <a:t>设计背景：</a:t>
-            </a:r>
-            <a:r>
-              <a:rPr kumimoji="1" lang="en-US" altLang="zh-CN" dirty="0"/>
-              <a:t>sEL4</a:t>
-            </a:r>
-            <a:endParaRPr kumimoji="1" lang="en-US" altLang="zh-CN" dirty="0"/>
-          </a:p>
-        </p:txBody>
-      </p:sp>
-      <p:pic>
-        <p:nvPicPr>
-          <p:cNvPr id="6" name="图片 5"/>
-          <p:cNvPicPr>
-            <a:picLocks noChangeAspect="1"/>
-          </p:cNvPicPr>
-          <p:nvPr/>
-        </p:nvPicPr>
-        <p:blipFill>
-          <a:blip r:embed="rId1"/>
-          <a:stretch>
-            <a:fillRect/>
-          </a:stretch>
-        </p:blipFill>
-        <p:spPr>
-          <a:xfrm>
-            <a:off x="8919210" y="618490"/>
-            <a:ext cx="2051050" cy="965200"/>
-          </a:xfrm>
-          <a:prstGeom prst="rect">
-            <a:avLst/>
-          </a:prstGeom>
-        </p:spPr>
-      </p:pic>
-    </p:spTree>
-  </p:cSld>
-  <p:clrMapOvr>
-    <a:masterClrMapping/>
-  </p:clrMapOvr>
-</p:sld>
-</file>
-
-<file path=ppt/slides/slide3.xml><?xml version="1.0" encoding="utf-8"?>
-<p:sld xmlns:a="http://schemas.openxmlformats.org/drawingml/2006/main" xmlns:r="http://schemas.openxmlformats.org/officeDocument/2006/relationships" xmlns:p="http://schemas.openxmlformats.org/presentationml/2006/main">
-  <p:cSld>
-    <p:spTree>
-      <p:nvGrpSpPr>
-        <p:cNvPr id="1" name=""/>
-        <p:cNvGrpSpPr/>
-        <p:nvPr/>
-      </p:nvGrpSpPr>
-      <p:grpSpPr>
-        <a:xfrm>
-          <a:off x="0" y="0"/>
-          <a:ext cx="0" cy="0"/>
-          <a:chOff x="0" y="0"/>
-          <a:chExt cx="0" cy="0"/>
-        </a:xfrm>
-      </p:grpSpPr>
-      <p:sp>
-        <p:nvSpPr>
-          <p:cNvPr id="6" name="内容占位符 5"/>
-          <p:cNvSpPr>
-            <a:spLocks noGrp="1"/>
-          </p:cNvSpPr>
-          <p:nvPr>
-            <p:ph idx="1"/>
-          </p:nvPr>
-        </p:nvSpPr>
-        <p:spPr>
-          <a:xfrm>
-            <a:off x="890528" y="1729648"/>
-            <a:ext cx="6306774" cy="3678303"/>
-          </a:xfrm>
-        </p:spPr>
-        <p:txBody>
-          <a:bodyPr>
-            <a:normAutofit/>
-          </a:bodyPr>
-          <a:lstStyle/>
-          <a:p>
-            <a:endParaRPr kumimoji="1" lang="en-US" altLang="zh-CN" dirty="0"/>
-          </a:p>
-          <a:p>
-            <a:r>
-              <a:rPr kumimoji="1" lang="en-US" altLang="zh-CN" dirty="0"/>
-              <a:t>capability</a:t>
-            </a:r>
-            <a:r>
-              <a:rPr kumimoji="1" lang="zh-CN" altLang="en-US" dirty="0"/>
-              <a:t>机制</a:t>
-            </a:r>
-            <a:endParaRPr kumimoji="1" lang="zh-CN" altLang="en-US" dirty="0"/>
-          </a:p>
-          <a:p>
-            <a:pPr lvl="1"/>
-            <a:r>
-              <a:rPr kumimoji="1" lang="zh-CN" altLang="en-US" sz="1600" dirty="0"/>
-              <a:t>细粒度访问</a:t>
-            </a:r>
-            <a:endParaRPr kumimoji="1" lang="zh-CN" altLang="en-US" sz="1600" dirty="0"/>
-          </a:p>
-          <a:p>
-            <a:pPr lvl="1"/>
-            <a:r>
-              <a:rPr kumimoji="1" lang="zh-CN" altLang="en-US" sz="1600" dirty="0"/>
-              <a:t>打桩机制</a:t>
-            </a:r>
-            <a:endParaRPr kumimoji="1" lang="zh-CN" altLang="en-US" sz="1600" dirty="0"/>
-          </a:p>
-          <a:p>
-            <a:pPr lvl="0"/>
-            <a:r>
-              <a:rPr kumimoji="1" lang="zh-CN" altLang="en-US" dirty="0">
-                <a:sym typeface="+mn-ea"/>
-              </a:rPr>
-              <a:t>可信计算库小</a:t>
-            </a:r>
-            <a:endParaRPr kumimoji="1" lang="zh-CN" altLang="en-US" dirty="0"/>
-          </a:p>
-          <a:p>
-            <a:r>
-              <a:rPr kumimoji="1" lang="zh-CN" altLang="en-US" dirty="0"/>
-              <a:t>用户程序之间的</a:t>
-            </a:r>
-            <a:r>
-              <a:rPr kumimoji="1" lang="zh-CN" altLang="en-US" dirty="0"/>
-              <a:t>隔离</a:t>
-            </a:r>
-            <a:endParaRPr kumimoji="1" lang="zh-CN" altLang="en-US" dirty="0"/>
-          </a:p>
-          <a:p>
-            <a:r>
-              <a:rPr kumimoji="1" lang="zh-CN" altLang="en-US" dirty="0"/>
-              <a:t>全面的形式化</a:t>
-            </a:r>
-            <a:r>
-              <a:rPr kumimoji="1" lang="zh-CN" altLang="en-US" dirty="0"/>
-              <a:t>验证</a:t>
-            </a:r>
-            <a:endParaRPr kumimoji="1" lang="zh-CN" altLang="en-US" dirty="0"/>
-          </a:p>
-          <a:p>
-            <a:endParaRPr kumimoji="1" lang="zh-CN" altLang="en-US" dirty="0"/>
-          </a:p>
-        </p:txBody>
-      </p:sp>
-      <p:sp>
-        <p:nvSpPr>
-          <p:cNvPr id="5" name="标题 4"/>
-          <p:cNvSpPr>
-            <a:spLocks noGrp="1"/>
-          </p:cNvSpPr>
-          <p:nvPr>
-            <p:ph type="title"/>
-          </p:nvPr>
-        </p:nvSpPr>
-        <p:spPr/>
-        <p:txBody>
-          <a:bodyPr/>
-          <a:lstStyle/>
-          <a:p>
-            <a:r>
-              <a:rPr kumimoji="1" lang="zh-CN" altLang="en-US" dirty="0"/>
-              <a:t>设计背景：</a:t>
-            </a:r>
-            <a:r>
-              <a:rPr kumimoji="1" lang="en-US" altLang="zh-CN" dirty="0"/>
-              <a:t>sel4</a:t>
-            </a:r>
-            <a:r>
-              <a:rPr kumimoji="1" lang="zh-CN" altLang="en-US" dirty="0"/>
-              <a:t>安全性</a:t>
-            </a:r>
-            <a:endParaRPr kumimoji="1" lang="zh-CN" altLang="en-US" dirty="0"/>
-          </a:p>
-        </p:txBody>
-      </p:sp>
-      <p:pic>
-        <p:nvPicPr>
-          <p:cNvPr id="2" name="图片 1"/>
-          <p:cNvPicPr>
-            <a:picLocks noChangeAspect="1"/>
-          </p:cNvPicPr>
-          <p:nvPr>
-            <p:custDataLst>
-              <p:tags r:id="rId1"/>
-            </p:custDataLst>
-          </p:nvPr>
-        </p:nvPicPr>
-        <p:blipFill>
-          <a:blip r:embed="rId2"/>
-          <a:stretch>
-            <a:fillRect/>
-          </a:stretch>
-        </p:blipFill>
-        <p:spPr>
-          <a:xfrm>
-            <a:off x="5358765" y="3577590"/>
-            <a:ext cx="5004435" cy="2916555"/>
-          </a:xfrm>
-          <a:prstGeom prst="rect">
-            <a:avLst/>
-          </a:prstGeom>
-        </p:spPr>
-      </p:pic>
-      <p:pic>
-        <p:nvPicPr>
-          <p:cNvPr id="7" name="图片 6"/>
-          <p:cNvPicPr>
-            <a:picLocks noChangeAspect="1"/>
-          </p:cNvPicPr>
-          <p:nvPr/>
-        </p:nvPicPr>
-        <p:blipFill>
-          <a:blip r:embed="rId3"/>
-          <a:stretch>
-            <a:fillRect/>
-          </a:stretch>
-        </p:blipFill>
-        <p:spPr>
-          <a:xfrm>
-            <a:off x="4364990" y="1303655"/>
-            <a:ext cx="7518400" cy="2190750"/>
-          </a:xfrm>
-          <a:prstGeom prst="rect">
-            <a:avLst/>
-          </a:prstGeom>
-        </p:spPr>
-      </p:pic>
-    </p:spTree>
-  </p:cSld>
-  <p:clrMapOvr>
-    <a:masterClrMapping/>
-  </p:clrMapOvr>
-</p:sld>
-</file>
-
-<file path=ppt/slides/slide4.xml><?xml version="1.0" encoding="utf-8"?>
-<p:sld xmlns:a="http://schemas.openxmlformats.org/drawingml/2006/main" xmlns:r="http://schemas.openxmlformats.org/officeDocument/2006/relationships" xmlns:p="http://schemas.openxmlformats.org/presentationml/2006/main">
-  <p:cSld>
-    <p:spTree>
-      <p:nvGrpSpPr>
-        <p:cNvPr id="1" name=""/>
-        <p:cNvGrpSpPr/>
-        <p:nvPr/>
-      </p:nvGrpSpPr>
-      <p:grpSpPr>
-        <a:xfrm>
-          <a:off x="0" y="0"/>
-          <a:ext cx="0" cy="0"/>
-          <a:chOff x="0" y="0"/>
-          <a:chExt cx="0" cy="0"/>
-        </a:xfrm>
-      </p:grpSpPr>
-      <p:sp>
-        <p:nvSpPr>
-          <p:cNvPr id="2" name="内容占位符 1"/>
-          <p:cNvSpPr>
-            <a:spLocks noGrp="1"/>
-          </p:cNvSpPr>
-          <p:nvPr>
-            <p:ph idx="1"/>
-          </p:nvPr>
-        </p:nvSpPr>
-        <p:spPr>
-          <a:xfrm>
-            <a:off x="835307" y="1942707"/>
-            <a:ext cx="10521387" cy="3859816"/>
-          </a:xfrm>
-        </p:spPr>
-        <p:txBody>
-          <a:bodyPr>
-            <a:normAutofit/>
-          </a:bodyPr>
-          <a:lstStyle/>
-          <a:p>
-            <a:r>
-              <a:rPr lang="zh-CN" altLang="en-US" dirty="0"/>
-              <a:t>安全性</a:t>
-            </a:r>
-            <a:endParaRPr lang="zh-CN" altLang="en-US" dirty="0"/>
-          </a:p>
-          <a:p>
-            <a:pPr lvl="1"/>
-            <a:r>
-              <a:rPr lang="zh-CN" altLang="en-US" dirty="0"/>
-              <a:t>内存安全：所有权机制、借用规则</a:t>
-            </a:r>
-            <a:endParaRPr lang="zh-CN" altLang="en-US" dirty="0"/>
-          </a:p>
-          <a:p>
-            <a:pPr lvl="1"/>
-            <a:r>
-              <a:rPr lang="zh-CN" altLang="en-US" dirty="0"/>
-              <a:t>类型安全：基本不存在隐式的类型转换</a:t>
-            </a:r>
-            <a:endParaRPr lang="zh-CN" altLang="en-US" dirty="0"/>
-          </a:p>
-          <a:p>
-            <a:pPr lvl="1"/>
-            <a:r>
-              <a:rPr lang="zh-CN" altLang="en-US" dirty="0"/>
-              <a:t>并发安全：编译器就可以检测出存在的数据竞争</a:t>
-            </a:r>
-            <a:endParaRPr lang="zh-CN" altLang="en-US" dirty="0"/>
-          </a:p>
-          <a:p>
-            <a:pPr lvl="1"/>
-            <a:r>
-              <a:rPr lang="en-US" altLang="zh-CN" dirty="0"/>
-              <a:t>unsafe</a:t>
-            </a:r>
-            <a:r>
-              <a:rPr lang="zh-CN" altLang="en-US" dirty="0"/>
-              <a:t>块</a:t>
-            </a:r>
-            <a:endParaRPr lang="zh-CN" altLang="en-US" dirty="0"/>
-          </a:p>
-          <a:p>
-            <a:pPr marL="306070" lvl="0" indent="-306070">
-              <a:buFont typeface="Wingdings 2" panose="05020102010507070707" charset="0"/>
-              <a:buChar char=""/>
-            </a:pPr>
-            <a:r>
-              <a:rPr lang="zh-CN" altLang="en-US" dirty="0">
-                <a:solidFill>
-                  <a:schemeClr val="tx2"/>
-                </a:solidFill>
-              </a:rPr>
-              <a:t>高效性</a:t>
-            </a:r>
-            <a:endParaRPr lang="zh-CN" altLang="en-US" dirty="0">
-              <a:solidFill>
-                <a:schemeClr val="tx2"/>
-              </a:solidFill>
-            </a:endParaRPr>
-          </a:p>
-          <a:p>
-            <a:pPr marL="763270" lvl="1" indent="-306070">
-              <a:buFont typeface="Wingdings 2" panose="05020102010507070707" charset="0"/>
-              <a:buChar char=""/>
-            </a:pPr>
-            <a:r>
-              <a:rPr lang="zh-CN" altLang="en-US" dirty="0">
-                <a:solidFill>
-                  <a:schemeClr val="tx2"/>
-                </a:solidFill>
-              </a:rPr>
-              <a:t>没有</a:t>
-            </a:r>
-            <a:r>
-              <a:rPr lang="en-US" altLang="zh-CN" dirty="0">
-                <a:solidFill>
-                  <a:schemeClr val="tx2"/>
-                </a:solidFill>
-              </a:rPr>
-              <a:t>gc</a:t>
-            </a:r>
-            <a:endParaRPr lang="en-US" altLang="zh-CN" dirty="0">
-              <a:solidFill>
-                <a:schemeClr val="tx2"/>
-              </a:solidFill>
-            </a:endParaRPr>
-          </a:p>
-          <a:p>
-            <a:pPr marL="763270" lvl="1" indent="-306070">
-              <a:buFont typeface="Wingdings 2" panose="05020102010507070707" charset="0"/>
-              <a:buChar char=""/>
-            </a:pPr>
-            <a:r>
-              <a:rPr lang="en-US" altLang="zh-CN" dirty="0">
-                <a:solidFill>
-                  <a:schemeClr val="tx2"/>
-                </a:solidFill>
-              </a:rPr>
-              <a:t>benchmark </a:t>
-            </a:r>
-            <a:r>
-              <a:rPr lang="zh-CN" altLang="en-US" dirty="0">
-                <a:solidFill>
-                  <a:schemeClr val="tx2"/>
-                </a:solidFill>
-              </a:rPr>
-              <a:t>测试与</a:t>
-            </a:r>
-            <a:r>
-              <a:rPr lang="en-US" altLang="zh-CN" dirty="0">
-                <a:solidFill>
-                  <a:schemeClr val="tx2"/>
-                </a:solidFill>
-              </a:rPr>
-              <a:t>c</a:t>
-            </a:r>
-            <a:r>
-              <a:rPr lang="zh-CN" altLang="en-US" dirty="0">
-                <a:solidFill>
-                  <a:schemeClr val="tx2"/>
-                </a:solidFill>
-              </a:rPr>
-              <a:t>不相上下</a:t>
-            </a:r>
-            <a:endParaRPr lang="zh-CN" altLang="en-US" dirty="0">
-              <a:solidFill>
-                <a:schemeClr val="tx2"/>
-              </a:solidFill>
-            </a:endParaRPr>
-          </a:p>
-          <a:p>
-            <a:pPr marL="306070" lvl="0" indent="-306070">
-              <a:buFont typeface="Wingdings 2" panose="05020102010507070707" charset="0"/>
-              <a:buChar char=""/>
-            </a:pPr>
-            <a:r>
-              <a:rPr lang="zh-CN" altLang="en-US" dirty="0">
-                <a:solidFill>
-                  <a:schemeClr val="tx2"/>
-                </a:solidFill>
-              </a:rPr>
-              <a:t>方便的集成化工具链和包管理工具</a:t>
-            </a:r>
-            <a:endParaRPr lang="zh-CN" altLang="en-US" dirty="0">
-              <a:solidFill>
-                <a:schemeClr val="tx2"/>
-              </a:solidFill>
-            </a:endParaRPr>
-          </a:p>
-        </p:txBody>
-      </p:sp>
-      <p:sp>
-        <p:nvSpPr>
-          <p:cNvPr id="3" name="标题 2"/>
-          <p:cNvSpPr>
-            <a:spLocks noGrp="1"/>
-          </p:cNvSpPr>
-          <p:nvPr>
-            <p:ph type="title"/>
-          </p:nvPr>
-        </p:nvSpPr>
-        <p:spPr/>
-        <p:txBody>
-          <a:bodyPr/>
-          <a:lstStyle/>
-          <a:p>
-            <a:r>
-              <a:rPr kumimoji="1" lang="zh-CN" altLang="en-US" dirty="0"/>
-              <a:t>设计背景：</a:t>
-            </a:r>
-            <a:r>
-              <a:rPr kumimoji="1" lang="en-US" altLang="zh-CN" dirty="0"/>
-              <a:t>why rust</a:t>
-            </a:r>
-            <a:r>
-              <a:rPr kumimoji="1" lang="zh-CN" altLang="en-US" dirty="0"/>
-              <a:t>？</a:t>
-            </a:r>
-            <a:endParaRPr kumimoji="1" lang="zh-CN" altLang="en-US" dirty="0"/>
-          </a:p>
-        </p:txBody>
-      </p:sp>
-    </p:spTree>
-  </p:cSld>
-  <p:clrMapOvr>
-    <a:masterClrMapping/>
-  </p:clrMapOvr>
-</p:sld>
-</file>
-
-<file path=ppt/slides/slide5.xml><?xml version="1.0" encoding="utf-8"?>
-<p:sld xmlns:a="http://schemas.openxmlformats.org/drawingml/2006/main" xmlns:r="http://schemas.openxmlformats.org/officeDocument/2006/relationships" xmlns:p="http://schemas.openxmlformats.org/presentationml/2006/main">
-  <p:cSld>
-    <p:spTree>
-      <p:nvGrpSpPr>
-        <p:cNvPr id="1" name=""/>
-        <p:cNvGrpSpPr/>
-        <p:nvPr/>
-      </p:nvGrpSpPr>
-      <p:grpSpPr>
-        <a:xfrm>
-          <a:off x="0" y="0"/>
-          <a:ext cx="0" cy="0"/>
-          <a:chOff x="0" y="0"/>
-          <a:chExt cx="0" cy="0"/>
-        </a:xfrm>
-      </p:grpSpPr>
-      <p:sp>
-        <p:nvSpPr>
-          <p:cNvPr id="2" name="内容占位符 1"/>
-          <p:cNvSpPr>
-            <a:spLocks noGrp="1"/>
-          </p:cNvSpPr>
-          <p:nvPr>
-            <p:ph idx="1"/>
-          </p:nvPr>
-        </p:nvSpPr>
-        <p:spPr>
-          <a:xfrm>
-            <a:off x="833377" y="1638170"/>
-            <a:ext cx="10521387" cy="4569199"/>
-          </a:xfrm>
-        </p:spPr>
-        <p:txBody>
-          <a:bodyPr>
-            <a:normAutofit/>
-          </a:bodyPr>
-          <a:lstStyle/>
-          <a:p>
-            <a:r>
-              <a:rPr lang="zh-CN" altLang="en-US" dirty="0"/>
-              <a:t>陈云逸、李东阳、周宜辉：</a:t>
-            </a:r>
-            <a:endParaRPr lang="zh-CN" altLang="en-US" dirty="0"/>
-          </a:p>
-          <a:p>
-            <a:pPr lvl="1"/>
-            <a:r>
-              <a:rPr lang="en-US" altLang="zh-CN" dirty="0"/>
-              <a:t>R-</a:t>
-            </a:r>
-            <a:r>
-              <a:rPr lang="en-US" altLang="zh-CN" dirty="0" err="1"/>
-              <a:t>FreeRTOS</a:t>
-            </a:r>
-            <a:r>
-              <a:rPr lang="en-US" altLang="zh-CN" dirty="0"/>
-              <a:t>:</a:t>
-            </a:r>
-            <a:r>
-              <a:rPr lang="zh-CN" altLang="en-US" dirty="0"/>
-              <a:t>用</a:t>
-            </a:r>
-            <a:r>
-              <a:rPr lang="en-US" altLang="zh-CN" dirty="0"/>
-              <a:t>rust</a:t>
-            </a:r>
-            <a:r>
-              <a:rPr lang="zh-CN" altLang="en-US" dirty="0"/>
-              <a:t>语言重新实现了</a:t>
-            </a:r>
-            <a:r>
-              <a:rPr lang="en-US" altLang="zh-CN" dirty="0"/>
-              <a:t>FREERTOS</a:t>
-            </a:r>
-            <a:endParaRPr lang="en-US" altLang="zh-CN" dirty="0"/>
-          </a:p>
-          <a:p>
-            <a:pPr lvl="1"/>
-            <a:r>
-              <a:rPr lang="zh-CN" altLang="en-US" dirty="0"/>
-              <a:t>实现效果：实现了</a:t>
-            </a:r>
-            <a:r>
-              <a:rPr lang="en-US" altLang="zh-CN" dirty="0" err="1"/>
-              <a:t>FreeRTOS</a:t>
-            </a:r>
-            <a:r>
-              <a:rPr lang="zh-CN" altLang="en-US" dirty="0"/>
-              <a:t>的基本功能</a:t>
-            </a:r>
-            <a:r>
-              <a:rPr lang="en-US" altLang="zh-CN" dirty="0"/>
-              <a:t>,</a:t>
-            </a:r>
-            <a:r>
-              <a:rPr lang="zh-CN" altLang="en-US" dirty="0"/>
-              <a:t>并通过了</a:t>
-            </a:r>
-            <a:r>
-              <a:rPr lang="en-US" altLang="zh-CN" dirty="0" err="1"/>
-              <a:t>FreeRTOS</a:t>
-            </a:r>
-            <a:r>
-              <a:rPr lang="zh-CN" altLang="en-US" dirty="0"/>
-              <a:t>自带的测试。</a:t>
-            </a:r>
-            <a:endParaRPr lang="en-US" altLang="zh-CN" dirty="0"/>
-          </a:p>
-          <a:p>
-            <a:pPr lvl="1"/>
-            <a:r>
-              <a:rPr lang="zh-CN" altLang="en-US" dirty="0"/>
-              <a:t>代码可分为</a:t>
-            </a:r>
-            <a:r>
-              <a:rPr lang="en-US" altLang="zh-CN" dirty="0"/>
-              <a:t>kernel</a:t>
-            </a:r>
-            <a:r>
-              <a:rPr lang="zh-CN" altLang="en-US" dirty="0"/>
-              <a:t>、</a:t>
-            </a:r>
-            <a:r>
-              <a:rPr lang="en-US" altLang="zh-CN" dirty="0" err="1"/>
-              <a:t>ffi</a:t>
-            </a:r>
-            <a:r>
-              <a:rPr lang="zh-CN" altLang="en-US" dirty="0"/>
-              <a:t>、</a:t>
-            </a:r>
-            <a:r>
-              <a:rPr lang="en-US" altLang="zh-CN" dirty="0"/>
-              <a:t>test</a:t>
-            </a:r>
-            <a:r>
-              <a:rPr lang="zh-CN" altLang="en-US" dirty="0"/>
-              <a:t>、</a:t>
-            </a:r>
-            <a:r>
-              <a:rPr lang="en-US" altLang="zh-CN" dirty="0"/>
-              <a:t>portable</a:t>
-            </a:r>
-            <a:r>
-              <a:rPr lang="zh-CN" altLang="en-US" dirty="0"/>
-              <a:t>四个模块。</a:t>
-            </a:r>
-            <a:endParaRPr lang="en-US" altLang="zh-CN" dirty="0"/>
-          </a:p>
-          <a:p>
-            <a:r>
-              <a:rPr lang="en-US" altLang="zh-CN" dirty="0"/>
-              <a:t>kernel</a:t>
-            </a:r>
-            <a:r>
-              <a:rPr lang="zh-CN" altLang="en-US" dirty="0"/>
-              <a:t>模块：</a:t>
-            </a:r>
-            <a:endParaRPr lang="en-US" altLang="zh-CN" dirty="0"/>
-          </a:p>
-          <a:p>
-            <a:pPr lvl="1"/>
-            <a:r>
-              <a:rPr lang="en-US" altLang="zh-CN" dirty="0"/>
-              <a:t>Kernel</a:t>
-            </a:r>
-            <a:r>
-              <a:rPr lang="zh-CN" altLang="en-US" dirty="0"/>
-              <a:t>模块实现为</a:t>
-            </a:r>
-            <a:r>
-              <a:rPr lang="en-US" altLang="zh-CN" dirty="0" err="1"/>
-              <a:t>FreeRTOS</a:t>
-            </a:r>
-            <a:r>
-              <a:rPr lang="zh-CN" altLang="en-US" dirty="0"/>
-              <a:t>的内核，实现的功能有：</a:t>
-            </a:r>
-            <a:endParaRPr lang="en-US" altLang="zh-CN" dirty="0"/>
-          </a:p>
-          <a:p>
-            <a:pPr lvl="2"/>
-            <a:r>
-              <a:rPr lang="zh-CN" altLang="en-US" b="0" i="0" u="none" strike="noStrike" baseline="0" dirty="0">
-                <a:solidFill>
-                  <a:srgbClr val="333333"/>
-                </a:solidFill>
-                <a:latin typeface="黑体" panose="02010609060101010101" pitchFamily="49" charset="-122"/>
-                <a:ea typeface="黑体" panose="02010609060101010101" pitchFamily="49" charset="-122"/>
-              </a:rPr>
-              <a:t>任务调度，包括任务创建、删除、延迟、挂起与恢复、调度器挂起与恢复等；</a:t>
-            </a:r>
-            <a:endParaRPr lang="en-US" altLang="zh-CN" b="0" i="0" u="none" strike="noStrike" baseline="0" dirty="0">
-              <a:solidFill>
-                <a:srgbClr val="333333"/>
-              </a:solidFill>
-              <a:latin typeface="黑体" panose="02010609060101010101" pitchFamily="49" charset="-122"/>
-              <a:ea typeface="黑体" panose="02010609060101010101" pitchFamily="49" charset="-122"/>
-            </a:endParaRPr>
-          </a:p>
-          <a:p>
-            <a:pPr lvl="2"/>
-            <a:r>
-              <a:rPr lang="zh-CN" altLang="en-US" b="0" i="0" u="none" strike="noStrike" baseline="0" dirty="0">
-                <a:solidFill>
-                  <a:srgbClr val="333333"/>
-                </a:solidFill>
-                <a:latin typeface="黑体" panose="02010609060101010101" pitchFamily="49" charset="-122"/>
-                <a:ea typeface="黑体" panose="02010609060101010101" pitchFamily="49" charset="-122"/>
-              </a:rPr>
-              <a:t>消息队列与信号量，用于不同任务之间的通信。</a:t>
-            </a:r>
-            <a:endParaRPr lang="en-US" altLang="zh-CN" b="0" i="0" u="none" strike="noStrike" baseline="0" dirty="0">
-              <a:solidFill>
-                <a:srgbClr val="333333"/>
-              </a:solidFill>
-              <a:latin typeface="黑体" panose="02010609060101010101" pitchFamily="49" charset="-122"/>
-              <a:ea typeface="黑体" panose="02010609060101010101" pitchFamily="49" charset="-122"/>
-            </a:endParaRPr>
-          </a:p>
-          <a:p>
-            <a:pPr lvl="2"/>
-            <a:r>
-              <a:rPr lang="zh-CN" altLang="en-US" b="0" i="0" u="none" strike="noStrike" baseline="0" dirty="0">
-                <a:solidFill>
-                  <a:srgbClr val="333333"/>
-                </a:solidFill>
-                <a:latin typeface="黑体" panose="02010609060101010101" pitchFamily="49" charset="-122"/>
-                <a:ea typeface="黑体" panose="02010609060101010101" pitchFamily="49" charset="-122"/>
-              </a:rPr>
-              <a:t>基础事件组，不同任务间的同步。</a:t>
-            </a:r>
-            <a:endParaRPr lang="en-US" altLang="zh-CN" dirty="0"/>
-          </a:p>
-        </p:txBody>
-      </p:sp>
-      <p:sp>
-        <p:nvSpPr>
-          <p:cNvPr id="3" name="标题 2"/>
-          <p:cNvSpPr>
-            <a:spLocks noGrp="1"/>
-          </p:cNvSpPr>
-          <p:nvPr>
-            <p:ph type="title"/>
-          </p:nvPr>
-        </p:nvSpPr>
-        <p:spPr/>
-        <p:txBody>
-          <a:bodyPr/>
-          <a:lstStyle/>
-          <a:p>
-            <a:r>
-              <a:rPr lang="zh-CN" altLang="en-US" dirty="0"/>
-              <a:t>相关</a:t>
-            </a:r>
-            <a:r>
-              <a:rPr lang="zh-CN" altLang="en-US" dirty="0"/>
-              <a:t>工作：</a:t>
-            </a:r>
-            <a:r>
-              <a:rPr lang="en-US" altLang="zh-CN" dirty="0"/>
-              <a:t>R-</a:t>
-            </a:r>
-            <a:r>
-              <a:rPr lang="en-US" altLang="zh-CN" dirty="0" err="1"/>
-              <a:t>Freertos</a:t>
-            </a:r>
-            <a:endParaRPr lang="zh-CN" altLang="en-US" dirty="0"/>
-          </a:p>
-        </p:txBody>
-      </p:sp>
-      <p:pic>
-        <p:nvPicPr>
-          <p:cNvPr id="8" name="内容占位符 2"/>
-          <p:cNvPicPr>
-            <a:picLocks noChangeAspect="1"/>
-          </p:cNvPicPr>
-          <p:nvPr/>
-        </p:nvPicPr>
-        <p:blipFill>
-          <a:blip r:embed="rId1"/>
-          <a:stretch>
-            <a:fillRect/>
-          </a:stretch>
-        </p:blipFill>
-        <p:spPr>
-          <a:xfrm>
-            <a:off x="8297591" y="1782600"/>
-            <a:ext cx="2720285" cy="3292799"/>
-          </a:xfrm>
-          <a:prstGeom prst="rect">
-            <a:avLst/>
-          </a:prstGeom>
-        </p:spPr>
-      </p:pic>
-    </p:spTree>
-  </p:cSld>
-  <p:clrMapOvr>
-    <a:masterClrMapping/>
-  </p:clrMapOvr>
-</p:sld>
-</file>
-
-<file path=ppt/slides/slide6.xml><?xml version="1.0" encoding="utf-8"?>
-<p:sld xmlns:a="http://schemas.openxmlformats.org/drawingml/2006/main" xmlns:r="http://schemas.openxmlformats.org/officeDocument/2006/relationships" xmlns:p="http://schemas.openxmlformats.org/presentationml/2006/main">
-  <p:cSld>
-    <p:spTree>
-      <p:nvGrpSpPr>
-        <p:cNvPr id="1" name=""/>
-        <p:cNvGrpSpPr/>
-        <p:nvPr/>
-      </p:nvGrpSpPr>
-      <p:grpSpPr>
-        <a:xfrm>
-          <a:off x="0" y="0"/>
-          <a:ext cx="0" cy="0"/>
-          <a:chOff x="0" y="0"/>
-          <a:chExt cx="0" cy="0"/>
-        </a:xfrm>
-      </p:grpSpPr>
-      <p:sp>
-        <p:nvSpPr>
-          <p:cNvPr id="2" name="内容占位符 1"/>
-          <p:cNvSpPr>
-            <a:spLocks noGrp="1"/>
-          </p:cNvSpPr>
-          <p:nvPr>
-            <p:ph idx="1"/>
-          </p:nvPr>
-        </p:nvSpPr>
-        <p:spPr>
-          <a:xfrm>
-            <a:off x="833377" y="1638170"/>
-            <a:ext cx="10521387" cy="4569199"/>
-          </a:xfrm>
-        </p:spPr>
-        <p:txBody>
-          <a:bodyPr>
-            <a:normAutofit/>
-          </a:bodyPr>
-          <a:lstStyle/>
-          <a:p>
-            <a:pPr algn="l"/>
-            <a:r>
-              <a:rPr lang="en-US" altLang="zh-CN" dirty="0"/>
-              <a:t>Portable</a:t>
-            </a:r>
-            <a:r>
-              <a:rPr lang="zh-CN" altLang="en-US" dirty="0"/>
-              <a:t>模块：用于与硬件的交互，主要设置</a:t>
-            </a:r>
-            <a:r>
-              <a:rPr lang="zh-CN" altLang="en-US" sz="1800" b="0" i="0" u="none" strike="noStrike" baseline="0" dirty="0">
-                <a:solidFill>
-                  <a:srgbClr val="333333"/>
-                </a:solidFill>
-                <a:latin typeface="黑体" panose="02010609060101010101" pitchFamily="49" charset="-122"/>
-                <a:ea typeface="黑体" panose="02010609060101010101" pitchFamily="49" charset="-122"/>
-              </a:rPr>
-              <a:t>时钟中断、调度器启动流程、串口交互等。</a:t>
-            </a:r>
-            <a:endParaRPr lang="en-US" altLang="zh-CN" sz="1800" b="0" i="0" u="none" strike="noStrike" baseline="0" dirty="0">
-              <a:solidFill>
-                <a:srgbClr val="333333"/>
-              </a:solidFill>
-              <a:latin typeface="黑体" panose="02010609060101010101" pitchFamily="49" charset="-122"/>
-              <a:ea typeface="黑体" panose="02010609060101010101" pitchFamily="49" charset="-122"/>
-            </a:endParaRPr>
-          </a:p>
-          <a:p>
-            <a:pPr algn="l"/>
-            <a:r>
-              <a:rPr lang="en-US" altLang="zh-CN" dirty="0" err="1"/>
-              <a:t>Ffi</a:t>
-            </a:r>
-            <a:r>
-              <a:rPr lang="zh-CN" altLang="en-US" dirty="0"/>
-              <a:t>模块：用于与</a:t>
-            </a:r>
-            <a:r>
-              <a:rPr lang="en-US" altLang="zh-CN" dirty="0"/>
-              <a:t>C </a:t>
-            </a:r>
-            <a:r>
-              <a:rPr lang="zh-CN" altLang="en-US" dirty="0"/>
-              <a:t>代码进行交互，提供了</a:t>
-            </a:r>
-            <a:r>
-              <a:rPr lang="en-US" altLang="zh-CN" dirty="0"/>
-              <a:t>C </a:t>
-            </a:r>
-            <a:r>
-              <a:rPr lang="zh-CN" altLang="en-US" dirty="0"/>
-              <a:t>可用的部分接口。</a:t>
-            </a:r>
-            <a:endParaRPr lang="en-US" altLang="zh-CN" dirty="0"/>
-          </a:p>
-          <a:p>
-            <a:pPr algn="l"/>
-            <a:endParaRPr lang="en-US" altLang="zh-CN" dirty="0"/>
-          </a:p>
-          <a:p>
-            <a:pPr algn="l"/>
-            <a:endParaRPr lang="en-US" altLang="zh-CN" dirty="0"/>
-          </a:p>
-          <a:p>
-            <a:pPr algn="l"/>
-            <a:endParaRPr lang="en-US" altLang="zh-CN" dirty="0"/>
-          </a:p>
-          <a:p>
-            <a:pPr algn="l"/>
-            <a:endParaRPr lang="en-US" altLang="zh-CN" dirty="0"/>
-          </a:p>
-          <a:p>
-            <a:pPr algn="l"/>
-            <a:endParaRPr lang="en-US" altLang="zh-CN" dirty="0"/>
-          </a:p>
-          <a:p>
-            <a:pPr algn="l"/>
-            <a:endParaRPr lang="en-US" altLang="zh-CN" dirty="0"/>
-          </a:p>
-          <a:p>
-            <a:pPr algn="l"/>
-            <a:r>
-              <a:rPr lang="en-US" altLang="zh-CN" dirty="0"/>
-              <a:t>Test</a:t>
-            </a:r>
-            <a:r>
-              <a:rPr lang="zh-CN" altLang="en-US" dirty="0"/>
-              <a:t>模块：原版</a:t>
-            </a:r>
-            <a:r>
-              <a:rPr lang="en-US" altLang="zh-CN" dirty="0" err="1"/>
-              <a:t>FreeRTOS</a:t>
-            </a:r>
-            <a:r>
-              <a:rPr lang="zh-CN" altLang="en-US" dirty="0"/>
-              <a:t>提供的</a:t>
-            </a:r>
-            <a:r>
-              <a:rPr lang="en-US" altLang="zh-CN" dirty="0"/>
-              <a:t>c</a:t>
-            </a:r>
-            <a:r>
-              <a:rPr lang="zh-CN" altLang="en-US" dirty="0"/>
-              <a:t>测例，通过</a:t>
-            </a:r>
-            <a:r>
-              <a:rPr lang="en-US" altLang="zh-CN" dirty="0"/>
-              <a:t>rust-cc</a:t>
-            </a:r>
-            <a:r>
-              <a:rPr lang="zh-CN" altLang="en-US" dirty="0"/>
-              <a:t>库可实现</a:t>
-            </a:r>
-            <a:r>
-              <a:rPr lang="en-US" altLang="zh-CN" dirty="0"/>
-              <a:t>c</a:t>
-            </a:r>
-            <a:r>
-              <a:rPr lang="zh-CN" altLang="en-US" dirty="0"/>
-              <a:t>代码与</a:t>
-            </a:r>
-            <a:r>
-              <a:rPr lang="en-US" altLang="zh-CN" dirty="0"/>
-              <a:t>rust</a:t>
-            </a:r>
-            <a:r>
-              <a:rPr lang="zh-CN" altLang="en-US" dirty="0"/>
-              <a:t>代码一起编译，再将测试函数写入一个单独的线程，让</a:t>
-            </a:r>
-            <a:r>
-              <a:rPr lang="en-US" altLang="zh-CN" dirty="0" err="1"/>
-              <a:t>freertos</a:t>
-            </a:r>
-            <a:r>
-              <a:rPr lang="zh-CN" altLang="en-US" dirty="0"/>
-              <a:t>运行即可开始测试。</a:t>
-            </a:r>
-            <a:endParaRPr lang="en-US" altLang="zh-CN" dirty="0"/>
-          </a:p>
-          <a:p>
-            <a:pPr algn="l"/>
-            <a:endParaRPr lang="en-US" altLang="zh-CN" dirty="0"/>
-          </a:p>
-          <a:p>
-            <a:pPr algn="l"/>
-            <a:endParaRPr lang="en-US" altLang="zh-CN" dirty="0"/>
-          </a:p>
-          <a:p>
-            <a:pPr algn="l"/>
-            <a:endParaRPr lang="en-US" altLang="zh-CN" dirty="0"/>
-          </a:p>
-          <a:p>
-            <a:pPr algn="l"/>
-            <a:endParaRPr lang="en-US" altLang="zh-CN" dirty="0"/>
-          </a:p>
-          <a:p>
-            <a:pPr algn="l"/>
-            <a:endParaRPr lang="en-US" altLang="zh-CN" dirty="0"/>
-          </a:p>
-          <a:p>
-            <a:pPr algn="l"/>
-            <a:endParaRPr lang="en-US" altLang="zh-CN" dirty="0"/>
-          </a:p>
-          <a:p>
-            <a:pPr algn="l"/>
-            <a:endParaRPr lang="en-US" altLang="zh-CN" dirty="0"/>
-          </a:p>
-          <a:p>
-            <a:pPr algn="l"/>
-            <a:endParaRPr lang="en-US" altLang="zh-CN" dirty="0"/>
-          </a:p>
-          <a:p>
-            <a:pPr algn="l"/>
-            <a:endParaRPr lang="en-US" altLang="zh-CN" dirty="0"/>
-          </a:p>
-          <a:p>
-            <a:pPr algn="l"/>
-            <a:endParaRPr lang="en-US" altLang="zh-CN" dirty="0"/>
-          </a:p>
-          <a:p>
-            <a:pPr algn="l"/>
-            <a:endParaRPr lang="en-US" altLang="zh-CN" dirty="0"/>
-          </a:p>
-          <a:p>
-            <a:pPr algn="l"/>
-            <a:endParaRPr lang="en-US" altLang="zh-CN" dirty="0"/>
-          </a:p>
-          <a:p>
-            <a:pPr algn="l"/>
-            <a:endParaRPr lang="en-US" altLang="zh-CN" dirty="0"/>
-          </a:p>
-          <a:p>
-            <a:pPr algn="l"/>
-            <a:endParaRPr lang="en-US" altLang="zh-CN" dirty="0"/>
-          </a:p>
-          <a:p>
-            <a:pPr marL="0" indent="0" algn="l">
-              <a:buNone/>
-            </a:pPr>
-            <a:endParaRPr lang="en-US" altLang="zh-CN" dirty="0"/>
-          </a:p>
-          <a:p>
-            <a:pPr marL="0" indent="0" algn="l">
-              <a:buNone/>
-            </a:pPr>
-            <a:endParaRPr lang="en-US" altLang="zh-CN" dirty="0"/>
-          </a:p>
-          <a:p>
-            <a:pPr algn="l"/>
-            <a:endParaRPr lang="en-US" altLang="zh-CN" dirty="0"/>
-          </a:p>
-        </p:txBody>
-      </p:sp>
-      <p:sp>
-        <p:nvSpPr>
-          <p:cNvPr id="3" name="标题 2"/>
-          <p:cNvSpPr>
-            <a:spLocks noGrp="1"/>
-          </p:cNvSpPr>
-          <p:nvPr>
-            <p:ph type="title"/>
-          </p:nvPr>
-        </p:nvSpPr>
-        <p:spPr/>
-        <p:txBody>
-          <a:bodyPr/>
-          <a:lstStyle/>
-          <a:p>
-            <a:r>
-              <a:rPr lang="zh-CN" altLang="en-US" dirty="0"/>
-              <a:t>相关</a:t>
-            </a:r>
-            <a:r>
-              <a:rPr lang="zh-CN" altLang="en-US" dirty="0"/>
-              <a:t>工作：</a:t>
-            </a:r>
-            <a:r>
-              <a:rPr lang="en-US" altLang="zh-CN" dirty="0"/>
-              <a:t>R-</a:t>
-            </a:r>
-            <a:r>
-              <a:rPr lang="en-US" altLang="zh-CN" dirty="0" err="1"/>
-              <a:t>FreeRTOs</a:t>
-            </a:r>
-            <a:endParaRPr lang="zh-CN" altLang="en-US" dirty="0"/>
-          </a:p>
-        </p:txBody>
-      </p:sp>
-      <p:pic>
-        <p:nvPicPr>
-          <p:cNvPr id="4" name="图片 3"/>
-          <p:cNvPicPr>
-            <a:picLocks noChangeAspect="1"/>
-          </p:cNvPicPr>
-          <p:nvPr/>
-        </p:nvPicPr>
-        <p:blipFill>
-          <a:blip r:embed="rId1"/>
-          <a:stretch>
-            <a:fillRect/>
-          </a:stretch>
-        </p:blipFill>
-        <p:spPr>
-          <a:xfrm>
-            <a:off x="1272540" y="2384425"/>
-            <a:ext cx="5424170" cy="2478405"/>
-          </a:xfrm>
-          <a:prstGeom prst="rect">
-            <a:avLst/>
-          </a:prstGeom>
-        </p:spPr>
-      </p:pic>
-    </p:spTree>
-  </p:cSld>
-  <p:clrMapOvr>
-    <a:masterClrMapping/>
-  </p:clrMapOvr>
-</p:sld>
-</file>
-
-<file path=ppt/slides/slide7.xml><?xml version="1.0" encoding="utf-8"?>
-<p:sld xmlns:a="http://schemas.openxmlformats.org/drawingml/2006/main" xmlns:r="http://schemas.openxmlformats.org/officeDocument/2006/relationships" xmlns:p="http://schemas.openxmlformats.org/presentationml/2006/main">
-  <p:cSld>
-    <p:spTree>
-      <p:nvGrpSpPr>
-        <p:cNvPr id="1" name=""/>
-        <p:cNvGrpSpPr/>
-        <p:nvPr/>
-      </p:nvGrpSpPr>
-      <p:grpSpPr>
-        <a:xfrm>
-          <a:off x="0" y="0"/>
-          <a:ext cx="0" cy="0"/>
-          <a:chOff x="0" y="0"/>
-          <a:chExt cx="0" cy="0"/>
-        </a:xfrm>
-      </p:grpSpPr>
-      <p:sp>
-        <p:nvSpPr>
-          <p:cNvPr id="2" name="内容占位符 1"/>
-          <p:cNvSpPr>
-            <a:spLocks noGrp="1"/>
-          </p:cNvSpPr>
-          <p:nvPr>
-            <p:ph idx="1"/>
-          </p:nvPr>
-        </p:nvSpPr>
-        <p:spPr>
-          <a:xfrm>
-            <a:off x="833377" y="1542994"/>
-            <a:ext cx="10521387" cy="3678303"/>
-          </a:xfrm>
-        </p:spPr>
-        <p:txBody>
-          <a:bodyPr>
-            <a:normAutofit/>
-          </a:bodyPr>
-          <a:lstStyle/>
-          <a:p>
-            <a:pPr marL="323850" lvl="1" indent="0">
-              <a:buNone/>
-            </a:pPr>
-            <a:endParaRPr kumimoji="1" lang="en-US" altLang="zh-CN" dirty="0"/>
-          </a:p>
-          <a:p>
-            <a:pPr lvl="1"/>
-            <a:r>
-              <a:rPr kumimoji="1" lang="zh-CN" altLang="en-US" dirty="0"/>
-              <a:t>将</a:t>
-            </a:r>
-            <a:r>
-              <a:rPr kumimoji="1" lang="en-US" altLang="zh-CN" dirty="0"/>
-              <a:t>sel4</a:t>
-            </a:r>
-            <a:r>
-              <a:rPr kumimoji="1" lang="zh-CN" altLang="en-US" dirty="0"/>
-              <a:t>用</a:t>
-            </a:r>
-            <a:r>
-              <a:rPr kumimoji="1" lang="en-US" altLang="zh-CN" dirty="0"/>
-              <a:t>rust</a:t>
-            </a:r>
-            <a:r>
-              <a:rPr kumimoji="1" lang="zh-CN" altLang="en-US" dirty="0"/>
-              <a:t>语言重新实现，能够在</a:t>
-            </a:r>
-            <a:r>
-              <a:rPr kumimoji="1" lang="en-US" altLang="zh-CN" dirty="0"/>
-              <a:t>qemu</a:t>
-            </a:r>
-            <a:r>
-              <a:rPr kumimoji="1" lang="zh-CN" altLang="en-US" dirty="0"/>
-              <a:t>模拟的</a:t>
-            </a:r>
-            <a:r>
-              <a:rPr kumimoji="1" lang="en-US" altLang="zh-CN" dirty="0"/>
-              <a:t>riscv</a:t>
-            </a:r>
-            <a:r>
-              <a:rPr kumimoji="1" lang="zh-CN" altLang="en-US" dirty="0"/>
-              <a:t>架构</a:t>
-            </a:r>
-            <a:r>
-              <a:rPr kumimoji="1" lang="en-US" altLang="zh-CN" dirty="0"/>
-              <a:t>cpu</a:t>
-            </a:r>
-            <a:r>
-              <a:rPr kumimoji="1" lang="zh-CN" altLang="en-US" dirty="0"/>
-              <a:t>上成功运行</a:t>
-            </a:r>
-            <a:endParaRPr kumimoji="1" lang="zh-CN" altLang="en-US" dirty="0"/>
-          </a:p>
-          <a:p>
-            <a:pPr lvl="1"/>
-            <a:r>
-              <a:rPr kumimoji="1" lang="zh-CN" altLang="en-US" dirty="0"/>
-              <a:t>实现</a:t>
-            </a:r>
-            <a:r>
-              <a:rPr kumimoji="1" lang="en-US" altLang="zh-CN" dirty="0"/>
-              <a:t>sel4</a:t>
-            </a:r>
-            <a:r>
-              <a:rPr kumimoji="1" lang="zh-CN" altLang="en-US" dirty="0"/>
-              <a:t>对上层应用的支持</a:t>
-            </a:r>
-            <a:endParaRPr kumimoji="1" lang="zh-CN" altLang="en-US" dirty="0"/>
-          </a:p>
-        </p:txBody>
-      </p:sp>
-      <p:sp>
-        <p:nvSpPr>
-          <p:cNvPr id="3" name="标题 2"/>
-          <p:cNvSpPr>
-            <a:spLocks noGrp="1"/>
-          </p:cNvSpPr>
-          <p:nvPr>
-            <p:ph type="title"/>
-          </p:nvPr>
-        </p:nvSpPr>
-        <p:spPr/>
-        <p:txBody>
-          <a:bodyPr/>
-          <a:lstStyle/>
-          <a:p>
-            <a:r>
-              <a:rPr kumimoji="1" lang="zh-CN" altLang="en-US" dirty="0"/>
-              <a:t>设计任务：</a:t>
-            </a:r>
-            <a:r>
-              <a:rPr kumimoji="1" lang="en-US" altLang="zh-CN" dirty="0"/>
-              <a:t>rust</a:t>
-            </a:r>
-            <a:r>
-              <a:rPr kumimoji="1" lang="zh-CN" altLang="en-US" dirty="0"/>
-              <a:t>语言实现</a:t>
-            </a:r>
-            <a:r>
-              <a:rPr kumimoji="1" lang="en-US" altLang="zh-CN" dirty="0"/>
-              <a:t>sel4</a:t>
-            </a:r>
-            <a:endParaRPr kumimoji="1" lang="en-US" altLang="zh-CN" dirty="0"/>
-          </a:p>
-        </p:txBody>
-      </p:sp>
-      <p:pic>
-        <p:nvPicPr>
-          <p:cNvPr id="5" name="图片 4"/>
-          <p:cNvPicPr>
-            <a:picLocks noChangeAspect="1"/>
-          </p:cNvPicPr>
-          <p:nvPr/>
-        </p:nvPicPr>
-        <p:blipFill>
-          <a:blip r:embed="rId1"/>
-          <a:stretch>
-            <a:fillRect/>
-          </a:stretch>
-        </p:blipFill>
-        <p:spPr>
-          <a:xfrm>
-            <a:off x="1203716" y="2920303"/>
-            <a:ext cx="3911801" cy="2756042"/>
-          </a:xfrm>
-          <a:prstGeom prst="rect">
-            <a:avLst/>
-          </a:prstGeom>
-        </p:spPr>
-      </p:pic>
-      <p:sp>
-        <p:nvSpPr>
-          <p:cNvPr id="8" name="箭头: 右 7"/>
-          <p:cNvSpPr/>
-          <p:nvPr/>
-        </p:nvSpPr>
-        <p:spPr>
-          <a:xfrm>
-            <a:off x="4523160" y="3844343"/>
-            <a:ext cx="1925391" cy="321971"/>
-          </a:xfrm>
-          <a:prstGeom prst="rightArrow">
-            <a:avLst/>
-          </a:prstGeom>
-        </p:spPr>
-        <p:style>
-          <a:lnRef idx="2">
-            <a:schemeClr val="accent3">
-              <a:shade val="50000"/>
-            </a:schemeClr>
-          </a:lnRef>
-          <a:fillRef idx="1">
-            <a:schemeClr val="accent3"/>
-          </a:fillRef>
-          <a:effectRef idx="0">
-            <a:schemeClr val="accent3"/>
-          </a:effectRef>
-          <a:fontRef idx="minor">
-            <a:schemeClr val="lt1"/>
-          </a:fontRef>
-        </p:style>
-        <p:txBody>
-          <a:bodyPr rtlCol="0" anchor="ctr"/>
-          <a:lstStyle/>
-          <a:p>
-            <a:pPr algn="ctr"/>
-            <a:endParaRPr lang="zh-CN" altLang="en-US"/>
-          </a:p>
-        </p:txBody>
-      </p:sp>
-      <p:pic>
-        <p:nvPicPr>
-          <p:cNvPr id="10" name="图片 9"/>
-          <p:cNvPicPr>
-            <a:picLocks noChangeAspect="1"/>
-          </p:cNvPicPr>
-          <p:nvPr/>
-        </p:nvPicPr>
-        <p:blipFill>
-          <a:blip r:embed="rId2"/>
-          <a:stretch>
-            <a:fillRect/>
-          </a:stretch>
-        </p:blipFill>
-        <p:spPr>
-          <a:xfrm>
-            <a:off x="6545808" y="2755073"/>
-            <a:ext cx="3994355" cy="2609984"/>
-          </a:xfrm>
-          <a:prstGeom prst="rect">
-            <a:avLst/>
-          </a:prstGeom>
-        </p:spPr>
-      </p:pic>
-    </p:spTree>
-  </p:cSld>
-  <p:clrMapOvr>
-    <a:masterClrMapping/>
-  </p:clrMapOvr>
-</p:sld>
-</file>
-
-<file path=ppt/slides/slide8.xml><?xml version="1.0" encoding="utf-8"?>
-<p:sld xmlns:a="http://schemas.openxmlformats.org/drawingml/2006/main" xmlns:r="http://schemas.openxmlformats.org/officeDocument/2006/relationships" xmlns:p="http://schemas.openxmlformats.org/presentationml/2006/main">
-  <p:cSld>
-    <p:spTree>
-      <p:nvGrpSpPr>
-        <p:cNvPr id="1" name=""/>
-        <p:cNvGrpSpPr/>
-        <p:nvPr/>
-      </p:nvGrpSpPr>
-      <p:grpSpPr>
-        <a:xfrm>
-          <a:off x="0" y="0"/>
-          <a:ext cx="0" cy="0"/>
-          <a:chOff x="0" y="0"/>
-          <a:chExt cx="0" cy="0"/>
-        </a:xfrm>
-      </p:grpSpPr>
-      <p:sp>
-        <p:nvSpPr>
-          <p:cNvPr id="2" name="内容占位符 1"/>
-          <p:cNvSpPr>
-            <a:spLocks noGrp="1"/>
-          </p:cNvSpPr>
-          <p:nvPr>
-            <p:ph idx="1"/>
-          </p:nvPr>
-        </p:nvSpPr>
-        <p:spPr>
-          <a:xfrm>
-            <a:off x="833377" y="1542994"/>
-            <a:ext cx="10521387" cy="3678303"/>
-          </a:xfrm>
-        </p:spPr>
-        <p:txBody>
-          <a:bodyPr>
-            <a:normAutofit/>
-          </a:bodyPr>
-          <a:lstStyle/>
-          <a:p>
-            <a:pPr marL="323850" lvl="1" indent="0">
-              <a:buNone/>
-            </a:pPr>
-            <a:endParaRPr kumimoji="1" lang="en-US" altLang="zh-CN" dirty="0"/>
-          </a:p>
-          <a:p>
-            <a:pPr lvl="1"/>
-            <a:r>
-              <a:rPr kumimoji="1" lang="en-US" altLang="zh-CN" dirty="0" err="1"/>
-              <a:t>Elfloader</a:t>
-            </a:r>
-            <a:r>
-              <a:rPr kumimoji="1" lang="zh-CN" altLang="en-US" dirty="0"/>
-              <a:t>为加载内核的工具，在启动时，先将</a:t>
-            </a:r>
-            <a:r>
-              <a:rPr kumimoji="1" lang="en-US" altLang="zh-CN" dirty="0" err="1"/>
-              <a:t>elfloader</a:t>
-            </a:r>
-            <a:r>
-              <a:rPr kumimoji="1" lang="zh-CN" altLang="en-US" dirty="0"/>
-              <a:t>作为内核运行，它会将真正的内核以及运行在用户态的测试程序加载进来。</a:t>
-            </a:r>
-            <a:endParaRPr kumimoji="1" lang="en-US" altLang="zh-CN" dirty="0"/>
-          </a:p>
-          <a:p>
-            <a:pPr lvl="1"/>
-            <a:r>
-              <a:rPr kumimoji="1" lang="zh-CN" altLang="en-US" dirty="0"/>
-              <a:t>检查内存文件是否合规、内存大小是否充足</a:t>
-            </a:r>
-            <a:endParaRPr kumimoji="1" lang="en-US" altLang="zh-CN" dirty="0"/>
-          </a:p>
-          <a:p>
-            <a:pPr lvl="1"/>
-            <a:r>
-              <a:rPr kumimoji="1" lang="zh-CN" altLang="en-US" dirty="0"/>
-              <a:t>建立简单的页表</a:t>
-            </a:r>
-            <a:endParaRPr kumimoji="1" lang="en-US" altLang="zh-CN" dirty="0"/>
-          </a:p>
-          <a:p>
-            <a:pPr lvl="1"/>
-            <a:r>
-              <a:rPr kumimoji="1" lang="zh-CN" altLang="en-US" dirty="0"/>
-              <a:t>跳转至</a:t>
-            </a:r>
-            <a:r>
-              <a:rPr kumimoji="1" lang="en-US" altLang="zh-CN" dirty="0"/>
-              <a:t>kernel</a:t>
-            </a:r>
-            <a:r>
-              <a:rPr kumimoji="1" lang="zh-CN" altLang="en-US" dirty="0"/>
-              <a:t>运行</a:t>
-            </a:r>
-            <a:endParaRPr kumimoji="1" lang="zh-CN" altLang="en-US" dirty="0"/>
-          </a:p>
-        </p:txBody>
-      </p:sp>
-      <p:sp>
-        <p:nvSpPr>
-          <p:cNvPr id="3" name="标题 2"/>
-          <p:cNvSpPr>
-            <a:spLocks noGrp="1"/>
-          </p:cNvSpPr>
-          <p:nvPr>
-            <p:ph type="title"/>
-          </p:nvPr>
-        </p:nvSpPr>
-        <p:spPr/>
-        <p:txBody>
-          <a:bodyPr/>
-          <a:lstStyle/>
-          <a:p>
-            <a:r>
-              <a:rPr kumimoji="1" lang="zh-CN" altLang="en-US" dirty="0"/>
-              <a:t>设计任务：</a:t>
-            </a:r>
-            <a:r>
-              <a:rPr kumimoji="1" lang="en-US" altLang="zh-CN" dirty="0" err="1"/>
-              <a:t>elfloader</a:t>
-            </a:r>
-            <a:endParaRPr kumimoji="1" lang="zh-CN" altLang="en-US" dirty="0"/>
-          </a:p>
-        </p:txBody>
-      </p:sp>
-      <p:pic>
-        <p:nvPicPr>
-          <p:cNvPr id="6" name="图片 5"/>
-          <p:cNvPicPr>
-            <a:picLocks noChangeAspect="1"/>
-          </p:cNvPicPr>
-          <p:nvPr/>
-        </p:nvPicPr>
-        <p:blipFill>
-          <a:blip r:embed="rId1"/>
-          <a:stretch>
-            <a:fillRect/>
-          </a:stretch>
-        </p:blipFill>
-        <p:spPr>
-          <a:xfrm>
-            <a:off x="6403015" y="2654072"/>
-            <a:ext cx="4292821" cy="2444876"/>
-          </a:xfrm>
-          <a:prstGeom prst="rect">
-            <a:avLst/>
-          </a:prstGeom>
-        </p:spPr>
-      </p:pic>
-    </p:spTree>
-  </p:cSld>
-  <p:clrMapOvr>
-    <a:masterClrMapping/>
-  </p:clrMapOvr>
-</p:sld>
-</file>
-
-<file path=ppt/slides/slide9.xml><?xml version="1.0" encoding="utf-8"?>
-<p:sld xmlns:a="http://schemas.openxmlformats.org/drawingml/2006/main" xmlns:r="http://schemas.openxmlformats.org/officeDocument/2006/relationships" xmlns:p="http://schemas.openxmlformats.org/presentationml/2006/main">
-  <p:cSld>
-    <p:spTree>
-      <p:nvGrpSpPr>
-        <p:cNvPr id="1" name=""/>
-        <p:cNvGrpSpPr/>
-        <p:nvPr/>
-      </p:nvGrpSpPr>
-      <p:grpSpPr>
-        <a:xfrm>
-          <a:off x="0" y="0"/>
-          <a:ext cx="0" cy="0"/>
-          <a:chOff x="0" y="0"/>
-          <a:chExt cx="0" cy="0"/>
-        </a:xfrm>
-      </p:grpSpPr>
-      <p:sp>
-        <p:nvSpPr>
-          <p:cNvPr id="2" name="内容占位符 1"/>
-          <p:cNvSpPr>
-            <a:spLocks noGrp="1"/>
-          </p:cNvSpPr>
-          <p:nvPr>
-            <p:ph idx="1"/>
-          </p:nvPr>
-        </p:nvSpPr>
-        <p:spPr>
-          <a:xfrm>
-            <a:off x="833377" y="1542994"/>
-            <a:ext cx="10521387" cy="3678303"/>
-          </a:xfrm>
-        </p:spPr>
-        <p:txBody>
-          <a:bodyPr>
-            <a:normAutofit/>
-          </a:bodyPr>
-          <a:lstStyle/>
-          <a:p>
-            <a:pPr marL="323850" lvl="1" indent="0">
-              <a:buNone/>
-            </a:pPr>
-            <a:endParaRPr kumimoji="1" lang="en-US" altLang="zh-CN" dirty="0"/>
-          </a:p>
-          <a:p>
-            <a:pPr lvl="1"/>
-            <a:endParaRPr kumimoji="1" lang="en-US" altLang="zh-CN" dirty="0"/>
-          </a:p>
-        </p:txBody>
-      </p:sp>
-      <p:sp>
-        <p:nvSpPr>
-          <p:cNvPr id="3" name="标题 2"/>
-          <p:cNvSpPr>
-            <a:spLocks noGrp="1"/>
-          </p:cNvSpPr>
-          <p:nvPr>
-            <p:ph type="title"/>
-          </p:nvPr>
-        </p:nvSpPr>
-        <p:spPr/>
-        <p:txBody>
-          <a:bodyPr/>
-          <a:lstStyle/>
-          <a:p>
-            <a:r>
-              <a:rPr kumimoji="1" lang="zh-CN" altLang="en-US" dirty="0"/>
-              <a:t>设计任务：</a:t>
-            </a:r>
-            <a:r>
-              <a:rPr kumimoji="1" lang="en-US" altLang="zh-CN" dirty="0"/>
-              <a:t>kernel</a:t>
-            </a:r>
-            <a:endParaRPr kumimoji="1" lang="zh-CN" altLang="en-US" dirty="0"/>
-          </a:p>
-        </p:txBody>
-      </p:sp>
-      <p:sp>
-        <p:nvSpPr>
-          <p:cNvPr id="5" name="内容占位符 1"/>
-          <p:cNvSpPr txBox="1"/>
-          <p:nvPr/>
-        </p:nvSpPr>
-        <p:spPr>
-          <a:xfrm>
-            <a:off x="985777" y="1695394"/>
-            <a:ext cx="10521387" cy="4114710"/>
-          </a:xfrm>
-          <a:prstGeom prst="rect">
-            <a:avLst/>
-          </a:prstGeom>
-        </p:spPr>
-        <p:txBody>
-          <a:bodyPr vert="horz" lIns="91440" tIns="45720" rIns="91440" bIns="45720" rtlCol="0" anchor="t">
-            <a:normAutofit/>
-          </a:bodyPr>
-          <a:lstStyle>
-            <a:lvl1pPr marL="306070" indent="-306070" algn="l" defTabSz="457200" rtl="0" eaLnBrk="1" latinLnBrk="0" hangingPunct="1">
-              <a:spcBef>
-                <a:spcPct val="20000"/>
-              </a:spcBef>
-              <a:spcAft>
-                <a:spcPts val="600"/>
-              </a:spcAft>
-              <a:buClr>
-                <a:schemeClr val="accent2"/>
-              </a:buClr>
-              <a:buSzPct val="92000"/>
-              <a:buFont typeface="Wingdings 2" panose="05020102010507070707" pitchFamily="18" charset="2"/>
-              <a:buChar char=""/>
-              <a:defRPr sz="1800" kern="1200">
-                <a:solidFill>
-                  <a:schemeClr val="tx2"/>
-                </a:solidFill>
-                <a:latin typeface="+mn-lt"/>
-                <a:ea typeface="+mn-ea"/>
-                <a:cs typeface="+mn-cs"/>
-              </a:defRPr>
-            </a:lvl1pPr>
-            <a:lvl2pPr marL="629920" indent="-306070" algn="l" defTabSz="457200" rtl="0" eaLnBrk="1" latinLnBrk="0" hangingPunct="1">
-              <a:spcBef>
-                <a:spcPct val="20000"/>
-              </a:spcBef>
-              <a:spcAft>
-                <a:spcPts val="600"/>
-              </a:spcAft>
-              <a:buClr>
-                <a:schemeClr val="accent2"/>
-              </a:buClr>
-              <a:buSzPct val="92000"/>
-              <a:buFont typeface="Wingdings 2" panose="05020102010507070707" pitchFamily="18" charset="2"/>
-              <a:buChar char=""/>
-              <a:defRPr sz="1600" kern="1200">
-                <a:solidFill>
-                  <a:schemeClr val="tx2"/>
-                </a:solidFill>
-                <a:latin typeface="+mn-lt"/>
-                <a:ea typeface="+mn-ea"/>
-                <a:cs typeface="+mn-cs"/>
-              </a:defRPr>
-            </a:lvl2pPr>
-            <a:lvl3pPr marL="899795" indent="-269875" algn="l" defTabSz="457200" rtl="0" eaLnBrk="1" latinLnBrk="0" hangingPunct="1">
-              <a:spcBef>
-                <a:spcPct val="20000"/>
-              </a:spcBef>
-              <a:spcAft>
-                <a:spcPts val="600"/>
-              </a:spcAft>
-              <a:buClr>
-                <a:schemeClr val="accent2"/>
-              </a:buClr>
-              <a:buSzPct val="92000"/>
-              <a:buFont typeface="Wingdings 2" panose="05020102010507070707" pitchFamily="18" charset="2"/>
-              <a:buChar char=""/>
-              <a:defRPr sz="1400" kern="1200">
-                <a:solidFill>
-                  <a:schemeClr val="tx2"/>
-                </a:solidFill>
-                <a:latin typeface="+mn-lt"/>
-                <a:ea typeface="+mn-ea"/>
-                <a:cs typeface="+mn-cs"/>
-              </a:defRPr>
-            </a:lvl3pPr>
-            <a:lvl4pPr marL="1242060" indent="-233680" algn="l" defTabSz="457200" rtl="0" eaLnBrk="1" latinLnBrk="0" hangingPunct="1">
-              <a:spcBef>
-                <a:spcPct val="20000"/>
-              </a:spcBef>
-              <a:spcAft>
-                <a:spcPts val="600"/>
-              </a:spcAft>
-              <a:buClr>
-                <a:schemeClr val="accent2"/>
-              </a:buClr>
-              <a:buSzPct val="92000"/>
-              <a:buFont typeface="Wingdings 2" panose="05020102010507070707" pitchFamily="18" charset="2"/>
-              <a:buChar char=""/>
-              <a:defRPr sz="1200" kern="1200">
-                <a:solidFill>
-                  <a:schemeClr val="tx2"/>
-                </a:solidFill>
-                <a:latin typeface="+mn-lt"/>
-                <a:ea typeface="+mn-ea"/>
-                <a:cs typeface="+mn-cs"/>
-              </a:defRPr>
-            </a:lvl4pPr>
-            <a:lvl5pPr marL="1602105" indent="-233680" algn="l" defTabSz="457200" rtl="0" eaLnBrk="1" latinLnBrk="0" hangingPunct="1">
-              <a:spcBef>
-                <a:spcPct val="20000"/>
-              </a:spcBef>
-              <a:spcAft>
-                <a:spcPts val="600"/>
-              </a:spcAft>
-              <a:buClr>
-                <a:schemeClr val="accent2"/>
-              </a:buClr>
-              <a:buSzPct val="92000"/>
-              <a:buFont typeface="Wingdings 2" panose="05020102010507070707" pitchFamily="18" charset="2"/>
-              <a:buChar char=""/>
-              <a:defRPr sz="1200" kern="1200">
-                <a:solidFill>
-                  <a:schemeClr val="tx2"/>
-                </a:solidFill>
-                <a:latin typeface="+mn-lt"/>
-                <a:ea typeface="+mn-ea"/>
-                <a:cs typeface="+mn-cs"/>
-              </a:defRPr>
-            </a:lvl5pPr>
-            <a:lvl6pPr marL="1899920" indent="-228600" algn="l" defTabSz="457200" rtl="0" eaLnBrk="1" latinLnBrk="0" hangingPunct="1">
-              <a:spcBef>
-                <a:spcPct val="20000"/>
-              </a:spcBef>
-              <a:spcAft>
-                <a:spcPts val="600"/>
-              </a:spcAft>
-              <a:buClr>
-                <a:schemeClr val="accent2"/>
-              </a:buClr>
-              <a:buSzPct val="92000"/>
-              <a:buFont typeface="Wingdings 2" panose="05020102010507070707" pitchFamily="18" charset="2"/>
-              <a:buChar char=""/>
-              <a:defRPr sz="1200" kern="1200">
-                <a:solidFill>
-                  <a:schemeClr val="tx2"/>
-                </a:solidFill>
-                <a:latin typeface="+mn-lt"/>
-                <a:ea typeface="+mn-ea"/>
-                <a:cs typeface="+mn-cs"/>
-              </a:defRPr>
-            </a:lvl6pPr>
-            <a:lvl7pPr marL="2199640" indent="-228600" algn="l" defTabSz="457200" rtl="0" eaLnBrk="1" latinLnBrk="0" hangingPunct="1">
-              <a:spcBef>
-                <a:spcPct val="20000"/>
-              </a:spcBef>
-              <a:spcAft>
-                <a:spcPts val="600"/>
-              </a:spcAft>
-              <a:buClr>
-                <a:schemeClr val="accent2"/>
-              </a:buClr>
-              <a:buSzPct val="92000"/>
-              <a:buFont typeface="Wingdings 2" panose="05020102010507070707" pitchFamily="18" charset="2"/>
-              <a:buChar char=""/>
-              <a:defRPr sz="1200" kern="1200">
-                <a:solidFill>
-                  <a:schemeClr val="tx2"/>
-                </a:solidFill>
-                <a:latin typeface="+mn-lt"/>
-                <a:ea typeface="+mn-ea"/>
-                <a:cs typeface="+mn-cs"/>
-              </a:defRPr>
-            </a:lvl7pPr>
-            <a:lvl8pPr marL="2499995" indent="-228600" algn="l" defTabSz="457200" rtl="0" eaLnBrk="1" latinLnBrk="0" hangingPunct="1">
-              <a:spcBef>
-                <a:spcPct val="20000"/>
-              </a:spcBef>
-              <a:spcAft>
-                <a:spcPts val="600"/>
-              </a:spcAft>
-              <a:buClr>
-                <a:schemeClr val="accent2"/>
-              </a:buClr>
-              <a:buSzPct val="92000"/>
-              <a:buFont typeface="Wingdings 2" panose="05020102010507070707" pitchFamily="18" charset="2"/>
-              <a:buChar char=""/>
-              <a:defRPr sz="1200" kern="1200">
-                <a:solidFill>
-                  <a:schemeClr val="tx2"/>
-                </a:solidFill>
-                <a:latin typeface="+mn-lt"/>
-                <a:ea typeface="+mn-ea"/>
-                <a:cs typeface="+mn-cs"/>
-              </a:defRPr>
-            </a:lvl8pPr>
-            <a:lvl9pPr marL="2799715" indent="-228600" algn="l" defTabSz="457200" rtl="0" eaLnBrk="1" latinLnBrk="0" hangingPunct="1">
-              <a:spcBef>
-                <a:spcPct val="20000"/>
-              </a:spcBef>
-              <a:spcAft>
-                <a:spcPts val="600"/>
-              </a:spcAft>
-              <a:buClr>
-                <a:schemeClr val="accent2"/>
-              </a:buClr>
-              <a:buSzPct val="92000"/>
-              <a:buFont typeface="Wingdings 2" panose="05020102010507070707" pitchFamily="18" charset="2"/>
-              <a:buChar char=""/>
-              <a:defRPr sz="1200" kern="1200">
-                <a:solidFill>
-                  <a:schemeClr val="tx2"/>
-                </a:solidFill>
-                <a:latin typeface="+mn-lt"/>
-                <a:ea typeface="+mn-ea"/>
-                <a:cs typeface="+mn-cs"/>
-              </a:defRPr>
-            </a:lvl9pPr>
-          </a:lstStyle>
-          <a:p>
-            <a:pPr marL="323850" lvl="1" indent="0">
-              <a:buFont typeface="Wingdings 2" panose="05020102010507070707" pitchFamily="18" charset="2"/>
-              <a:buNone/>
-            </a:pPr>
-            <a:endParaRPr kumimoji="1" lang="en-US" altLang="zh-CN" dirty="0"/>
-          </a:p>
-          <a:p>
-            <a:pPr lvl="1"/>
-            <a:r>
-              <a:rPr kumimoji="1" lang="zh-CN" altLang="en-US" dirty="0"/>
-              <a:t>实现内容：</a:t>
-            </a:r>
-            <a:endParaRPr kumimoji="1" lang="en-US" altLang="zh-CN" dirty="0"/>
-          </a:p>
-          <a:p>
-            <a:pPr lvl="2"/>
-            <a:r>
-              <a:rPr kumimoji="1" lang="en-US" altLang="zh-CN" dirty="0"/>
-              <a:t>Kernel </a:t>
-            </a:r>
-            <a:r>
-              <a:rPr kumimoji="1" lang="zh-CN" altLang="en-US" dirty="0"/>
-              <a:t>内核对象</a:t>
-            </a:r>
-            <a:endParaRPr kumimoji="1" lang="en-US" altLang="zh-CN" dirty="0"/>
-          </a:p>
-          <a:p>
-            <a:pPr lvl="3"/>
-            <a:r>
-              <a:rPr kumimoji="1" lang="en-US" altLang="zh-CN" dirty="0" err="1"/>
-              <a:t>CSpace</a:t>
-            </a:r>
-            <a:r>
-              <a:rPr kumimoji="1" lang="zh-CN" altLang="en-US" dirty="0"/>
-              <a:t>、</a:t>
-            </a:r>
-            <a:r>
-              <a:rPr kumimoji="1" lang="en-US" altLang="zh-CN" dirty="0" err="1"/>
-              <a:t>CNode</a:t>
-            </a:r>
-            <a:endParaRPr kumimoji="1" lang="en-US" altLang="zh-CN" dirty="0"/>
-          </a:p>
-          <a:p>
-            <a:pPr lvl="3"/>
-            <a:r>
-              <a:rPr kumimoji="1" lang="en-US" altLang="zh-CN" dirty="0"/>
-              <a:t>TCB</a:t>
-            </a:r>
-            <a:endParaRPr kumimoji="1" lang="en-US" altLang="zh-CN" dirty="0"/>
-          </a:p>
-          <a:p>
-            <a:pPr lvl="3"/>
-            <a:r>
-              <a:rPr kumimoji="1" lang="en-US" altLang="zh-CN" dirty="0"/>
-              <a:t>IPC(Endpoint</a:t>
-            </a:r>
-            <a:r>
-              <a:rPr kumimoji="1" lang="zh-CN" altLang="en-US" dirty="0"/>
-              <a:t>、</a:t>
-            </a:r>
-            <a:r>
-              <a:rPr kumimoji="1" lang="en-US" altLang="zh-CN" dirty="0"/>
-              <a:t>Notification)</a:t>
-            </a:r>
-            <a:endParaRPr kumimoji="1" lang="en-US" altLang="zh-CN" dirty="0"/>
-          </a:p>
-          <a:p>
-            <a:pPr lvl="3"/>
-            <a:r>
-              <a:rPr kumimoji="1" lang="en-US" altLang="zh-CN" dirty="0"/>
-              <a:t>Reply </a:t>
-            </a:r>
-            <a:r>
-              <a:rPr kumimoji="1" lang="en-US" altLang="zh-CN" dirty="0"/>
-              <a:t>Object</a:t>
-            </a:r>
-            <a:endParaRPr kumimoji="1" lang="en-US" altLang="zh-CN" dirty="0"/>
-          </a:p>
-          <a:p>
-            <a:pPr lvl="3"/>
-            <a:r>
-              <a:rPr kumimoji="1" lang="en-US" altLang="zh-CN" dirty="0" err="1"/>
-              <a:t>IRQHandler</a:t>
-            </a:r>
-            <a:endParaRPr kumimoji="1" lang="en-US" altLang="zh-CN" dirty="0"/>
-          </a:p>
-          <a:p>
-            <a:pPr lvl="2"/>
-            <a:r>
-              <a:rPr kumimoji="1" lang="en-US" altLang="zh-CN" dirty="0"/>
-              <a:t>Kernel</a:t>
-            </a:r>
-            <a:r>
-              <a:rPr kumimoji="1" lang="zh-CN" altLang="en-US" dirty="0"/>
-              <a:t>内核服务</a:t>
-            </a:r>
-            <a:endParaRPr kumimoji="1" lang="en-US" altLang="zh-CN" dirty="0"/>
-          </a:p>
-          <a:p>
-            <a:pPr lvl="3"/>
-            <a:r>
-              <a:rPr kumimoji="1" lang="zh-CN" altLang="en-US" dirty="0"/>
-              <a:t>启动</a:t>
-            </a:r>
-            <a:r>
-              <a:rPr kumimoji="1" lang="zh-CN" altLang="en-US" dirty="0"/>
-              <a:t>初始化流程</a:t>
-            </a:r>
-            <a:endParaRPr kumimoji="1" lang="zh-CN" altLang="en-US" dirty="0"/>
-          </a:p>
-          <a:p>
-            <a:pPr lvl="3"/>
-            <a:r>
-              <a:rPr kumimoji="1" lang="zh-CN" altLang="en-US" dirty="0"/>
-              <a:t>操控内核对象的</a:t>
-            </a:r>
-            <a:r>
-              <a:rPr kumimoji="1" lang="zh-CN" altLang="en-US" dirty="0"/>
-              <a:t>服务</a:t>
-            </a:r>
-            <a:endParaRPr kumimoji="1" lang="zh-CN" altLang="en-US" dirty="0"/>
-          </a:p>
-          <a:p>
-            <a:pPr lvl="3"/>
             <a:endParaRPr kumimoji="1" lang="en-US" altLang="zh-CN" dirty="0"/>
           </a:p>
           <a:p>
@@ -7624,54 +7153,6 @@
           </a:p>
         </p:txBody>
       </p:sp>
-      <p:pic>
-        <p:nvPicPr>
-          <p:cNvPr id="9" name="图片 8"/>
-          <p:cNvPicPr>
-            <a:picLocks noChangeAspect="1"/>
-          </p:cNvPicPr>
-          <p:nvPr/>
-        </p:nvPicPr>
-        <p:blipFill>
-          <a:blip r:embed="rId1"/>
-          <a:stretch>
-            <a:fillRect/>
-          </a:stretch>
-        </p:blipFill>
-        <p:spPr>
-          <a:xfrm>
-            <a:off x="6075116" y="808253"/>
-            <a:ext cx="5584448" cy="4267110"/>
-          </a:xfrm>
-          <a:prstGeom prst="rect">
-            <a:avLst/>
-          </a:prstGeom>
-        </p:spPr>
-      </p:pic>
-      <p:pic>
-        <p:nvPicPr>
-          <p:cNvPr id="13" name="图片 12"/>
-          <p:cNvPicPr>
-            <a:picLocks noChangeAspect="1"/>
-          </p:cNvPicPr>
-          <p:nvPr/>
-        </p:nvPicPr>
-        <p:blipFill>
-          <a:blip r:embed="rId2"/>
-          <a:stretch>
-            <a:fillRect/>
-          </a:stretch>
-        </p:blipFill>
-        <p:spPr>
-          <a:xfrm>
-            <a:off x="6158464" y="5255888"/>
-            <a:ext cx="4390063" cy="1281972"/>
-          </a:xfrm>
-          <a:prstGeom prst="rect">
-            <a:avLst/>
-          </a:prstGeom>
-        </p:spPr>
-      </p:pic>
     </p:spTree>
   </p:cSld>
   <p:clrMapOvr>

</xml_diff>